<commit_message>
Update the diagram for logic component
Add the missing arrows between PresentationSectionController and GateKeeper as well as RecordController and GateKeeper
</commit_message>
<xml_diff>
--- a/images/backendLogicStorageOverview.pptx
+++ b/images/backendLogicStorageOverview.pptx
@@ -212,7 +212,7 @@
             <a:fld id="{5D8FA8FF-20DC-44E5-8C35-13EAF0A5698C}" type="datetimeFigureOut">
               <a:rPr lang="en-SG" smtClean="0"/>
               <a:pPr/>
-              <a:t>14/11/18</a:t>
+              <a:t>5/9/2019</a:t>
             </a:fld>
             <a:endParaRPr lang="en-SG"/>
           </a:p>
@@ -661,7 +661,7 @@
             <a:fld id="{1D8BD707-D9CF-40AE-B4C6-C98DA3205C09}" type="datetimeFigureOut">
               <a:rPr lang="en-US" smtClean="0"/>
               <a:pPr/>
-              <a:t>11/14/18</a:t>
+              <a:t>9/5/2019</a:t>
             </a:fld>
             <a:endParaRPr lang="en-US"/>
           </a:p>
@@ -826,7 +826,7 @@
             <a:fld id="{1D8BD707-D9CF-40AE-B4C6-C98DA3205C09}" type="datetimeFigureOut">
               <a:rPr lang="en-US" smtClean="0"/>
               <a:pPr/>
-              <a:t>11/14/18</a:t>
+              <a:t>9/5/2019</a:t>
             </a:fld>
             <a:endParaRPr lang="en-US"/>
           </a:p>
@@ -1001,7 +1001,7 @@
             <a:fld id="{1D8BD707-D9CF-40AE-B4C6-C98DA3205C09}" type="datetimeFigureOut">
               <a:rPr lang="en-US" smtClean="0"/>
               <a:pPr/>
-              <a:t>11/14/18</a:t>
+              <a:t>9/5/2019</a:t>
             </a:fld>
             <a:endParaRPr lang="en-US"/>
           </a:p>
@@ -1166,7 +1166,7 @@
             <a:fld id="{1D8BD707-D9CF-40AE-B4C6-C98DA3205C09}" type="datetimeFigureOut">
               <a:rPr lang="en-US" smtClean="0"/>
               <a:pPr/>
-              <a:t>11/14/18</a:t>
+              <a:t>9/5/2019</a:t>
             </a:fld>
             <a:endParaRPr lang="en-US"/>
           </a:p>
@@ -1408,7 +1408,7 @@
             <a:fld id="{1D8BD707-D9CF-40AE-B4C6-C98DA3205C09}" type="datetimeFigureOut">
               <a:rPr lang="en-US" smtClean="0"/>
               <a:pPr/>
-              <a:t>11/14/18</a:t>
+              <a:t>9/5/2019</a:t>
             </a:fld>
             <a:endParaRPr lang="en-US"/>
           </a:p>
@@ -1690,7 +1690,7 @@
             <a:fld id="{1D8BD707-D9CF-40AE-B4C6-C98DA3205C09}" type="datetimeFigureOut">
               <a:rPr lang="en-US" smtClean="0"/>
               <a:pPr/>
-              <a:t>11/14/18</a:t>
+              <a:t>9/5/2019</a:t>
             </a:fld>
             <a:endParaRPr lang="en-US"/>
           </a:p>
@@ -2106,7 +2106,7 @@
             <a:fld id="{1D8BD707-D9CF-40AE-B4C6-C98DA3205C09}" type="datetimeFigureOut">
               <a:rPr lang="en-US" smtClean="0"/>
               <a:pPr/>
-              <a:t>11/14/18</a:t>
+              <a:t>9/5/2019</a:t>
             </a:fld>
             <a:endParaRPr lang="en-US"/>
           </a:p>
@@ -2220,7 +2220,7 @@
             <a:fld id="{1D8BD707-D9CF-40AE-B4C6-C98DA3205C09}" type="datetimeFigureOut">
               <a:rPr lang="en-US" smtClean="0"/>
               <a:pPr/>
-              <a:t>11/14/18</a:t>
+              <a:t>9/5/2019</a:t>
             </a:fld>
             <a:endParaRPr lang="en-US"/>
           </a:p>
@@ -2312,7 +2312,7 @@
             <a:fld id="{1D8BD707-D9CF-40AE-B4C6-C98DA3205C09}" type="datetimeFigureOut">
               <a:rPr lang="en-US" smtClean="0"/>
               <a:pPr/>
-              <a:t>11/14/18</a:t>
+              <a:t>9/5/2019</a:t>
             </a:fld>
             <a:endParaRPr lang="en-US"/>
           </a:p>
@@ -2584,7 +2584,7 @@
             <a:fld id="{1D8BD707-D9CF-40AE-B4C6-C98DA3205C09}" type="datetimeFigureOut">
               <a:rPr lang="en-US" smtClean="0"/>
               <a:pPr/>
-              <a:t>11/14/18</a:t>
+              <a:t>9/5/2019</a:t>
             </a:fld>
             <a:endParaRPr lang="en-US"/>
           </a:p>
@@ -2833,7 +2833,7 @@
             <a:fld id="{1D8BD707-D9CF-40AE-B4C6-C98DA3205C09}" type="datetimeFigureOut">
               <a:rPr lang="en-US" smtClean="0"/>
               <a:pPr/>
-              <a:t>11/14/18</a:t>
+              <a:t>9/5/2019</a:t>
             </a:fld>
             <a:endParaRPr lang="en-US"/>
           </a:p>
@@ -3041,7 +3041,7 @@
             <a:fld id="{1D8BD707-D9CF-40AE-B4C6-C98DA3205C09}" type="datetimeFigureOut">
               <a:rPr lang="en-US" smtClean="0"/>
               <a:pPr/>
-              <a:t>11/14/18</a:t>
+              <a:t>9/5/2019</a:t>
             </a:fld>
             <a:endParaRPr lang="en-US"/>
           </a:p>
@@ -3464,7 +3464,7 @@
           <a:p>
             <a:pPr algn="ctr"/>
             <a:r>
-              <a:rPr lang="en-US" sz="1600" b="1" dirty="0" err="1" smtClean="0"/>
+              <a:rPr lang="en-US" sz="1600" b="1" dirty="0" err="1"/>
               <a:t>AnalysisLogic</a:t>
             </a:r>
             <a:endParaRPr lang="en-SG" sz="1600" b="1" dirty="0"/>
@@ -3995,7 +3995,7 @@
           <a:p>
             <a:pPr algn="ctr"/>
             <a:r>
-              <a:rPr lang="en-US" sz="1600" b="1" smtClean="0"/>
+              <a:rPr lang="en-US" sz="1600" b="1"/>
               <a:t>GateKeeper</a:t>
             </a:r>
             <a:endParaRPr lang="en-SG" sz="1600" b="1" dirty="0"/>
@@ -4054,7 +4054,7 @@
           <a:p>
             <a:pPr algn="ctr"/>
             <a:r>
-              <a:rPr lang="en-US" sz="1600" b="1" dirty="0" err="1" smtClean="0"/>
+              <a:rPr lang="en-US" sz="1600" b="1" dirty="0" err="1"/>
               <a:t>DBMetaDataLogic</a:t>
             </a:r>
             <a:endParaRPr lang="en-SG" sz="1600" b="1" dirty="0"/>
@@ -4950,19 +4950,19 @@
           <a:p>
             <a:pPr algn="ctr"/>
             <a:r>
-              <a:rPr lang="en-US" dirty="0" smtClean="0"/>
+              <a:rPr lang="en-US" dirty="0"/>
               <a:t>*.</a:t>
             </a:r>
             <a:r>
-              <a:rPr lang="en-US" dirty="0" err="1" smtClean="0"/>
+              <a:rPr lang="en-US" dirty="0" err="1"/>
               <a:t>js</a:t>
             </a:r>
             <a:r>
-              <a:rPr lang="en-US" dirty="0" smtClean="0"/>
+              <a:rPr lang="en-US" dirty="0"/>
               <a:t> / *.html / *.</a:t>
             </a:r>
             <a:r>
-              <a:rPr lang="en-US" dirty="0" err="1" smtClean="0"/>
+              <a:rPr lang="en-US" dirty="0" err="1"/>
               <a:t>css</a:t>
             </a:r>
             <a:endParaRPr lang="en-US" dirty="0"/>
@@ -5021,7 +5021,7 @@
           <a:p>
             <a:pPr algn="ctr"/>
             <a:r>
-              <a:rPr lang="en-US" sz="1600" b="1" smtClean="0"/>
+              <a:rPr lang="en-US" sz="1600" b="1"/>
               <a:t>Storage</a:t>
             </a:r>
             <a:endParaRPr lang="en-SG" sz="1600" b="1" dirty="0"/>
@@ -5208,6 +5208,106 @@
           <a:ln w="38100">
             <a:solidFill>
               <a:schemeClr val="accent4"/>
+            </a:solidFill>
+            <a:prstDash val="solid"/>
+            <a:headEnd type="none" w="med" len="med"/>
+            <a:tailEnd type="triangle" w="med" len="med"/>
+          </a:ln>
+        </p:spPr>
+        <p:style>
+          <a:lnRef idx="1">
+            <a:schemeClr val="accent1"/>
+          </a:lnRef>
+          <a:fillRef idx="0">
+            <a:schemeClr val="accent1"/>
+          </a:fillRef>
+          <a:effectRef idx="0">
+            <a:schemeClr val="accent1"/>
+          </a:effectRef>
+          <a:fontRef idx="minor">
+            <a:schemeClr val="tx1"/>
+          </a:fontRef>
+        </p:style>
+      </p:cxnSp>
+      <p:cxnSp>
+        <p:nvCxnSpPr>
+          <p:cNvPr id="38" name="Elbow Connector 182">
+            <a:extLst>
+              <a:ext uri="{FF2B5EF4-FFF2-40B4-BE49-F238E27FC236}">
+                <a16:creationId xmlns:a16="http://schemas.microsoft.com/office/drawing/2014/main" id="{7C210679-773E-472A-B727-020C2FE3ADEB}"/>
+              </a:ext>
+            </a:extLst>
+          </p:cNvPr>
+          <p:cNvCxnSpPr>
+            <a:cxnSpLocks/>
+            <a:stCxn id="10" idx="3"/>
+            <a:endCxn id="13" idx="1"/>
+          </p:cNvCxnSpPr>
+          <p:nvPr/>
+        </p:nvCxnSpPr>
+        <p:spPr>
+          <a:xfrm flipV="1">
+            <a:off x="3605066" y="1219903"/>
+            <a:ext cx="2428330" cy="3018515"/>
+          </a:xfrm>
+          <a:prstGeom prst="straightConnector1">
+            <a:avLst/>
+          </a:prstGeom>
+          <a:ln w="38100">
+            <a:solidFill>
+              <a:schemeClr val="accent1">
+                <a:lumMod val="75000"/>
+              </a:schemeClr>
+            </a:solidFill>
+            <a:prstDash val="solid"/>
+            <a:headEnd type="none" w="med" len="med"/>
+            <a:tailEnd type="triangle" w="med" len="med"/>
+          </a:ln>
+        </p:spPr>
+        <p:style>
+          <a:lnRef idx="1">
+            <a:schemeClr val="accent1"/>
+          </a:lnRef>
+          <a:fillRef idx="0">
+            <a:schemeClr val="accent1"/>
+          </a:fillRef>
+          <a:effectRef idx="0">
+            <a:schemeClr val="accent1"/>
+          </a:effectRef>
+          <a:fontRef idx="minor">
+            <a:schemeClr val="tx1"/>
+          </a:fontRef>
+        </p:style>
+      </p:cxnSp>
+      <p:cxnSp>
+        <p:nvCxnSpPr>
+          <p:cNvPr id="41" name="Elbow Connector 182">
+            <a:extLst>
+              <a:ext uri="{FF2B5EF4-FFF2-40B4-BE49-F238E27FC236}">
+                <a16:creationId xmlns:a16="http://schemas.microsoft.com/office/drawing/2014/main" id="{FA27843D-790E-48C2-97A4-AAF04C41883F}"/>
+              </a:ext>
+            </a:extLst>
+          </p:cNvPr>
+          <p:cNvCxnSpPr>
+            <a:cxnSpLocks/>
+            <a:stCxn id="11" idx="3"/>
+            <a:endCxn id="13" idx="1"/>
+          </p:cNvCxnSpPr>
+          <p:nvPr/>
+        </p:nvCxnSpPr>
+        <p:spPr>
+          <a:xfrm flipV="1">
+            <a:off x="3605066" y="1219903"/>
+            <a:ext cx="2428330" cy="3763329"/>
+          </a:xfrm>
+          <a:prstGeom prst="straightConnector1">
+            <a:avLst/>
+          </a:prstGeom>
+          <a:ln w="38100">
+            <a:solidFill>
+              <a:schemeClr val="accent1">
+                <a:lumMod val="75000"/>
+              </a:schemeClr>
             </a:solidFill>
             <a:prstDash val="solid"/>
             <a:headEnd type="none" w="med" len="med"/>

</xml_diff>

<commit_message>
Beautify backendlogicstorage overview diagram
</commit_message>
<xml_diff>
--- a/images/backendLogicStorageOverview.pptx
+++ b/images/backendLogicStorageOverview.pptx
@@ -5,15 +5,16 @@
     <p:sldMasterId id="2147483648" r:id="rId1"/>
   </p:sldMasterIdLst>
   <p:notesMasterIdLst>
-    <p:notesMasterId r:id="rId3"/>
+    <p:notesMasterId r:id="rId4"/>
   </p:notesMasterIdLst>
   <p:sldIdLst>
     <p:sldId id="257" r:id="rId2"/>
+    <p:sldId id="258" r:id="rId3"/>
   </p:sldIdLst>
   <p:sldSz cx="8640763" cy="6300788"/>
   <p:notesSz cx="6797675" cy="9872663"/>
   <p:custDataLst>
-    <p:tags r:id="rId4"/>
+    <p:tags r:id="rId5"/>
   </p:custDataLst>
   <p:defaultTextStyle>
     <a:defPPr>
@@ -212,7 +213,7 @@
             <a:fld id="{5D8FA8FF-20DC-44E5-8C35-13EAF0A5698C}" type="datetimeFigureOut">
               <a:rPr lang="en-SG" smtClean="0"/>
               <a:pPr/>
-              <a:t>5/9/2019</a:t>
+              <a:t>19/9/2019</a:t>
             </a:fld>
             <a:endParaRPr lang="en-SG"/>
           </a:p>
@@ -661,7 +662,7 @@
             <a:fld id="{1D8BD707-D9CF-40AE-B4C6-C98DA3205C09}" type="datetimeFigureOut">
               <a:rPr lang="en-US" smtClean="0"/>
               <a:pPr/>
-              <a:t>9/5/2019</a:t>
+              <a:t>9/19/2019</a:t>
             </a:fld>
             <a:endParaRPr lang="en-US"/>
           </a:p>
@@ -826,7 +827,7 @@
             <a:fld id="{1D8BD707-D9CF-40AE-B4C6-C98DA3205C09}" type="datetimeFigureOut">
               <a:rPr lang="en-US" smtClean="0"/>
               <a:pPr/>
-              <a:t>9/5/2019</a:t>
+              <a:t>9/19/2019</a:t>
             </a:fld>
             <a:endParaRPr lang="en-US"/>
           </a:p>
@@ -1001,7 +1002,7 @@
             <a:fld id="{1D8BD707-D9CF-40AE-B4C6-C98DA3205C09}" type="datetimeFigureOut">
               <a:rPr lang="en-US" smtClean="0"/>
               <a:pPr/>
-              <a:t>9/5/2019</a:t>
+              <a:t>9/19/2019</a:t>
             </a:fld>
             <a:endParaRPr lang="en-US"/>
           </a:p>
@@ -1166,7 +1167,7 @@
             <a:fld id="{1D8BD707-D9CF-40AE-B4C6-C98DA3205C09}" type="datetimeFigureOut">
               <a:rPr lang="en-US" smtClean="0"/>
               <a:pPr/>
-              <a:t>9/5/2019</a:t>
+              <a:t>9/19/2019</a:t>
             </a:fld>
             <a:endParaRPr lang="en-US"/>
           </a:p>
@@ -1408,7 +1409,7 @@
             <a:fld id="{1D8BD707-D9CF-40AE-B4C6-C98DA3205C09}" type="datetimeFigureOut">
               <a:rPr lang="en-US" smtClean="0"/>
               <a:pPr/>
-              <a:t>9/5/2019</a:t>
+              <a:t>9/19/2019</a:t>
             </a:fld>
             <a:endParaRPr lang="en-US"/>
           </a:p>
@@ -1690,7 +1691,7 @@
             <a:fld id="{1D8BD707-D9CF-40AE-B4C6-C98DA3205C09}" type="datetimeFigureOut">
               <a:rPr lang="en-US" smtClean="0"/>
               <a:pPr/>
-              <a:t>9/5/2019</a:t>
+              <a:t>9/19/2019</a:t>
             </a:fld>
             <a:endParaRPr lang="en-US"/>
           </a:p>
@@ -2106,7 +2107,7 @@
             <a:fld id="{1D8BD707-D9CF-40AE-B4C6-C98DA3205C09}" type="datetimeFigureOut">
               <a:rPr lang="en-US" smtClean="0"/>
               <a:pPr/>
-              <a:t>9/5/2019</a:t>
+              <a:t>9/19/2019</a:t>
             </a:fld>
             <a:endParaRPr lang="en-US"/>
           </a:p>
@@ -2220,7 +2221,7 @@
             <a:fld id="{1D8BD707-D9CF-40AE-B4C6-C98DA3205C09}" type="datetimeFigureOut">
               <a:rPr lang="en-US" smtClean="0"/>
               <a:pPr/>
-              <a:t>9/5/2019</a:t>
+              <a:t>9/19/2019</a:t>
             </a:fld>
             <a:endParaRPr lang="en-US"/>
           </a:p>
@@ -2312,7 +2313,7 @@
             <a:fld id="{1D8BD707-D9CF-40AE-B4C6-C98DA3205C09}" type="datetimeFigureOut">
               <a:rPr lang="en-US" smtClean="0"/>
               <a:pPr/>
-              <a:t>9/5/2019</a:t>
+              <a:t>9/19/2019</a:t>
             </a:fld>
             <a:endParaRPr lang="en-US"/>
           </a:p>
@@ -2584,7 +2585,7 @@
             <a:fld id="{1D8BD707-D9CF-40AE-B4C6-C98DA3205C09}" type="datetimeFigureOut">
               <a:rPr lang="en-US" smtClean="0"/>
               <a:pPr/>
-              <a:t>9/5/2019</a:t>
+              <a:t>9/19/2019</a:t>
             </a:fld>
             <a:endParaRPr lang="en-US"/>
           </a:p>
@@ -2833,7 +2834,7 @@
             <a:fld id="{1D8BD707-D9CF-40AE-B4C6-C98DA3205C09}" type="datetimeFigureOut">
               <a:rPr lang="en-US" smtClean="0"/>
               <a:pPr/>
-              <a:t>9/5/2019</a:t>
+              <a:t>9/19/2019</a:t>
             </a:fld>
             <a:endParaRPr lang="en-US"/>
           </a:p>
@@ -3041,7 +3042,7 @@
             <a:fld id="{1D8BD707-D9CF-40AE-B4C6-C98DA3205C09}" type="datetimeFigureOut">
               <a:rPr lang="en-US" smtClean="0"/>
               <a:pPr/>
-              <a:t>9/5/2019</a:t>
+              <a:t>9/19/2019</a:t>
             </a:fld>
             <a:endParaRPr lang="en-US"/>
           </a:p>
@@ -3420,8 +3421,8 @@
         </p:nvSpPr>
         <p:spPr>
           <a:xfrm>
-            <a:off x="6033396" y="254794"/>
-            <a:ext cx="1524000" cy="391728"/>
+            <a:off x="6216445" y="288186"/>
+            <a:ext cx="1337388" cy="343761"/>
           </a:xfrm>
           <a:prstGeom prst="roundRect">
             <a:avLst>
@@ -3464,10 +3465,10 @@
           <a:p>
             <a:pPr algn="ctr"/>
             <a:r>
-              <a:rPr lang="en-US" sz="1600" b="1" dirty="0" err="1"/>
+              <a:rPr lang="en-US" sz="1400" b="1" dirty="0" err="1"/>
               <a:t>AnalysisLogic</a:t>
             </a:r>
-            <a:endParaRPr lang="en-SG" sz="1600" b="1" dirty="0"/>
+            <a:endParaRPr lang="en-SG" sz="1400" b="1" dirty="0"/>
           </a:p>
         </p:txBody>
       </p:sp>
@@ -3479,8 +3480,8 @@
         </p:nvSpPr>
         <p:spPr>
           <a:xfrm>
-            <a:off x="1729581" y="254794"/>
-            <a:ext cx="1872000" cy="381000"/>
+            <a:off x="1746343" y="288186"/>
+            <a:ext cx="1642776" cy="334347"/>
           </a:xfrm>
           <a:prstGeom prst="roundRect">
             <a:avLst>
@@ -3523,10 +3524,10 @@
           <a:p>
             <a:pPr algn="ctr"/>
             <a:r>
-              <a:rPr lang="en-US" sz="1600" b="1" dirty="0" err="1"/>
+              <a:rPr lang="en-US" sz="1400" b="1" dirty="0" err="1"/>
               <a:t>AnalysisController</a:t>
             </a:r>
-            <a:endParaRPr lang="en-SG" sz="1600" b="1" dirty="0"/>
+            <a:endParaRPr lang="en-SG" sz="1400" b="1" dirty="0"/>
           </a:p>
         </p:txBody>
       </p:sp>
@@ -3538,8 +3539,8 @@
         </p:nvSpPr>
         <p:spPr>
           <a:xfrm>
-            <a:off x="1729581" y="1016794"/>
-            <a:ext cx="1872000" cy="381000"/>
+            <a:off x="1744851" y="1016794"/>
+            <a:ext cx="1642776" cy="334347"/>
           </a:xfrm>
           <a:prstGeom prst="roundRect">
             <a:avLst>
@@ -3582,10 +3583,10 @@
           <a:p>
             <a:pPr algn="ctr"/>
             <a:r>
-              <a:rPr lang="en-US" sz="1600" b="1" dirty="0" err="1"/>
+              <a:rPr lang="en-US" sz="1400" b="1" dirty="0" err="1"/>
               <a:t>AuthInfoController</a:t>
             </a:r>
-            <a:endParaRPr lang="en-SG" sz="1600" b="1" dirty="0"/>
+            <a:endParaRPr lang="en-SG" sz="1400" b="1" dirty="0"/>
           </a:p>
         </p:txBody>
       </p:sp>
@@ -3597,8 +3598,8 @@
         </p:nvSpPr>
         <p:spPr>
           <a:xfrm>
-            <a:off x="1424781" y="1761918"/>
-            <a:ext cx="2176800" cy="381000"/>
+            <a:off x="1415450" y="4751657"/>
+            <a:ext cx="1910254" cy="334347"/>
           </a:xfrm>
           <a:prstGeom prst="roundRect">
             <a:avLst>
@@ -3641,10 +3642,10 @@
           <a:p>
             <a:pPr algn="ctr"/>
             <a:r>
-              <a:rPr lang="en-US" sz="1600" b="1"/>
+              <a:rPr lang="en-US" sz="1400" b="1"/>
               <a:t>DBMetaDataController</a:t>
             </a:r>
-            <a:endParaRPr lang="en-SG" sz="1600" b="1" dirty="0"/>
+            <a:endParaRPr lang="en-SG" sz="1400" b="1" dirty="0"/>
           </a:p>
         </p:txBody>
       </p:sp>
@@ -3656,8 +3657,8 @@
         </p:nvSpPr>
         <p:spPr>
           <a:xfrm>
-            <a:off x="129381" y="2523918"/>
-            <a:ext cx="3472200" cy="381000"/>
+            <a:off x="301105" y="2532100"/>
+            <a:ext cx="3047034" cy="334347"/>
           </a:xfrm>
           <a:prstGeom prst="roundRect">
             <a:avLst>
@@ -3700,10 +3701,10 @@
           <a:p>
             <a:pPr algn="ctr"/>
             <a:r>
-              <a:rPr lang="en-US" sz="1600" b="1" dirty="0" err="1"/>
+              <a:rPr lang="en-US" sz="1400" b="1" dirty="0" err="1"/>
               <a:t>PresentationAccessControlController</a:t>
             </a:r>
-            <a:endParaRPr lang="en-SG" sz="1600" b="1" dirty="0"/>
+            <a:endParaRPr lang="en-SG" sz="1400" b="1" dirty="0"/>
           </a:p>
         </p:txBody>
       </p:sp>
@@ -3715,8 +3716,8 @@
         </p:nvSpPr>
         <p:spPr>
           <a:xfrm>
-            <a:off x="1348581" y="3285918"/>
-            <a:ext cx="2253000" cy="381000"/>
+            <a:off x="1353904" y="3224551"/>
+            <a:ext cx="1977123" cy="334347"/>
           </a:xfrm>
           <a:prstGeom prst="roundRect">
             <a:avLst>
@@ -3759,10 +3760,10 @@
           <a:p>
             <a:pPr algn="ctr"/>
             <a:r>
-              <a:rPr lang="en-US" sz="1600" b="1"/>
+              <a:rPr lang="en-US" sz="1400" b="1"/>
               <a:t>PresentationController</a:t>
             </a:r>
-            <a:endParaRPr lang="en-SG" sz="1600" b="1" dirty="0"/>
+            <a:endParaRPr lang="en-SG" sz="1400" b="1" dirty="0"/>
           </a:p>
         </p:txBody>
       </p:sp>
@@ -3774,8 +3775,8 @@
         </p:nvSpPr>
         <p:spPr>
           <a:xfrm>
-            <a:off x="738981" y="4047918"/>
-            <a:ext cx="2866085" cy="381000"/>
+            <a:off x="810567" y="4039736"/>
+            <a:ext cx="2515137" cy="334347"/>
           </a:xfrm>
           <a:prstGeom prst="roundRect">
             <a:avLst>
@@ -3818,10 +3819,10 @@
           <a:p>
             <a:pPr algn="ctr"/>
             <a:r>
-              <a:rPr lang="en-US" sz="1600" b="1"/>
+              <a:rPr lang="en-US" sz="1400" b="1"/>
               <a:t>PresentationSectionController</a:t>
             </a:r>
-            <a:endParaRPr lang="en-SG" sz="1600" b="1" dirty="0"/>
+            <a:endParaRPr lang="en-SG" sz="1400" b="1" dirty="0"/>
           </a:p>
         </p:txBody>
       </p:sp>
@@ -3833,8 +3834,8 @@
         </p:nvSpPr>
         <p:spPr>
           <a:xfrm>
-            <a:off x="1881981" y="4792732"/>
-            <a:ext cx="1723085" cy="381000"/>
+            <a:off x="1839027" y="1776332"/>
+            <a:ext cx="1512096" cy="334347"/>
           </a:xfrm>
           <a:prstGeom prst="roundRect">
             <a:avLst>
@@ -3877,10 +3878,10 @@
           <a:p>
             <a:pPr algn="ctr"/>
             <a:r>
-              <a:rPr lang="en-US" sz="1600" b="1"/>
+              <a:rPr lang="en-US" sz="1400" b="1"/>
               <a:t>RecordController</a:t>
             </a:r>
-            <a:endParaRPr lang="en-SG" sz="1600" b="1" dirty="0"/>
+            <a:endParaRPr lang="en-SG" sz="1400" b="1" dirty="0"/>
           </a:p>
         </p:txBody>
       </p:sp>
@@ -3892,8 +3893,8 @@
         </p:nvSpPr>
         <p:spPr>
           <a:xfrm>
-            <a:off x="1729581" y="5537546"/>
-            <a:ext cx="1882283" cy="381000"/>
+            <a:off x="1673904" y="5512593"/>
+            <a:ext cx="1651800" cy="334347"/>
           </a:xfrm>
           <a:prstGeom prst="roundRect">
             <a:avLst>
@@ -3936,10 +3937,10 @@
           <a:p>
             <a:pPr algn="ctr"/>
             <a:r>
-              <a:rPr lang="en-US" sz="1600" b="1"/>
+              <a:rPr lang="en-US" sz="1400" b="1"/>
               <a:t>WebPageController</a:t>
             </a:r>
-            <a:endParaRPr lang="en-SG" sz="1600" b="1" dirty="0"/>
+            <a:endParaRPr lang="en-SG" sz="1400" b="1" dirty="0"/>
           </a:p>
         </p:txBody>
       </p:sp>
@@ -3951,8 +3952,8 @@
         </p:nvSpPr>
         <p:spPr>
           <a:xfrm>
-            <a:off x="6033396" y="1024039"/>
-            <a:ext cx="1524000" cy="391728"/>
+            <a:off x="6216445" y="1042591"/>
+            <a:ext cx="1337388" cy="568294"/>
           </a:xfrm>
           <a:prstGeom prst="roundRect">
             <a:avLst>
@@ -3993,12 +3994,16 @@
           <a:bodyPr rtlCol="0" anchor="t" anchorCtr="1"/>
           <a:lstStyle/>
           <a:p>
-            <a:pPr algn="ctr"/>
-            <a:r>
-              <a:rPr lang="en-US" sz="1600" b="1"/>
+            <a:pPr algn="ctr">
+              <a:lnSpc>
+                <a:spcPct val="150000"/>
+              </a:lnSpc>
+            </a:pPr>
+            <a:r>
+              <a:rPr lang="en-US" sz="1400" b="1" dirty="0" err="1"/>
               <a:t>GateKeeper</a:t>
             </a:r>
-            <a:endParaRPr lang="en-SG" sz="1600" b="1" dirty="0"/>
+            <a:endParaRPr lang="en-SG" sz="1400" b="1" dirty="0"/>
           </a:p>
         </p:txBody>
       </p:sp>
@@ -4010,8 +4015,8 @@
         </p:nvSpPr>
         <p:spPr>
           <a:xfrm>
-            <a:off x="5807997" y="1761917"/>
-            <a:ext cx="1828800" cy="391728"/>
+            <a:off x="5959186" y="4751657"/>
+            <a:ext cx="1604866" cy="343761"/>
           </a:xfrm>
           <a:prstGeom prst="roundRect">
             <a:avLst>
@@ -4054,10 +4059,10 @@
           <a:p>
             <a:pPr algn="ctr"/>
             <a:r>
-              <a:rPr lang="en-US" sz="1600" b="1" dirty="0" err="1"/>
+              <a:rPr lang="en-US" sz="1400" b="1" dirty="0" err="1"/>
               <a:t>DBMetaDataLogic</a:t>
             </a:r>
-            <a:endParaRPr lang="en-SG" sz="1600" b="1" dirty="0"/>
+            <a:endParaRPr lang="en-SG" sz="1400" b="1" dirty="0"/>
           </a:p>
         </p:txBody>
       </p:sp>
@@ -4069,8 +4074,8 @@
         </p:nvSpPr>
         <p:spPr>
           <a:xfrm>
-            <a:off x="4588797" y="2513189"/>
-            <a:ext cx="3048000" cy="391728"/>
+            <a:off x="4879056" y="2523998"/>
+            <a:ext cx="2674777" cy="343761"/>
           </a:xfrm>
           <a:prstGeom prst="roundRect">
             <a:avLst>
@@ -4113,10 +4118,10 @@
           <a:p>
             <a:pPr algn="ctr"/>
             <a:r>
-              <a:rPr lang="en-US" sz="1600" b="1"/>
+              <a:rPr lang="en-US" sz="1400" b="1"/>
               <a:t>PresentationAccessControlLogic</a:t>
             </a:r>
-            <a:endParaRPr lang="en-SG" sz="1600" b="1" dirty="0"/>
+            <a:endParaRPr lang="en-SG" sz="1400" b="1" dirty="0"/>
           </a:p>
         </p:txBody>
       </p:sp>
@@ -4128,8 +4133,8 @@
         </p:nvSpPr>
         <p:spPr>
           <a:xfrm>
-            <a:off x="5762249" y="3284838"/>
-            <a:ext cx="1828800" cy="391728"/>
+            <a:off x="5948967" y="3104400"/>
+            <a:ext cx="1604866" cy="593486"/>
           </a:xfrm>
           <a:prstGeom prst="roundRect">
             <a:avLst>
@@ -4170,12 +4175,16 @@
           <a:bodyPr rtlCol="0" anchor="t" anchorCtr="1"/>
           <a:lstStyle/>
           <a:p>
-            <a:pPr algn="ctr"/>
-            <a:r>
-              <a:rPr lang="en-US" sz="1600" b="1" dirty="0" err="1"/>
+            <a:pPr algn="ctr">
+              <a:lnSpc>
+                <a:spcPct val="150000"/>
+              </a:lnSpc>
+            </a:pPr>
+            <a:r>
+              <a:rPr lang="en-US" sz="1400" b="1" dirty="0" err="1"/>
               <a:t>PresentationLogic</a:t>
             </a:r>
-            <a:endParaRPr lang="en-SG" sz="1600" b="1" dirty="0"/>
+            <a:endParaRPr lang="en-SG" sz="1400" b="1" dirty="0"/>
           </a:p>
         </p:txBody>
       </p:sp>
@@ -4187,8 +4196,8 @@
         </p:nvSpPr>
         <p:spPr>
           <a:xfrm>
-            <a:off x="5152649" y="4035617"/>
-            <a:ext cx="2438400" cy="391728"/>
+            <a:off x="5414011" y="4020015"/>
+            <a:ext cx="2139822" cy="343762"/>
           </a:xfrm>
           <a:prstGeom prst="roundRect">
             <a:avLst>
@@ -4231,10 +4240,10 @@
           <a:p>
             <a:pPr algn="ctr"/>
             <a:r>
-              <a:rPr lang="en-US" sz="1600" b="1"/>
+              <a:rPr lang="en-US" sz="1400" b="1"/>
               <a:t>PresentationSectionLogic</a:t>
             </a:r>
-            <a:endParaRPr lang="en-SG" sz="1600" b="1" dirty="0"/>
+            <a:endParaRPr lang="en-SG" sz="1400" b="1" dirty="0"/>
           </a:p>
         </p:txBody>
       </p:sp>
@@ -4246,8 +4255,8 @@
         </p:nvSpPr>
         <p:spPr>
           <a:xfrm>
-            <a:off x="5791604" y="4757861"/>
-            <a:ext cx="1828800" cy="391728"/>
+            <a:off x="5961423" y="1761999"/>
+            <a:ext cx="1604866" cy="343761"/>
           </a:xfrm>
           <a:prstGeom prst="roundRect">
             <a:avLst>
@@ -4290,57 +4299,13 @@
           <a:p>
             <a:pPr algn="ctr"/>
             <a:r>
-              <a:rPr lang="en-US" sz="1600" b="1" dirty="0" err="1"/>
+              <a:rPr lang="en-US" sz="1400" b="1" dirty="0" err="1"/>
               <a:t>RecordLogic</a:t>
             </a:r>
-            <a:endParaRPr lang="en-SG" sz="1600" b="1" dirty="0"/>
-          </a:p>
-        </p:txBody>
-      </p:sp>
-      <p:cxnSp>
-        <p:nvCxnSpPr>
-          <p:cNvPr id="22" name="Elbow Connector 182"/>
-          <p:cNvCxnSpPr>
-            <a:cxnSpLocks/>
-            <a:stCxn id="5" idx="3"/>
-            <a:endCxn id="13" idx="1"/>
-          </p:cNvCxnSpPr>
-          <p:nvPr/>
-        </p:nvCxnSpPr>
-        <p:spPr>
-          <a:xfrm>
-            <a:off x="3601581" y="445294"/>
-            <a:ext cx="2431815" cy="774609"/>
-          </a:xfrm>
-          <a:prstGeom prst="straightConnector1">
-            <a:avLst/>
-          </a:prstGeom>
-          <a:ln w="38100">
-            <a:solidFill>
-              <a:schemeClr val="accent1">
-                <a:lumMod val="75000"/>
-              </a:schemeClr>
-            </a:solidFill>
-            <a:prstDash val="solid"/>
-            <a:headEnd type="none" w="med" len="med"/>
-            <a:tailEnd type="triangle" w="med" len="med"/>
-          </a:ln>
-        </p:spPr>
-        <p:style>
-          <a:lnRef idx="1">
-            <a:schemeClr val="accent1"/>
-          </a:lnRef>
-          <a:fillRef idx="0">
-            <a:schemeClr val="accent1"/>
-          </a:fillRef>
-          <a:effectRef idx="0">
-            <a:schemeClr val="accent1"/>
-          </a:effectRef>
-          <a:fontRef idx="minor">
-            <a:schemeClr val="tx1"/>
-          </a:fontRef>
-        </p:style>
-      </p:cxnSp>
+            <a:endParaRPr lang="en-SG" sz="1400" b="1" dirty="0"/>
+          </a:p>
+        </p:txBody>
+      </p:sp>
       <p:cxnSp>
         <p:nvCxnSpPr>
           <p:cNvPr id="25" name="Elbow Connector 182"/>
@@ -4353,52 +4318,8 @@
         </p:nvCxnSpPr>
         <p:spPr>
           <a:xfrm>
-            <a:off x="3601581" y="445294"/>
-            <a:ext cx="2431815" cy="5364"/>
-          </a:xfrm>
-          <a:prstGeom prst="straightConnector1">
-            <a:avLst/>
-          </a:prstGeom>
-          <a:ln w="38100">
-            <a:solidFill>
-              <a:schemeClr val="accent1">
-                <a:lumMod val="75000"/>
-              </a:schemeClr>
-            </a:solidFill>
-            <a:prstDash val="solid"/>
-            <a:headEnd type="none" w="med" len="med"/>
-            <a:tailEnd type="triangle" w="med" len="med"/>
-          </a:ln>
-        </p:spPr>
-        <p:style>
-          <a:lnRef idx="1">
-            <a:schemeClr val="accent1"/>
-          </a:lnRef>
-          <a:fillRef idx="0">
-            <a:schemeClr val="accent1"/>
-          </a:fillRef>
-          <a:effectRef idx="0">
-            <a:schemeClr val="accent1"/>
-          </a:effectRef>
-          <a:fontRef idx="minor">
-            <a:schemeClr val="tx1"/>
-          </a:fontRef>
-        </p:style>
-      </p:cxnSp>
-      <p:cxnSp>
-        <p:nvCxnSpPr>
-          <p:cNvPr id="28" name="Elbow Connector 182"/>
-          <p:cNvCxnSpPr>
-            <a:cxnSpLocks/>
-            <a:stCxn id="5" idx="3"/>
-            <a:endCxn id="16" idx="1"/>
-          </p:cNvCxnSpPr>
-          <p:nvPr/>
-        </p:nvCxnSpPr>
-        <p:spPr>
-          <a:xfrm>
-            <a:off x="3601581" y="445294"/>
-            <a:ext cx="2160668" cy="3035408"/>
+            <a:off x="3389119" y="455360"/>
+            <a:ext cx="2827326" cy="4707"/>
           </a:xfrm>
           <a:prstGeom prst="straightConnector1">
             <a:avLst/>
@@ -4435,14 +4356,13 @@
           <p:cNvCxnSpPr>
             <a:cxnSpLocks/>
             <a:stCxn id="6" idx="3"/>
-            <a:endCxn id="13" idx="1"/>
           </p:cNvCxnSpPr>
           <p:nvPr/>
         </p:nvCxnSpPr>
         <p:spPr>
           <a:xfrm>
-            <a:off x="3601581" y="1207294"/>
-            <a:ext cx="2431815" cy="12609"/>
+            <a:off x="3387627" y="1183968"/>
+            <a:ext cx="2828818" cy="12997"/>
           </a:xfrm>
           <a:prstGeom prst="straightConnector1">
             <a:avLst/>
@@ -4485,8 +4405,8 @@
         </p:nvCxnSpPr>
         <p:spPr>
           <a:xfrm>
-            <a:off x="3601581" y="1952418"/>
-            <a:ext cx="2206416" cy="5363"/>
+            <a:off x="3325704" y="4918831"/>
+            <a:ext cx="2633482" cy="4707"/>
           </a:xfrm>
           <a:prstGeom prst="straightConnector1">
             <a:avLst/>
@@ -4529,96 +4449,8 @@
         </p:nvCxnSpPr>
         <p:spPr>
           <a:xfrm flipV="1">
-            <a:off x="3601581" y="2709053"/>
-            <a:ext cx="987216" cy="5365"/>
-          </a:xfrm>
-          <a:prstGeom prst="straightConnector1">
-            <a:avLst/>
-          </a:prstGeom>
-          <a:ln w="38100">
-            <a:solidFill>
-              <a:schemeClr val="accent1">
-                <a:lumMod val="75000"/>
-              </a:schemeClr>
-            </a:solidFill>
-            <a:prstDash val="solid"/>
-            <a:headEnd type="none" w="med" len="med"/>
-            <a:tailEnd type="triangle" w="med" len="med"/>
-          </a:ln>
-        </p:spPr>
-        <p:style>
-          <a:lnRef idx="1">
-            <a:schemeClr val="accent1"/>
-          </a:lnRef>
-          <a:fillRef idx="0">
-            <a:schemeClr val="accent1"/>
-          </a:fillRef>
-          <a:effectRef idx="0">
-            <a:schemeClr val="accent1"/>
-          </a:effectRef>
-          <a:fontRef idx="minor">
-            <a:schemeClr val="tx1"/>
-          </a:fontRef>
-        </p:style>
-      </p:cxnSp>
-      <p:cxnSp>
-        <p:nvCxnSpPr>
-          <p:cNvPr id="40" name="Elbow Connector 182"/>
-          <p:cNvCxnSpPr>
-            <a:cxnSpLocks/>
-            <a:stCxn id="8" idx="3"/>
-            <a:endCxn id="13" idx="1"/>
-          </p:cNvCxnSpPr>
-          <p:nvPr/>
-        </p:nvCxnSpPr>
-        <p:spPr>
-          <a:xfrm flipV="1">
-            <a:off x="3601581" y="1219903"/>
-            <a:ext cx="2431815" cy="1494515"/>
-          </a:xfrm>
-          <a:prstGeom prst="straightConnector1">
-            <a:avLst/>
-          </a:prstGeom>
-          <a:ln w="38100">
-            <a:solidFill>
-              <a:schemeClr val="accent1">
-                <a:lumMod val="75000"/>
-              </a:schemeClr>
-            </a:solidFill>
-            <a:prstDash val="solid"/>
-            <a:headEnd type="none" w="med" len="med"/>
-            <a:tailEnd type="triangle" w="med" len="med"/>
-          </a:ln>
-        </p:spPr>
-        <p:style>
-          <a:lnRef idx="1">
-            <a:schemeClr val="accent1"/>
-          </a:lnRef>
-          <a:fillRef idx="0">
-            <a:schemeClr val="accent1"/>
-          </a:fillRef>
-          <a:effectRef idx="0">
-            <a:schemeClr val="accent1"/>
-          </a:effectRef>
-          <a:fontRef idx="minor">
-            <a:schemeClr val="tx1"/>
-          </a:fontRef>
-        </p:style>
-      </p:cxnSp>
-      <p:cxnSp>
-        <p:nvCxnSpPr>
-          <p:cNvPr id="43" name="Elbow Connector 182"/>
-          <p:cNvCxnSpPr>
-            <a:cxnSpLocks/>
-            <a:stCxn id="8" idx="3"/>
-            <a:endCxn id="16" idx="1"/>
-          </p:cNvCxnSpPr>
-          <p:nvPr/>
-        </p:nvCxnSpPr>
-        <p:spPr>
-          <a:xfrm>
-            <a:off x="3601581" y="2714418"/>
-            <a:ext cx="2160668" cy="766284"/>
+            <a:off x="3348139" y="2695879"/>
+            <a:ext cx="1530917" cy="3395"/>
           </a:xfrm>
           <a:prstGeom prst="straightConnector1">
             <a:avLst/>
@@ -4661,8 +4493,8 @@
         </p:nvCxnSpPr>
         <p:spPr>
           <a:xfrm>
-            <a:off x="3601581" y="3476418"/>
-            <a:ext cx="2160668" cy="4284"/>
+            <a:off x="3331027" y="3391725"/>
+            <a:ext cx="2617940" cy="9418"/>
           </a:xfrm>
           <a:prstGeom prst="straightConnector1">
             <a:avLst/>
@@ -4695,18 +4527,1752 @@
       </p:cxnSp>
       <p:cxnSp>
         <p:nvCxnSpPr>
-          <p:cNvPr id="49" name="Elbow Connector 182"/>
+          <p:cNvPr id="52" name="Elbow Connector 182"/>
+          <p:cNvCxnSpPr>
+            <a:cxnSpLocks/>
+          </p:cNvCxnSpPr>
+          <p:nvPr/>
+        </p:nvCxnSpPr>
+        <p:spPr>
+          <a:xfrm flipV="1">
+            <a:off x="3325704" y="4293394"/>
+            <a:ext cx="2088307" cy="15014"/>
+          </a:xfrm>
+          <a:prstGeom prst="straightConnector1">
+            <a:avLst/>
+          </a:prstGeom>
+          <a:ln w="38100">
+            <a:solidFill>
+              <a:schemeClr val="accent1">
+                <a:lumMod val="75000"/>
+              </a:schemeClr>
+            </a:solidFill>
+            <a:prstDash val="solid"/>
+            <a:headEnd type="none" w="med" len="med"/>
+            <a:tailEnd type="triangle" w="med" len="med"/>
+          </a:ln>
+        </p:spPr>
+        <p:style>
+          <a:lnRef idx="1">
+            <a:schemeClr val="accent1"/>
+          </a:lnRef>
+          <a:fillRef idx="0">
+            <a:schemeClr val="accent1"/>
+          </a:fillRef>
+          <a:effectRef idx="0">
+            <a:schemeClr val="accent1"/>
+          </a:effectRef>
+          <a:fontRef idx="minor">
+            <a:schemeClr val="tx1"/>
+          </a:fontRef>
+        </p:style>
+      </p:cxnSp>
+      <p:cxnSp>
+        <p:nvCxnSpPr>
+          <p:cNvPr id="58" name="Elbow Connector 182"/>
+          <p:cNvCxnSpPr>
+            <a:cxnSpLocks/>
+            <a:stCxn id="11" idx="3"/>
+            <a:endCxn id="18" idx="1"/>
+          </p:cNvCxnSpPr>
+          <p:nvPr/>
+        </p:nvCxnSpPr>
+        <p:spPr>
+          <a:xfrm flipV="1">
+            <a:off x="3351123" y="1933880"/>
+            <a:ext cx="2610300" cy="9626"/>
+          </a:xfrm>
+          <a:prstGeom prst="straightConnector1">
+            <a:avLst/>
+          </a:prstGeom>
+          <a:ln w="38100">
+            <a:solidFill>
+              <a:schemeClr val="accent1">
+                <a:lumMod val="75000"/>
+              </a:schemeClr>
+            </a:solidFill>
+            <a:prstDash val="solid"/>
+            <a:headEnd type="none" w="med" len="med"/>
+            <a:tailEnd type="triangle" w="med" len="med"/>
+          </a:ln>
+        </p:spPr>
+        <p:style>
+          <a:lnRef idx="1">
+            <a:schemeClr val="accent1"/>
+          </a:lnRef>
+          <a:fillRef idx="0">
+            <a:schemeClr val="accent1"/>
+          </a:fillRef>
+          <a:effectRef idx="0">
+            <a:schemeClr val="accent1"/>
+          </a:effectRef>
+          <a:fontRef idx="minor">
+            <a:schemeClr val="tx1"/>
+          </a:fontRef>
+        </p:style>
+      </p:cxnSp>
+      <p:cxnSp>
+        <p:nvCxnSpPr>
+          <p:cNvPr id="61" name="Elbow Connector 182"/>
+          <p:cNvCxnSpPr>
+            <a:cxnSpLocks/>
+            <a:stCxn id="12" idx="3"/>
+            <a:endCxn id="65" idx="1"/>
+          </p:cNvCxnSpPr>
+          <p:nvPr/>
+        </p:nvCxnSpPr>
+        <p:spPr>
+          <a:xfrm>
+            <a:off x="3325704" y="5679767"/>
+            <a:ext cx="774911" cy="0"/>
+          </a:xfrm>
+          <a:prstGeom prst="straightConnector1">
+            <a:avLst/>
+          </a:prstGeom>
+          <a:ln w="38100">
+            <a:solidFill>
+              <a:schemeClr val="accent1">
+                <a:lumMod val="75000"/>
+              </a:schemeClr>
+            </a:solidFill>
+            <a:prstDash val="solid"/>
+            <a:headEnd type="none" w="med" len="med"/>
+            <a:tailEnd type="triangle" w="med" len="med"/>
+          </a:ln>
+        </p:spPr>
+        <p:style>
+          <a:lnRef idx="1">
+            <a:schemeClr val="accent1"/>
+          </a:lnRef>
+          <a:fillRef idx="0">
+            <a:schemeClr val="accent1"/>
+          </a:fillRef>
+          <a:effectRef idx="0">
+            <a:schemeClr val="accent1"/>
+          </a:effectRef>
+          <a:fontRef idx="minor">
+            <a:schemeClr val="tx1"/>
+          </a:fontRef>
+        </p:style>
+      </p:cxnSp>
+      <p:sp>
+        <p:nvSpPr>
+          <p:cNvPr id="65" name="Vertical Scroll 64"/>
+          <p:cNvSpPr/>
+          <p:nvPr/>
+        </p:nvSpPr>
+        <p:spPr>
+          <a:xfrm>
+            <a:off x="4017373" y="5346800"/>
+            <a:ext cx="1567070" cy="665934"/>
+          </a:xfrm>
+          <a:prstGeom prst="verticalScroll">
+            <a:avLst/>
+          </a:prstGeom>
+        </p:spPr>
+        <p:style>
+          <a:lnRef idx="2">
+            <a:schemeClr val="accent1">
+              <a:shade val="50000"/>
+            </a:schemeClr>
+          </a:lnRef>
+          <a:fillRef idx="1">
+            <a:schemeClr val="accent1"/>
+          </a:fillRef>
+          <a:effectRef idx="0">
+            <a:schemeClr val="accent1"/>
+          </a:effectRef>
+          <a:fontRef idx="minor">
+            <a:schemeClr val="lt1"/>
+          </a:fontRef>
+        </p:style>
+        <p:txBody>
+          <a:bodyPr rtlCol="0" anchor="ctr"/>
+          <a:lstStyle/>
+          <a:p>
+            <a:pPr algn="ctr"/>
+            <a:r>
+              <a:rPr lang="en-US" sz="1600" dirty="0"/>
+              <a:t>*.</a:t>
+            </a:r>
+            <a:r>
+              <a:rPr lang="en-US" sz="1600" dirty="0" err="1"/>
+              <a:t>js</a:t>
+            </a:r>
+            <a:r>
+              <a:rPr lang="en-US" sz="1600" dirty="0"/>
+              <a:t> / *.html / *.</a:t>
+            </a:r>
+            <a:r>
+              <a:rPr lang="en-US" sz="1600" dirty="0" err="1"/>
+              <a:t>css</a:t>
+            </a:r>
+            <a:endParaRPr lang="en-US" sz="1600" dirty="0"/>
+          </a:p>
+        </p:txBody>
+      </p:sp>
+      <p:sp>
+        <p:nvSpPr>
+          <p:cNvPr id="36" name="Rounded Rectangle 35"/>
+          <p:cNvSpPr/>
+          <p:nvPr/>
+        </p:nvSpPr>
+        <p:spPr>
+          <a:xfrm>
+            <a:off x="8026452" y="254794"/>
+            <a:ext cx="450112" cy="4772478"/>
+          </a:xfrm>
+          <a:prstGeom prst="roundRect">
+            <a:avLst>
+              <a:gd name="adj" fmla="val 9190"/>
+            </a:avLst>
+          </a:prstGeom>
+          <a:solidFill>
+            <a:schemeClr val="accent3">
+              <a:lumMod val="60000"/>
+              <a:lumOff val="40000"/>
+            </a:schemeClr>
+          </a:solidFill>
+          <a:ln>
+            <a:solidFill>
+              <a:schemeClr val="accent3">
+                <a:lumMod val="75000"/>
+              </a:schemeClr>
+            </a:solidFill>
+          </a:ln>
+        </p:spPr>
+        <p:style>
+          <a:lnRef idx="2">
+            <a:schemeClr val="accent1">
+              <a:shade val="50000"/>
+            </a:schemeClr>
+          </a:lnRef>
+          <a:fillRef idx="1">
+            <a:schemeClr val="accent1"/>
+          </a:fillRef>
+          <a:effectRef idx="0">
+            <a:schemeClr val="accent1"/>
+          </a:effectRef>
+          <a:fontRef idx="minor">
+            <a:schemeClr val="lt1"/>
+          </a:fontRef>
+        </p:style>
+        <p:txBody>
+          <a:bodyPr vert="vert270" rtlCol="0" anchor="t" anchorCtr="0"/>
+          <a:lstStyle/>
+          <a:p>
+            <a:pPr algn="ctr"/>
+            <a:r>
+              <a:rPr lang="en-US" sz="1400" b="1"/>
+              <a:t>Storage</a:t>
+            </a:r>
+            <a:endParaRPr lang="en-SG" sz="1400" b="1" dirty="0"/>
+          </a:p>
+        </p:txBody>
+      </p:sp>
+      <p:cxnSp>
+        <p:nvCxnSpPr>
+          <p:cNvPr id="47" name="Elbow Connector 182"/>
+          <p:cNvCxnSpPr>
+            <a:cxnSpLocks/>
+            <a:stCxn id="4" idx="3"/>
+          </p:cNvCxnSpPr>
+          <p:nvPr/>
+        </p:nvCxnSpPr>
+        <p:spPr>
+          <a:xfrm>
+            <a:off x="7553833" y="460067"/>
+            <a:ext cx="472619" cy="0"/>
+          </a:xfrm>
+          <a:prstGeom prst="straightConnector1">
+            <a:avLst/>
+          </a:prstGeom>
+          <a:ln w="38100">
+            <a:solidFill>
+              <a:schemeClr val="accent4"/>
+            </a:solidFill>
+            <a:prstDash val="solid"/>
+            <a:headEnd type="none" w="med" len="med"/>
+            <a:tailEnd type="triangle" w="med" len="med"/>
+          </a:ln>
+        </p:spPr>
+        <p:style>
+          <a:lnRef idx="1">
+            <a:schemeClr val="accent1"/>
+          </a:lnRef>
+          <a:fillRef idx="0">
+            <a:schemeClr val="accent1"/>
+          </a:fillRef>
+          <a:effectRef idx="0">
+            <a:schemeClr val="accent1"/>
+          </a:effectRef>
+          <a:fontRef idx="minor">
+            <a:schemeClr val="tx1"/>
+          </a:fontRef>
+        </p:style>
+      </p:cxnSp>
+      <p:cxnSp>
+        <p:nvCxnSpPr>
+          <p:cNvPr id="57" name="Elbow Connector 182"/>
+          <p:cNvCxnSpPr>
+            <a:cxnSpLocks/>
+          </p:cNvCxnSpPr>
+          <p:nvPr/>
+        </p:nvCxnSpPr>
+        <p:spPr>
+          <a:xfrm>
+            <a:off x="7568633" y="1932564"/>
+            <a:ext cx="457819" cy="0"/>
+          </a:xfrm>
+          <a:prstGeom prst="straightConnector1">
+            <a:avLst/>
+          </a:prstGeom>
+          <a:ln w="38100">
+            <a:solidFill>
+              <a:schemeClr val="accent4"/>
+            </a:solidFill>
+            <a:prstDash val="solid"/>
+            <a:headEnd type="none" w="med" len="med"/>
+            <a:tailEnd type="triangle" w="med" len="med"/>
+          </a:ln>
+        </p:spPr>
+        <p:style>
+          <a:lnRef idx="1">
+            <a:schemeClr val="accent1"/>
+          </a:lnRef>
+          <a:fillRef idx="0">
+            <a:schemeClr val="accent1"/>
+          </a:fillRef>
+          <a:effectRef idx="0">
+            <a:schemeClr val="accent1"/>
+          </a:effectRef>
+          <a:fontRef idx="minor">
+            <a:schemeClr val="tx1"/>
+          </a:fontRef>
+        </p:style>
+      </p:cxnSp>
+      <p:cxnSp>
+        <p:nvCxnSpPr>
+          <p:cNvPr id="63" name="Elbow Connector 182">
+            <a:extLst>
+              <a:ext uri="{FF2B5EF4-FFF2-40B4-BE49-F238E27FC236}">
+                <a16:creationId xmlns:a16="http://schemas.microsoft.com/office/drawing/2014/main" id="{1BC29DFD-C30A-4F01-BA71-66B3ED764DEE}"/>
+              </a:ext>
+            </a:extLst>
+          </p:cNvPr>
+          <p:cNvCxnSpPr>
+            <a:cxnSpLocks/>
+          </p:cNvCxnSpPr>
+          <p:nvPr/>
+        </p:nvCxnSpPr>
+        <p:spPr>
+          <a:xfrm>
+            <a:off x="7553833" y="2699274"/>
+            <a:ext cx="457819" cy="0"/>
+          </a:xfrm>
+          <a:prstGeom prst="straightConnector1">
+            <a:avLst/>
+          </a:prstGeom>
+          <a:ln w="38100">
+            <a:solidFill>
+              <a:schemeClr val="accent4"/>
+            </a:solidFill>
+            <a:prstDash val="solid"/>
+            <a:headEnd type="none" w="med" len="med"/>
+            <a:tailEnd type="triangle" w="med" len="med"/>
+          </a:ln>
+        </p:spPr>
+        <p:style>
+          <a:lnRef idx="1">
+            <a:schemeClr val="accent1"/>
+          </a:lnRef>
+          <a:fillRef idx="0">
+            <a:schemeClr val="accent1"/>
+          </a:fillRef>
+          <a:effectRef idx="0">
+            <a:schemeClr val="accent1"/>
+          </a:effectRef>
+          <a:fontRef idx="minor">
+            <a:schemeClr val="tx1"/>
+          </a:fontRef>
+        </p:style>
+      </p:cxnSp>
+      <p:cxnSp>
+        <p:nvCxnSpPr>
+          <p:cNvPr id="64" name="Elbow Connector 182">
+            <a:extLst>
+              <a:ext uri="{FF2B5EF4-FFF2-40B4-BE49-F238E27FC236}">
+                <a16:creationId xmlns:a16="http://schemas.microsoft.com/office/drawing/2014/main" id="{984978AA-6C73-4DC1-8DA8-EB7BDFC15E87}"/>
+              </a:ext>
+            </a:extLst>
+          </p:cNvPr>
+          <p:cNvCxnSpPr>
+            <a:cxnSpLocks/>
+          </p:cNvCxnSpPr>
+          <p:nvPr/>
+        </p:nvCxnSpPr>
+        <p:spPr>
+          <a:xfrm>
+            <a:off x="7570945" y="3453091"/>
+            <a:ext cx="457819" cy="0"/>
+          </a:xfrm>
+          <a:prstGeom prst="straightConnector1">
+            <a:avLst/>
+          </a:prstGeom>
+          <a:ln w="38100">
+            <a:solidFill>
+              <a:schemeClr val="accent4"/>
+            </a:solidFill>
+            <a:prstDash val="solid"/>
+            <a:headEnd type="none" w="med" len="med"/>
+            <a:tailEnd type="triangle" w="med" len="med"/>
+          </a:ln>
+        </p:spPr>
+        <p:style>
+          <a:lnRef idx="1">
+            <a:schemeClr val="accent1"/>
+          </a:lnRef>
+          <a:fillRef idx="0">
+            <a:schemeClr val="accent1"/>
+          </a:fillRef>
+          <a:effectRef idx="0">
+            <a:schemeClr val="accent1"/>
+          </a:effectRef>
+          <a:fontRef idx="minor">
+            <a:schemeClr val="tx1"/>
+          </a:fontRef>
+        </p:style>
+      </p:cxnSp>
+      <p:cxnSp>
+        <p:nvCxnSpPr>
+          <p:cNvPr id="66" name="Elbow Connector 182">
+            <a:extLst>
+              <a:ext uri="{FF2B5EF4-FFF2-40B4-BE49-F238E27FC236}">
+                <a16:creationId xmlns:a16="http://schemas.microsoft.com/office/drawing/2014/main" id="{073ADD41-E8F2-4C81-A1ED-47A479776310}"/>
+              </a:ext>
+            </a:extLst>
+          </p:cNvPr>
+          <p:cNvCxnSpPr>
+            <a:cxnSpLocks/>
+          </p:cNvCxnSpPr>
+          <p:nvPr/>
+        </p:nvCxnSpPr>
+        <p:spPr>
+          <a:xfrm>
+            <a:off x="7553833" y="4215091"/>
+            <a:ext cx="457819" cy="0"/>
+          </a:xfrm>
+          <a:prstGeom prst="straightConnector1">
+            <a:avLst/>
+          </a:prstGeom>
+          <a:ln w="38100">
+            <a:solidFill>
+              <a:schemeClr val="accent4"/>
+            </a:solidFill>
+            <a:prstDash val="solid"/>
+            <a:headEnd type="none" w="med" len="med"/>
+            <a:tailEnd type="triangle" w="med" len="med"/>
+          </a:ln>
+        </p:spPr>
+        <p:style>
+          <a:lnRef idx="1">
+            <a:schemeClr val="accent1"/>
+          </a:lnRef>
+          <a:fillRef idx="0">
+            <a:schemeClr val="accent1"/>
+          </a:fillRef>
+          <a:effectRef idx="0">
+            <a:schemeClr val="accent1"/>
+          </a:effectRef>
+          <a:fontRef idx="minor">
+            <a:schemeClr val="tx1"/>
+          </a:fontRef>
+        </p:style>
+      </p:cxnSp>
+      <p:cxnSp>
+        <p:nvCxnSpPr>
+          <p:cNvPr id="92" name="Connector: Elbow 91">
+            <a:extLst>
+              <a:ext uri="{FF2B5EF4-FFF2-40B4-BE49-F238E27FC236}">
+                <a16:creationId xmlns:a16="http://schemas.microsoft.com/office/drawing/2014/main" id="{540D21D2-1F29-4FAB-B492-58E6A768BF50}"/>
+              </a:ext>
+            </a:extLst>
+          </p:cNvPr>
+          <p:cNvCxnSpPr>
+            <a:cxnSpLocks/>
+          </p:cNvCxnSpPr>
+          <p:nvPr/>
+        </p:nvCxnSpPr>
+        <p:spPr>
+          <a:xfrm>
+            <a:off x="3402427" y="566447"/>
+            <a:ext cx="2814017" cy="532535"/>
+          </a:xfrm>
+          <a:prstGeom prst="bentConnector3">
+            <a:avLst>
+              <a:gd name="adj1" fmla="val 85449"/>
+            </a:avLst>
+          </a:prstGeom>
+          <a:ln w="38100">
+            <a:solidFill>
+              <a:schemeClr val="accent1">
+                <a:lumMod val="75000"/>
+              </a:schemeClr>
+            </a:solidFill>
+            <a:tailEnd type="triangle"/>
+          </a:ln>
+        </p:spPr>
+        <p:style>
+          <a:lnRef idx="2">
+            <a:schemeClr val="accent1"/>
+          </a:lnRef>
+          <a:fillRef idx="0">
+            <a:schemeClr val="accent1"/>
+          </a:fillRef>
+          <a:effectRef idx="1">
+            <a:schemeClr val="accent1"/>
+          </a:effectRef>
+          <a:fontRef idx="minor">
+            <a:schemeClr val="tx1"/>
+          </a:fontRef>
+        </p:style>
+      </p:cxnSp>
+      <p:cxnSp>
+        <p:nvCxnSpPr>
+          <p:cNvPr id="114" name="Connector: Elbow 113">
+            <a:extLst>
+              <a:ext uri="{FF2B5EF4-FFF2-40B4-BE49-F238E27FC236}">
+                <a16:creationId xmlns:a16="http://schemas.microsoft.com/office/drawing/2014/main" id="{6348098C-FDD4-4716-8331-19DB4BD6064B}"/>
+              </a:ext>
+            </a:extLst>
+          </p:cNvPr>
+          <p:cNvCxnSpPr>
+            <a:cxnSpLocks/>
+          </p:cNvCxnSpPr>
+          <p:nvPr/>
+        </p:nvCxnSpPr>
+        <p:spPr>
+          <a:xfrm flipV="1">
+            <a:off x="3360595" y="1269926"/>
+            <a:ext cx="2856766" cy="552203"/>
+          </a:xfrm>
+          <a:prstGeom prst="bentConnector3">
+            <a:avLst>
+              <a:gd name="adj1" fmla="val 11881"/>
+            </a:avLst>
+          </a:prstGeom>
+          <a:ln w="38100">
+            <a:solidFill>
+              <a:schemeClr val="accent1">
+                <a:lumMod val="75000"/>
+              </a:schemeClr>
+            </a:solidFill>
+            <a:tailEnd type="triangle"/>
+          </a:ln>
+        </p:spPr>
+        <p:style>
+          <a:lnRef idx="2">
+            <a:schemeClr val="accent1"/>
+          </a:lnRef>
+          <a:fillRef idx="0">
+            <a:schemeClr val="accent1"/>
+          </a:fillRef>
+          <a:effectRef idx="1">
+            <a:schemeClr val="accent1"/>
+          </a:effectRef>
+          <a:fontRef idx="minor">
+            <a:schemeClr val="tx1"/>
+          </a:fontRef>
+        </p:style>
+      </p:cxnSp>
+      <p:cxnSp>
+        <p:nvCxnSpPr>
+          <p:cNvPr id="120" name="Connector: Elbow 119">
+            <a:extLst>
+              <a:ext uri="{FF2B5EF4-FFF2-40B4-BE49-F238E27FC236}">
+                <a16:creationId xmlns:a16="http://schemas.microsoft.com/office/drawing/2014/main" id="{5253B7BD-07B6-4303-8938-C8022F3D94D5}"/>
+              </a:ext>
+            </a:extLst>
+          </p:cNvPr>
+          <p:cNvCxnSpPr>
+            <a:cxnSpLocks/>
+          </p:cNvCxnSpPr>
+          <p:nvPr/>
+        </p:nvCxnSpPr>
+        <p:spPr>
+          <a:xfrm flipV="1">
+            <a:off x="3360595" y="1361804"/>
+            <a:ext cx="2853506" cy="1206031"/>
+          </a:xfrm>
+          <a:prstGeom prst="bentConnector3">
+            <a:avLst>
+              <a:gd name="adj1" fmla="val 15042"/>
+            </a:avLst>
+          </a:prstGeom>
+          <a:ln w="38100">
+            <a:solidFill>
+              <a:schemeClr val="accent1">
+                <a:lumMod val="75000"/>
+              </a:schemeClr>
+            </a:solidFill>
+            <a:tailEnd type="triangle"/>
+          </a:ln>
+        </p:spPr>
+        <p:style>
+          <a:lnRef idx="2">
+            <a:schemeClr val="accent1"/>
+          </a:lnRef>
+          <a:fillRef idx="0">
+            <a:schemeClr val="accent1"/>
+          </a:fillRef>
+          <a:effectRef idx="1">
+            <a:schemeClr val="accent1"/>
+          </a:effectRef>
+          <a:fontRef idx="minor">
+            <a:schemeClr val="tx1"/>
+          </a:fontRef>
+        </p:style>
+      </p:cxnSp>
+      <p:cxnSp>
+        <p:nvCxnSpPr>
+          <p:cNvPr id="125" name="Connector: Elbow 124">
+            <a:extLst>
+              <a:ext uri="{FF2B5EF4-FFF2-40B4-BE49-F238E27FC236}">
+                <a16:creationId xmlns:a16="http://schemas.microsoft.com/office/drawing/2014/main" id="{5F816C07-C942-46B9-8781-E937294C5C4B}"/>
+              </a:ext>
+            </a:extLst>
+          </p:cNvPr>
+          <p:cNvCxnSpPr>
+            <a:cxnSpLocks/>
+          </p:cNvCxnSpPr>
+          <p:nvPr/>
+        </p:nvCxnSpPr>
+        <p:spPr>
+          <a:xfrm flipV="1">
+            <a:off x="3340499" y="1453334"/>
+            <a:ext cx="2874302" cy="1809790"/>
+          </a:xfrm>
+          <a:prstGeom prst="bentConnector3">
+            <a:avLst>
+              <a:gd name="adj1" fmla="val 19344"/>
+            </a:avLst>
+          </a:prstGeom>
+          <a:ln w="38100">
+            <a:solidFill>
+              <a:schemeClr val="accent1">
+                <a:lumMod val="75000"/>
+              </a:schemeClr>
+            </a:solidFill>
+            <a:tailEnd type="triangle"/>
+          </a:ln>
+        </p:spPr>
+        <p:style>
+          <a:lnRef idx="2">
+            <a:schemeClr val="accent1"/>
+          </a:lnRef>
+          <a:fillRef idx="0">
+            <a:schemeClr val="accent1"/>
+          </a:fillRef>
+          <a:effectRef idx="1">
+            <a:schemeClr val="accent1"/>
+          </a:effectRef>
+          <a:fontRef idx="minor">
+            <a:schemeClr val="tx1"/>
+          </a:fontRef>
+        </p:style>
+      </p:cxnSp>
+      <p:cxnSp>
+        <p:nvCxnSpPr>
+          <p:cNvPr id="131" name="Connector: Elbow 130">
+            <a:extLst>
+              <a:ext uri="{FF2B5EF4-FFF2-40B4-BE49-F238E27FC236}">
+                <a16:creationId xmlns:a16="http://schemas.microsoft.com/office/drawing/2014/main" id="{428AA816-5160-441F-A5A9-CADB5AB4127E}"/>
+              </a:ext>
+            </a:extLst>
+          </p:cNvPr>
+          <p:cNvCxnSpPr>
+            <a:cxnSpLocks/>
+          </p:cNvCxnSpPr>
+          <p:nvPr/>
+        </p:nvCxnSpPr>
+        <p:spPr>
+          <a:xfrm flipV="1">
+            <a:off x="3331027" y="1560473"/>
+            <a:ext cx="2883074" cy="2498550"/>
+          </a:xfrm>
+          <a:prstGeom prst="bentConnector3">
+            <a:avLst>
+              <a:gd name="adj1" fmla="val 23762"/>
+            </a:avLst>
+          </a:prstGeom>
+          <a:ln w="38100">
+            <a:solidFill>
+              <a:schemeClr val="accent1">
+                <a:lumMod val="75000"/>
+              </a:schemeClr>
+            </a:solidFill>
+            <a:tailEnd type="triangle"/>
+          </a:ln>
+        </p:spPr>
+        <p:style>
+          <a:lnRef idx="2">
+            <a:schemeClr val="accent1"/>
+          </a:lnRef>
+          <a:fillRef idx="0">
+            <a:schemeClr val="accent1"/>
+          </a:fillRef>
+          <a:effectRef idx="1">
+            <a:schemeClr val="accent1"/>
+          </a:effectRef>
+          <a:fontRef idx="minor">
+            <a:schemeClr val="tx1"/>
+          </a:fontRef>
+        </p:style>
+      </p:cxnSp>
+      <p:cxnSp>
+        <p:nvCxnSpPr>
+          <p:cNvPr id="153" name="Connector: Elbow 152">
+            <a:extLst>
+              <a:ext uri="{FF2B5EF4-FFF2-40B4-BE49-F238E27FC236}">
+                <a16:creationId xmlns:a16="http://schemas.microsoft.com/office/drawing/2014/main" id="{744FD7B4-2562-405D-8D42-ECC6719BD4CB}"/>
+              </a:ext>
+            </a:extLst>
+          </p:cNvPr>
+          <p:cNvCxnSpPr>
+            <a:cxnSpLocks/>
+          </p:cNvCxnSpPr>
+          <p:nvPr/>
+        </p:nvCxnSpPr>
+        <p:spPr>
+          <a:xfrm>
+            <a:off x="3389119" y="357011"/>
+            <a:ext cx="2559848" cy="2945783"/>
+          </a:xfrm>
+          <a:prstGeom prst="bentConnector3">
+            <a:avLst>
+              <a:gd name="adj1" fmla="val 28892"/>
+            </a:avLst>
+          </a:prstGeom>
+          <a:ln w="38100">
+            <a:solidFill>
+              <a:schemeClr val="accent1">
+                <a:lumMod val="75000"/>
+              </a:schemeClr>
+            </a:solidFill>
+            <a:tailEnd type="triangle"/>
+          </a:ln>
+        </p:spPr>
+        <p:style>
+          <a:lnRef idx="2">
+            <a:schemeClr val="accent1"/>
+          </a:lnRef>
+          <a:fillRef idx="0">
+            <a:schemeClr val="accent1"/>
+          </a:fillRef>
+          <a:effectRef idx="1">
+            <a:schemeClr val="accent1"/>
+          </a:effectRef>
+          <a:fontRef idx="minor">
+            <a:schemeClr val="tx1"/>
+          </a:fontRef>
+        </p:style>
+      </p:cxnSp>
+      <p:cxnSp>
+        <p:nvCxnSpPr>
+          <p:cNvPr id="175" name="Connector: Elbow 174">
+            <a:extLst>
+              <a:ext uri="{FF2B5EF4-FFF2-40B4-BE49-F238E27FC236}">
+                <a16:creationId xmlns:a16="http://schemas.microsoft.com/office/drawing/2014/main" id="{32D799E6-5578-4663-A621-749DEDB409D0}"/>
+              </a:ext>
+            </a:extLst>
+          </p:cNvPr>
+          <p:cNvCxnSpPr>
+            <a:cxnSpLocks/>
+          </p:cNvCxnSpPr>
+          <p:nvPr/>
+        </p:nvCxnSpPr>
+        <p:spPr>
+          <a:xfrm>
+            <a:off x="3348139" y="2828958"/>
+            <a:ext cx="2600828" cy="353174"/>
+          </a:xfrm>
+          <a:prstGeom prst="bentConnector3">
+            <a:avLst>
+              <a:gd name="adj1" fmla="val 48402"/>
+            </a:avLst>
+          </a:prstGeom>
+          <a:ln w="38100">
+            <a:solidFill>
+              <a:schemeClr val="accent1">
+                <a:lumMod val="75000"/>
+              </a:schemeClr>
+            </a:solidFill>
+            <a:tailEnd type="triangle"/>
+          </a:ln>
+        </p:spPr>
+        <p:style>
+          <a:lnRef idx="2">
+            <a:schemeClr val="accent1"/>
+          </a:lnRef>
+          <a:fillRef idx="0">
+            <a:schemeClr val="accent1"/>
+          </a:fillRef>
+          <a:effectRef idx="1">
+            <a:schemeClr val="accent1"/>
+          </a:effectRef>
+          <a:fontRef idx="minor">
+            <a:schemeClr val="tx1"/>
+          </a:fontRef>
+        </p:style>
+      </p:cxnSp>
+      <p:cxnSp>
+        <p:nvCxnSpPr>
+          <p:cNvPr id="185" name="Connector: Elbow 184">
+            <a:extLst>
+              <a:ext uri="{FF2B5EF4-FFF2-40B4-BE49-F238E27FC236}">
+                <a16:creationId xmlns:a16="http://schemas.microsoft.com/office/drawing/2014/main" id="{69E4B6C1-D848-499E-8588-53C4D4823717}"/>
+              </a:ext>
+            </a:extLst>
+          </p:cNvPr>
+          <p:cNvCxnSpPr>
+            <a:cxnSpLocks/>
+            <a:stCxn id="10" idx="3"/>
+          </p:cNvCxnSpPr>
+          <p:nvPr/>
+        </p:nvCxnSpPr>
+        <p:spPr>
+          <a:xfrm flipV="1">
+            <a:off x="3325704" y="3512126"/>
+            <a:ext cx="2617940" cy="694784"/>
+          </a:xfrm>
+          <a:prstGeom prst="bentConnector3">
+            <a:avLst>
+              <a:gd name="adj1" fmla="val 31583"/>
+            </a:avLst>
+          </a:prstGeom>
+          <a:ln w="38100">
+            <a:solidFill>
+              <a:schemeClr val="accent1">
+                <a:lumMod val="75000"/>
+              </a:schemeClr>
+            </a:solidFill>
+            <a:tailEnd type="triangle"/>
+          </a:ln>
+        </p:spPr>
+        <p:style>
+          <a:lnRef idx="2">
+            <a:schemeClr val="accent1"/>
+          </a:lnRef>
+          <a:fillRef idx="0">
+            <a:schemeClr val="accent1"/>
+          </a:fillRef>
+          <a:effectRef idx="1">
+            <a:schemeClr val="accent1"/>
+          </a:effectRef>
+          <a:fontRef idx="minor">
+            <a:schemeClr val="tx1"/>
+          </a:fontRef>
+        </p:style>
+      </p:cxnSp>
+    </p:spTree>
+    <p:extLst>
+      <p:ext uri="{BB962C8B-B14F-4D97-AF65-F5344CB8AC3E}">
+        <p14:creationId xmlns:p14="http://schemas.microsoft.com/office/powerpoint/2010/main" val="1309868090"/>
+      </p:ext>
+    </p:extLst>
+  </p:cSld>
+  <p:clrMapOvr>
+    <a:masterClrMapping/>
+  </p:clrMapOvr>
+</p:sld>
+</file>
+
+<file path=ppt/slides/slide2.xml><?xml version="1.0" encoding="utf-8"?>
+<p:sld xmlns:a="http://schemas.openxmlformats.org/drawingml/2006/main" xmlns:r="http://schemas.openxmlformats.org/officeDocument/2006/relationships" xmlns:p="http://schemas.openxmlformats.org/presentationml/2006/main">
+  <p:cSld>
+    <p:spTree>
+      <p:nvGrpSpPr>
+        <p:cNvPr id="1" name=""/>
+        <p:cNvGrpSpPr/>
+        <p:nvPr/>
+      </p:nvGrpSpPr>
+      <p:grpSpPr>
+        <a:xfrm>
+          <a:off x="0" y="0"/>
+          <a:ext cx="0" cy="0"/>
+          <a:chOff x="0" y="0"/>
+          <a:chExt cx="0" cy="0"/>
+        </a:xfrm>
+      </p:grpSpPr>
+      <p:sp>
+        <p:nvSpPr>
+          <p:cNvPr id="4" name="Rounded Rectangle 3"/>
+          <p:cNvSpPr/>
+          <p:nvPr/>
+        </p:nvSpPr>
+        <p:spPr>
+          <a:xfrm>
+            <a:off x="6350593" y="321775"/>
+            <a:ext cx="1337388" cy="343761"/>
+          </a:xfrm>
+          <a:prstGeom prst="roundRect">
+            <a:avLst>
+              <a:gd name="adj" fmla="val 9190"/>
+            </a:avLst>
+          </a:prstGeom>
+          <a:solidFill>
+            <a:schemeClr val="accent4">
+              <a:lumMod val="60000"/>
+              <a:lumOff val="40000"/>
+            </a:schemeClr>
+          </a:solidFill>
+          <a:ln>
+            <a:solidFill>
+              <a:schemeClr val="accent4">
+                <a:lumMod val="75000"/>
+              </a:schemeClr>
+            </a:solidFill>
+          </a:ln>
+        </p:spPr>
+        <p:style>
+          <a:lnRef idx="2">
+            <a:schemeClr val="accent1">
+              <a:shade val="50000"/>
+            </a:schemeClr>
+          </a:lnRef>
+          <a:fillRef idx="1">
+            <a:schemeClr val="accent1"/>
+          </a:fillRef>
+          <a:effectRef idx="0">
+            <a:schemeClr val="accent1"/>
+          </a:effectRef>
+          <a:fontRef idx="minor">
+            <a:schemeClr val="lt1"/>
+          </a:fontRef>
+        </p:style>
+        <p:txBody>
+          <a:bodyPr rtlCol="0" anchor="t" anchorCtr="1"/>
+          <a:lstStyle/>
+          <a:p>
+            <a:pPr algn="ctr"/>
+            <a:r>
+              <a:rPr lang="en-US" sz="1400" b="1" dirty="0" err="1"/>
+              <a:t>AnalysisLogic</a:t>
+            </a:r>
+            <a:endParaRPr lang="en-SG" sz="1400" b="1" dirty="0"/>
+          </a:p>
+        </p:txBody>
+      </p:sp>
+      <p:sp>
+        <p:nvSpPr>
+          <p:cNvPr id="5" name="Rounded Rectangle 4"/>
+          <p:cNvSpPr/>
+          <p:nvPr/>
+        </p:nvSpPr>
+        <p:spPr>
+          <a:xfrm>
+            <a:off x="2985288" y="326482"/>
+            <a:ext cx="1642776" cy="334347"/>
+          </a:xfrm>
+          <a:prstGeom prst="roundRect">
+            <a:avLst>
+              <a:gd name="adj" fmla="val 9190"/>
+            </a:avLst>
+          </a:prstGeom>
+          <a:solidFill>
+            <a:schemeClr val="accent1">
+              <a:lumMod val="60000"/>
+              <a:lumOff val="40000"/>
+            </a:schemeClr>
+          </a:solidFill>
+          <a:ln>
+            <a:solidFill>
+              <a:schemeClr val="accent1">
+                <a:lumMod val="75000"/>
+              </a:schemeClr>
+            </a:solidFill>
+          </a:ln>
+        </p:spPr>
+        <p:style>
+          <a:lnRef idx="2">
+            <a:schemeClr val="accent1">
+              <a:shade val="50000"/>
+            </a:schemeClr>
+          </a:lnRef>
+          <a:fillRef idx="1">
+            <a:schemeClr val="accent1"/>
+          </a:fillRef>
+          <a:effectRef idx="0">
+            <a:schemeClr val="accent1"/>
+          </a:effectRef>
+          <a:fontRef idx="minor">
+            <a:schemeClr val="lt1"/>
+          </a:fontRef>
+        </p:style>
+        <p:txBody>
+          <a:bodyPr rtlCol="0" anchor="t" anchorCtr="1"/>
+          <a:lstStyle/>
+          <a:p>
+            <a:pPr algn="ctr"/>
+            <a:r>
+              <a:rPr lang="en-US" sz="1400" b="1" dirty="0" err="1"/>
+              <a:t>AnalysisController</a:t>
+            </a:r>
+            <a:endParaRPr lang="en-SG" sz="1400" b="1" dirty="0"/>
+          </a:p>
+        </p:txBody>
+      </p:sp>
+      <p:sp>
+        <p:nvSpPr>
+          <p:cNvPr id="6" name="Rounded Rectangle 5"/>
+          <p:cNvSpPr/>
+          <p:nvPr/>
+        </p:nvSpPr>
+        <p:spPr>
+          <a:xfrm>
+            <a:off x="2985288" y="1007251"/>
+            <a:ext cx="1642776" cy="334347"/>
+          </a:xfrm>
+          <a:prstGeom prst="roundRect">
+            <a:avLst>
+              <a:gd name="adj" fmla="val 9190"/>
+            </a:avLst>
+          </a:prstGeom>
+          <a:solidFill>
+            <a:schemeClr val="accent1">
+              <a:lumMod val="60000"/>
+              <a:lumOff val="40000"/>
+            </a:schemeClr>
+          </a:solidFill>
+          <a:ln>
+            <a:solidFill>
+              <a:schemeClr val="accent1">
+                <a:lumMod val="75000"/>
+              </a:schemeClr>
+            </a:solidFill>
+          </a:ln>
+        </p:spPr>
+        <p:style>
+          <a:lnRef idx="2">
+            <a:schemeClr val="accent1">
+              <a:shade val="50000"/>
+            </a:schemeClr>
+          </a:lnRef>
+          <a:fillRef idx="1">
+            <a:schemeClr val="accent1"/>
+          </a:fillRef>
+          <a:effectRef idx="0">
+            <a:schemeClr val="accent1"/>
+          </a:effectRef>
+          <a:fontRef idx="minor">
+            <a:schemeClr val="lt1"/>
+          </a:fontRef>
+        </p:style>
+        <p:txBody>
+          <a:bodyPr rtlCol="0" anchor="t" anchorCtr="1"/>
+          <a:lstStyle/>
+          <a:p>
+            <a:pPr algn="ctr"/>
+            <a:r>
+              <a:rPr lang="en-US" sz="1400" b="1" dirty="0" err="1"/>
+              <a:t>AuthInfoController</a:t>
+            </a:r>
+            <a:endParaRPr lang="en-SG" sz="1400" b="1" dirty="0"/>
+          </a:p>
+        </p:txBody>
+      </p:sp>
+      <p:sp>
+        <p:nvSpPr>
+          <p:cNvPr id="7" name="Rounded Rectangle 6"/>
+          <p:cNvSpPr/>
+          <p:nvPr/>
+        </p:nvSpPr>
+        <p:spPr>
+          <a:xfrm>
+            <a:off x="2717810" y="4665961"/>
+            <a:ext cx="1910254" cy="334347"/>
+          </a:xfrm>
+          <a:prstGeom prst="roundRect">
+            <a:avLst>
+              <a:gd name="adj" fmla="val 9190"/>
+            </a:avLst>
+          </a:prstGeom>
+          <a:solidFill>
+            <a:schemeClr val="accent1">
+              <a:lumMod val="60000"/>
+              <a:lumOff val="40000"/>
+            </a:schemeClr>
+          </a:solidFill>
+          <a:ln>
+            <a:solidFill>
+              <a:schemeClr val="accent1">
+                <a:lumMod val="75000"/>
+              </a:schemeClr>
+            </a:solidFill>
+          </a:ln>
+        </p:spPr>
+        <p:style>
+          <a:lnRef idx="2">
+            <a:schemeClr val="accent1">
+              <a:shade val="50000"/>
+            </a:schemeClr>
+          </a:lnRef>
+          <a:fillRef idx="1">
+            <a:schemeClr val="accent1"/>
+          </a:fillRef>
+          <a:effectRef idx="0">
+            <a:schemeClr val="accent1"/>
+          </a:effectRef>
+          <a:fontRef idx="minor">
+            <a:schemeClr val="lt1"/>
+          </a:fontRef>
+        </p:style>
+        <p:txBody>
+          <a:bodyPr rtlCol="0" anchor="t" anchorCtr="1"/>
+          <a:lstStyle/>
+          <a:p>
+            <a:pPr algn="ctr"/>
+            <a:r>
+              <a:rPr lang="en-US" sz="1400" b="1"/>
+              <a:t>DBMetaDataController</a:t>
+            </a:r>
+            <a:endParaRPr lang="en-SG" sz="1400" b="1" dirty="0"/>
+          </a:p>
+        </p:txBody>
+      </p:sp>
+      <p:sp>
+        <p:nvSpPr>
+          <p:cNvPr id="8" name="Rounded Rectangle 7"/>
+          <p:cNvSpPr/>
+          <p:nvPr/>
+        </p:nvSpPr>
+        <p:spPr>
+          <a:xfrm>
+            <a:off x="1581030" y="4047354"/>
+            <a:ext cx="3047034" cy="334347"/>
+          </a:xfrm>
+          <a:prstGeom prst="roundRect">
+            <a:avLst>
+              <a:gd name="adj" fmla="val 9190"/>
+            </a:avLst>
+          </a:prstGeom>
+          <a:solidFill>
+            <a:schemeClr val="accent1">
+              <a:lumMod val="60000"/>
+              <a:lumOff val="40000"/>
+            </a:schemeClr>
+          </a:solidFill>
+          <a:ln>
+            <a:solidFill>
+              <a:schemeClr val="accent1">
+                <a:lumMod val="75000"/>
+              </a:schemeClr>
+            </a:solidFill>
+          </a:ln>
+        </p:spPr>
+        <p:style>
+          <a:lnRef idx="2">
+            <a:schemeClr val="accent1">
+              <a:shade val="50000"/>
+            </a:schemeClr>
+          </a:lnRef>
+          <a:fillRef idx="1">
+            <a:schemeClr val="accent1"/>
+          </a:fillRef>
+          <a:effectRef idx="0">
+            <a:schemeClr val="accent1"/>
+          </a:effectRef>
+          <a:fontRef idx="minor">
+            <a:schemeClr val="lt1"/>
+          </a:fontRef>
+        </p:style>
+        <p:txBody>
+          <a:bodyPr rtlCol="0" anchor="t" anchorCtr="1"/>
+          <a:lstStyle/>
+          <a:p>
+            <a:pPr algn="ctr"/>
+            <a:r>
+              <a:rPr lang="en-US" sz="1400" b="1" dirty="0" err="1"/>
+              <a:t>PresentationAccessControlController</a:t>
+            </a:r>
+            <a:endParaRPr lang="en-SG" sz="1400" b="1" dirty="0"/>
+          </a:p>
+        </p:txBody>
+      </p:sp>
+      <p:sp>
+        <p:nvSpPr>
+          <p:cNvPr id="9" name="Rounded Rectangle 8"/>
+          <p:cNvSpPr/>
+          <p:nvPr/>
+        </p:nvSpPr>
+        <p:spPr>
+          <a:xfrm>
+            <a:off x="2650941" y="2548092"/>
+            <a:ext cx="1977123" cy="334347"/>
+          </a:xfrm>
+          <a:prstGeom prst="roundRect">
+            <a:avLst>
+              <a:gd name="adj" fmla="val 9190"/>
+            </a:avLst>
+          </a:prstGeom>
+          <a:solidFill>
+            <a:schemeClr val="accent1">
+              <a:lumMod val="60000"/>
+              <a:lumOff val="40000"/>
+            </a:schemeClr>
+          </a:solidFill>
+          <a:ln>
+            <a:solidFill>
+              <a:schemeClr val="accent1">
+                <a:lumMod val="75000"/>
+              </a:schemeClr>
+            </a:solidFill>
+          </a:ln>
+        </p:spPr>
+        <p:style>
+          <a:lnRef idx="2">
+            <a:schemeClr val="accent1">
+              <a:shade val="50000"/>
+            </a:schemeClr>
+          </a:lnRef>
+          <a:fillRef idx="1">
+            <a:schemeClr val="accent1"/>
+          </a:fillRef>
+          <a:effectRef idx="0">
+            <a:schemeClr val="accent1"/>
+          </a:effectRef>
+          <a:fontRef idx="minor">
+            <a:schemeClr val="lt1"/>
+          </a:fontRef>
+        </p:style>
+        <p:txBody>
+          <a:bodyPr rtlCol="0" anchor="t" anchorCtr="1"/>
+          <a:lstStyle/>
+          <a:p>
+            <a:pPr algn="ctr"/>
+            <a:r>
+              <a:rPr lang="en-US" sz="1400" b="1"/>
+              <a:t>PresentationController</a:t>
+            </a:r>
+            <a:endParaRPr lang="en-SG" sz="1400" b="1" dirty="0"/>
+          </a:p>
+        </p:txBody>
+      </p:sp>
+      <p:sp>
+        <p:nvSpPr>
+          <p:cNvPr id="10" name="Rounded Rectangle 9"/>
+          <p:cNvSpPr/>
+          <p:nvPr/>
+        </p:nvSpPr>
+        <p:spPr>
+          <a:xfrm>
+            <a:off x="2112368" y="3372977"/>
+            <a:ext cx="2515137" cy="334347"/>
+          </a:xfrm>
+          <a:prstGeom prst="roundRect">
+            <a:avLst>
+              <a:gd name="adj" fmla="val 9190"/>
+            </a:avLst>
+          </a:prstGeom>
+          <a:solidFill>
+            <a:schemeClr val="accent1">
+              <a:lumMod val="60000"/>
+              <a:lumOff val="40000"/>
+            </a:schemeClr>
+          </a:solidFill>
+          <a:ln>
+            <a:solidFill>
+              <a:schemeClr val="accent1">
+                <a:lumMod val="75000"/>
+              </a:schemeClr>
+            </a:solidFill>
+          </a:ln>
+        </p:spPr>
+        <p:style>
+          <a:lnRef idx="2">
+            <a:schemeClr val="accent1">
+              <a:shade val="50000"/>
+            </a:schemeClr>
+          </a:lnRef>
+          <a:fillRef idx="1">
+            <a:schemeClr val="accent1"/>
+          </a:fillRef>
+          <a:effectRef idx="0">
+            <a:schemeClr val="accent1"/>
+          </a:effectRef>
+          <a:fontRef idx="minor">
+            <a:schemeClr val="lt1"/>
+          </a:fontRef>
+        </p:style>
+        <p:txBody>
+          <a:bodyPr rtlCol="0" anchor="t" anchorCtr="1"/>
+          <a:lstStyle/>
+          <a:p>
+            <a:pPr algn="ctr"/>
+            <a:r>
+              <a:rPr lang="en-US" sz="1400" b="1"/>
+              <a:t>PresentationSectionController</a:t>
+            </a:r>
+            <a:endParaRPr lang="en-SG" sz="1400" b="1" dirty="0"/>
+          </a:p>
+        </p:txBody>
+      </p:sp>
+      <p:sp>
+        <p:nvSpPr>
+          <p:cNvPr id="11" name="Rounded Rectangle 10"/>
+          <p:cNvSpPr/>
+          <p:nvPr/>
+        </p:nvSpPr>
+        <p:spPr>
+          <a:xfrm>
+            <a:off x="3115968" y="1747917"/>
+            <a:ext cx="1512096" cy="334347"/>
+          </a:xfrm>
+          <a:prstGeom prst="roundRect">
+            <a:avLst>
+              <a:gd name="adj" fmla="val 9190"/>
+            </a:avLst>
+          </a:prstGeom>
+          <a:solidFill>
+            <a:schemeClr val="accent1">
+              <a:lumMod val="60000"/>
+              <a:lumOff val="40000"/>
+            </a:schemeClr>
+          </a:solidFill>
+          <a:ln>
+            <a:solidFill>
+              <a:schemeClr val="accent1">
+                <a:lumMod val="75000"/>
+              </a:schemeClr>
+            </a:solidFill>
+          </a:ln>
+        </p:spPr>
+        <p:style>
+          <a:lnRef idx="2">
+            <a:schemeClr val="accent1">
+              <a:shade val="50000"/>
+            </a:schemeClr>
+          </a:lnRef>
+          <a:fillRef idx="1">
+            <a:schemeClr val="accent1"/>
+          </a:fillRef>
+          <a:effectRef idx="0">
+            <a:schemeClr val="accent1"/>
+          </a:effectRef>
+          <a:fontRef idx="minor">
+            <a:schemeClr val="lt1"/>
+          </a:fontRef>
+        </p:style>
+        <p:txBody>
+          <a:bodyPr rtlCol="0" anchor="t" anchorCtr="1"/>
+          <a:lstStyle/>
+          <a:p>
+            <a:pPr algn="ctr"/>
+            <a:r>
+              <a:rPr lang="en-US" sz="1400" b="1"/>
+              <a:t>RecordController</a:t>
+            </a:r>
+            <a:endParaRPr lang="en-SG" sz="1400" b="1" dirty="0"/>
+          </a:p>
+        </p:txBody>
+      </p:sp>
+      <p:sp>
+        <p:nvSpPr>
+          <p:cNvPr id="12" name="Rounded Rectangle 11"/>
+          <p:cNvSpPr/>
+          <p:nvPr/>
+        </p:nvSpPr>
+        <p:spPr>
+          <a:xfrm>
+            <a:off x="2976264" y="5464975"/>
+            <a:ext cx="1651800" cy="334347"/>
+          </a:xfrm>
+          <a:prstGeom prst="roundRect">
+            <a:avLst>
+              <a:gd name="adj" fmla="val 9190"/>
+            </a:avLst>
+          </a:prstGeom>
+          <a:solidFill>
+            <a:schemeClr val="accent1">
+              <a:lumMod val="60000"/>
+              <a:lumOff val="40000"/>
+            </a:schemeClr>
+          </a:solidFill>
+          <a:ln>
+            <a:solidFill>
+              <a:schemeClr val="accent1">
+                <a:lumMod val="75000"/>
+              </a:schemeClr>
+            </a:solidFill>
+          </a:ln>
+        </p:spPr>
+        <p:style>
+          <a:lnRef idx="2">
+            <a:schemeClr val="accent1">
+              <a:shade val="50000"/>
+            </a:schemeClr>
+          </a:lnRef>
+          <a:fillRef idx="1">
+            <a:schemeClr val="accent1"/>
+          </a:fillRef>
+          <a:effectRef idx="0">
+            <a:schemeClr val="accent1"/>
+          </a:effectRef>
+          <a:fontRef idx="minor">
+            <a:schemeClr val="lt1"/>
+          </a:fontRef>
+        </p:style>
+        <p:txBody>
+          <a:bodyPr rtlCol="0" anchor="t" anchorCtr="1"/>
+          <a:lstStyle/>
+          <a:p>
+            <a:pPr algn="ctr"/>
+            <a:r>
+              <a:rPr lang="en-US" sz="1400" b="1"/>
+              <a:t>WebPageController</a:t>
+            </a:r>
+            <a:endParaRPr lang="en-SG" sz="1400" b="1" dirty="0"/>
+          </a:p>
+        </p:txBody>
+      </p:sp>
+      <p:sp>
+        <p:nvSpPr>
+          <p:cNvPr id="14" name="Rounded Rectangle 13"/>
+          <p:cNvSpPr/>
+          <p:nvPr/>
+        </p:nvSpPr>
+        <p:spPr>
+          <a:xfrm>
+            <a:off x="5012087" y="4660565"/>
+            <a:ext cx="1604866" cy="343761"/>
+          </a:xfrm>
+          <a:prstGeom prst="roundRect">
+            <a:avLst>
+              <a:gd name="adj" fmla="val 9190"/>
+            </a:avLst>
+          </a:prstGeom>
+          <a:solidFill>
+            <a:schemeClr val="accent4">
+              <a:lumMod val="60000"/>
+              <a:lumOff val="40000"/>
+            </a:schemeClr>
+          </a:solidFill>
+          <a:ln>
+            <a:solidFill>
+              <a:schemeClr val="accent4">
+                <a:lumMod val="75000"/>
+              </a:schemeClr>
+            </a:solidFill>
+          </a:ln>
+        </p:spPr>
+        <p:style>
+          <a:lnRef idx="2">
+            <a:schemeClr val="accent1">
+              <a:shade val="50000"/>
+            </a:schemeClr>
+          </a:lnRef>
+          <a:fillRef idx="1">
+            <a:schemeClr val="accent1"/>
+          </a:fillRef>
+          <a:effectRef idx="0">
+            <a:schemeClr val="accent1"/>
+          </a:effectRef>
+          <a:fontRef idx="minor">
+            <a:schemeClr val="lt1"/>
+          </a:fontRef>
+        </p:style>
+        <p:txBody>
+          <a:bodyPr rtlCol="0" anchor="t" anchorCtr="1"/>
+          <a:lstStyle/>
+          <a:p>
+            <a:pPr algn="ctr"/>
+            <a:r>
+              <a:rPr lang="en-US" sz="1400" b="1" dirty="0" err="1"/>
+              <a:t>DBMetaDataLogic</a:t>
+            </a:r>
+            <a:endParaRPr lang="en-SG" sz="1400" b="1" dirty="0"/>
+          </a:p>
+        </p:txBody>
+      </p:sp>
+      <p:sp>
+        <p:nvSpPr>
+          <p:cNvPr id="15" name="Rounded Rectangle 14"/>
+          <p:cNvSpPr/>
+          <p:nvPr/>
+        </p:nvSpPr>
+        <p:spPr>
+          <a:xfrm>
+            <a:off x="5012087" y="4037940"/>
+            <a:ext cx="2674777" cy="343761"/>
+          </a:xfrm>
+          <a:prstGeom prst="roundRect">
+            <a:avLst>
+              <a:gd name="adj" fmla="val 9190"/>
+            </a:avLst>
+          </a:prstGeom>
+          <a:solidFill>
+            <a:schemeClr val="accent4">
+              <a:lumMod val="60000"/>
+              <a:lumOff val="40000"/>
+            </a:schemeClr>
+          </a:solidFill>
+          <a:ln>
+            <a:solidFill>
+              <a:schemeClr val="accent4">
+                <a:lumMod val="75000"/>
+              </a:schemeClr>
+            </a:solidFill>
+          </a:ln>
+        </p:spPr>
+        <p:style>
+          <a:lnRef idx="2">
+            <a:schemeClr val="accent1">
+              <a:shade val="50000"/>
+            </a:schemeClr>
+          </a:lnRef>
+          <a:fillRef idx="1">
+            <a:schemeClr val="accent1"/>
+          </a:fillRef>
+          <a:effectRef idx="0">
+            <a:schemeClr val="accent1"/>
+          </a:effectRef>
+          <a:fontRef idx="minor">
+            <a:schemeClr val="lt1"/>
+          </a:fontRef>
+        </p:style>
+        <p:txBody>
+          <a:bodyPr rtlCol="0" anchor="t" anchorCtr="1"/>
+          <a:lstStyle/>
+          <a:p>
+            <a:pPr algn="ctr"/>
+            <a:r>
+              <a:rPr lang="en-US" sz="1400" b="1"/>
+              <a:t>PresentationAccessControlLogic</a:t>
+            </a:r>
+            <a:endParaRPr lang="en-SG" sz="1400" b="1" dirty="0"/>
+          </a:p>
+        </p:txBody>
+      </p:sp>
+      <p:sp>
+        <p:nvSpPr>
+          <p:cNvPr id="17" name="Rounded Rectangle 16"/>
+          <p:cNvSpPr/>
+          <p:nvPr/>
+        </p:nvSpPr>
+        <p:spPr>
+          <a:xfrm>
+            <a:off x="5547042" y="3355810"/>
+            <a:ext cx="2139822" cy="343762"/>
+          </a:xfrm>
+          <a:prstGeom prst="roundRect">
+            <a:avLst>
+              <a:gd name="adj" fmla="val 9190"/>
+            </a:avLst>
+          </a:prstGeom>
+          <a:solidFill>
+            <a:schemeClr val="accent4">
+              <a:lumMod val="60000"/>
+              <a:lumOff val="40000"/>
+            </a:schemeClr>
+          </a:solidFill>
+          <a:ln>
+            <a:solidFill>
+              <a:schemeClr val="accent4">
+                <a:lumMod val="75000"/>
+              </a:schemeClr>
+            </a:solidFill>
+          </a:ln>
+        </p:spPr>
+        <p:style>
+          <a:lnRef idx="2">
+            <a:schemeClr val="accent1">
+              <a:shade val="50000"/>
+            </a:schemeClr>
+          </a:lnRef>
+          <a:fillRef idx="1">
+            <a:schemeClr val="accent1"/>
+          </a:fillRef>
+          <a:effectRef idx="0">
+            <a:schemeClr val="accent1"/>
+          </a:effectRef>
+          <a:fontRef idx="minor">
+            <a:schemeClr val="lt1"/>
+          </a:fontRef>
+        </p:style>
+        <p:txBody>
+          <a:bodyPr rtlCol="0" anchor="t" anchorCtr="1"/>
+          <a:lstStyle/>
+          <a:p>
+            <a:pPr algn="ctr"/>
+            <a:r>
+              <a:rPr lang="en-US" sz="1400" b="1"/>
+              <a:t>PresentationSectionLogic</a:t>
+            </a:r>
+            <a:endParaRPr lang="en-SG" sz="1400" b="1" dirty="0"/>
+          </a:p>
+        </p:txBody>
+      </p:sp>
+      <p:sp>
+        <p:nvSpPr>
+          <p:cNvPr id="18" name="Rounded Rectangle 17"/>
+          <p:cNvSpPr/>
+          <p:nvPr/>
+        </p:nvSpPr>
+        <p:spPr>
+          <a:xfrm>
+            <a:off x="6081998" y="1738503"/>
+            <a:ext cx="1604866" cy="343761"/>
+          </a:xfrm>
+          <a:prstGeom prst="roundRect">
+            <a:avLst>
+              <a:gd name="adj" fmla="val 9190"/>
+            </a:avLst>
+          </a:prstGeom>
+          <a:solidFill>
+            <a:schemeClr val="accent4">
+              <a:lumMod val="60000"/>
+              <a:lumOff val="40000"/>
+            </a:schemeClr>
+          </a:solidFill>
+          <a:ln>
+            <a:solidFill>
+              <a:schemeClr val="accent4">
+                <a:lumMod val="75000"/>
+              </a:schemeClr>
+            </a:solidFill>
+          </a:ln>
+        </p:spPr>
+        <p:style>
+          <a:lnRef idx="2">
+            <a:schemeClr val="accent1">
+              <a:shade val="50000"/>
+            </a:schemeClr>
+          </a:lnRef>
+          <a:fillRef idx="1">
+            <a:schemeClr val="accent1"/>
+          </a:fillRef>
+          <a:effectRef idx="0">
+            <a:schemeClr val="accent1"/>
+          </a:effectRef>
+          <a:fontRef idx="minor">
+            <a:schemeClr val="lt1"/>
+          </a:fontRef>
+        </p:style>
+        <p:txBody>
+          <a:bodyPr rtlCol="0" anchor="t" anchorCtr="1"/>
+          <a:lstStyle/>
+          <a:p>
+            <a:pPr algn="ctr"/>
+            <a:r>
+              <a:rPr lang="en-US" sz="1400" b="1" dirty="0" err="1"/>
+              <a:t>RecordLogic</a:t>
+            </a:r>
+            <a:endParaRPr lang="en-SG" sz="1400" b="1" dirty="0"/>
+          </a:p>
+        </p:txBody>
+      </p:sp>
+      <p:cxnSp>
+        <p:nvCxnSpPr>
+          <p:cNvPr id="34" name="Elbow Connector 182"/>
+          <p:cNvCxnSpPr>
+            <a:cxnSpLocks/>
+            <a:stCxn id="7" idx="3"/>
+            <a:endCxn id="14" idx="1"/>
+          </p:cNvCxnSpPr>
+          <p:nvPr/>
+        </p:nvCxnSpPr>
+        <p:spPr>
+          <a:xfrm flipV="1">
+            <a:off x="4628064" y="4832446"/>
+            <a:ext cx="384023" cy="689"/>
+          </a:xfrm>
+          <a:prstGeom prst="straightConnector1">
+            <a:avLst/>
+          </a:prstGeom>
+          <a:ln w="38100">
+            <a:solidFill>
+              <a:schemeClr val="accent1">
+                <a:lumMod val="75000"/>
+              </a:schemeClr>
+            </a:solidFill>
+            <a:prstDash val="solid"/>
+            <a:headEnd type="none" w="med" len="med"/>
+            <a:tailEnd type="triangle" w="med" len="med"/>
+          </a:ln>
+        </p:spPr>
+        <p:style>
+          <a:lnRef idx="1">
+            <a:schemeClr val="accent1"/>
+          </a:lnRef>
+          <a:fillRef idx="0">
+            <a:schemeClr val="accent1"/>
+          </a:fillRef>
+          <a:effectRef idx="0">
+            <a:schemeClr val="accent1"/>
+          </a:effectRef>
+          <a:fontRef idx="minor">
+            <a:schemeClr val="tx1"/>
+          </a:fontRef>
+        </p:style>
+      </p:cxnSp>
+      <p:cxnSp>
+        <p:nvCxnSpPr>
+          <p:cNvPr id="37" name="Elbow Connector 182"/>
+          <p:cNvCxnSpPr>
+            <a:cxnSpLocks/>
+            <a:stCxn id="8" idx="3"/>
+            <a:endCxn id="15" idx="1"/>
+          </p:cNvCxnSpPr>
+          <p:nvPr/>
+        </p:nvCxnSpPr>
+        <p:spPr>
+          <a:xfrm flipV="1">
+            <a:off x="4628064" y="4209821"/>
+            <a:ext cx="384023" cy="4707"/>
+          </a:xfrm>
+          <a:prstGeom prst="straightConnector1">
+            <a:avLst/>
+          </a:prstGeom>
+          <a:ln w="38100">
+            <a:solidFill>
+              <a:schemeClr val="accent1">
+                <a:lumMod val="75000"/>
+              </a:schemeClr>
+            </a:solidFill>
+            <a:prstDash val="solid"/>
+            <a:headEnd type="none" w="med" len="med"/>
+            <a:tailEnd type="triangle" w="med" len="med"/>
+          </a:ln>
+        </p:spPr>
+        <p:style>
+          <a:lnRef idx="1">
+            <a:schemeClr val="accent1"/>
+          </a:lnRef>
+          <a:fillRef idx="0">
+            <a:schemeClr val="accent1"/>
+          </a:fillRef>
+          <a:effectRef idx="0">
+            <a:schemeClr val="accent1"/>
+          </a:effectRef>
+          <a:fontRef idx="minor">
+            <a:schemeClr val="tx1"/>
+          </a:fontRef>
+        </p:style>
+      </p:cxnSp>
+      <p:cxnSp>
+        <p:nvCxnSpPr>
+          <p:cNvPr id="46" name="Elbow Connector 182"/>
           <p:cNvCxnSpPr>
             <a:cxnSpLocks/>
             <a:stCxn id="9" idx="3"/>
-            <a:endCxn id="13" idx="1"/>
+            <a:endCxn id="49" idx="1"/>
           </p:cNvCxnSpPr>
           <p:nvPr/>
         </p:nvCxnSpPr>
         <p:spPr>
           <a:xfrm flipV="1">
-            <a:off x="3601581" y="1219903"/>
-            <a:ext cx="2431815" cy="2256515"/>
+            <a:off x="4628064" y="2708592"/>
+            <a:ext cx="1482793" cy="6674"/>
           </a:xfrm>
           <a:prstGeom prst="straightConnector1">
             <a:avLst/>
@@ -4749,52 +6315,8 @@
         </p:nvCxnSpPr>
         <p:spPr>
           <a:xfrm flipV="1">
-            <a:off x="3605066" y="4231481"/>
-            <a:ext cx="1547583" cy="6937"/>
-          </a:xfrm>
-          <a:prstGeom prst="straightConnector1">
-            <a:avLst/>
-          </a:prstGeom>
-          <a:ln w="38100">
-            <a:solidFill>
-              <a:schemeClr val="accent1">
-                <a:lumMod val="75000"/>
-              </a:schemeClr>
-            </a:solidFill>
-            <a:prstDash val="solid"/>
-            <a:headEnd type="none" w="med" len="med"/>
-            <a:tailEnd type="triangle" w="med" len="med"/>
-          </a:ln>
-        </p:spPr>
-        <p:style>
-          <a:lnRef idx="1">
-            <a:schemeClr val="accent1"/>
-          </a:lnRef>
-          <a:fillRef idx="0">
-            <a:schemeClr val="accent1"/>
-          </a:fillRef>
-          <a:effectRef idx="0">
-            <a:schemeClr val="accent1"/>
-          </a:effectRef>
-          <a:fontRef idx="minor">
-            <a:schemeClr val="tx1"/>
-          </a:fontRef>
-        </p:style>
-      </p:cxnSp>
-      <p:cxnSp>
-        <p:nvCxnSpPr>
-          <p:cNvPr id="55" name="Elbow Connector 182"/>
-          <p:cNvCxnSpPr>
-            <a:cxnSpLocks/>
-            <a:stCxn id="10" idx="3"/>
-            <a:endCxn id="16" idx="1"/>
-          </p:cNvCxnSpPr>
-          <p:nvPr/>
-        </p:nvCxnSpPr>
-        <p:spPr>
-          <a:xfrm flipV="1">
-            <a:off x="3605066" y="3480702"/>
-            <a:ext cx="2157183" cy="757716"/>
+            <a:off x="4627505" y="3527691"/>
+            <a:ext cx="919537" cy="12460"/>
           </a:xfrm>
           <a:prstGeom prst="straightConnector1">
             <a:avLst/>
@@ -4837,8 +6359,8 @@
         </p:nvCxnSpPr>
         <p:spPr>
           <a:xfrm flipV="1">
-            <a:off x="3605066" y="4953725"/>
-            <a:ext cx="2186538" cy="29507"/>
+            <a:off x="4628064" y="1910384"/>
+            <a:ext cx="1453934" cy="4707"/>
           </a:xfrm>
           <a:prstGeom prst="straightConnector1">
             <a:avLst/>
@@ -4880,9 +6402,9 @@
           <p:nvPr/>
         </p:nvCxnSpPr>
         <p:spPr>
-          <a:xfrm flipV="1">
-            <a:off x="3611864" y="5715746"/>
-            <a:ext cx="1979504" cy="12300"/>
+          <a:xfrm>
+            <a:off x="4628064" y="5632149"/>
+            <a:ext cx="415940" cy="0"/>
           </a:xfrm>
           <a:prstGeom prst="straightConnector1">
             <a:avLst/>
@@ -4921,8 +6443,8 @@
         </p:nvSpPr>
         <p:spPr>
           <a:xfrm>
-            <a:off x="5496511" y="5336318"/>
-            <a:ext cx="1785730" cy="758855"/>
+            <a:off x="4960762" y="5299182"/>
+            <a:ext cx="1567070" cy="665934"/>
           </a:xfrm>
           <a:prstGeom prst="verticalScroll">
             <a:avLst/>
@@ -4950,22 +6472,22 @@
           <a:p>
             <a:pPr algn="ctr"/>
             <a:r>
-              <a:rPr lang="en-US" dirty="0"/>
+              <a:rPr lang="en-US" sz="1600" dirty="0"/>
               <a:t>*.</a:t>
             </a:r>
             <a:r>
-              <a:rPr lang="en-US" dirty="0" err="1"/>
+              <a:rPr lang="en-US" sz="1600" dirty="0" err="1"/>
               <a:t>js</a:t>
             </a:r>
             <a:r>
-              <a:rPr lang="en-US" dirty="0"/>
+              <a:rPr lang="en-US" sz="1600" dirty="0"/>
               <a:t> / *.html / *.</a:t>
             </a:r>
             <a:r>
-              <a:rPr lang="en-US" dirty="0" err="1"/>
+              <a:rPr lang="en-US" sz="1600" dirty="0" err="1"/>
               <a:t>css</a:t>
             </a:r>
-            <a:endParaRPr lang="en-US" dirty="0"/>
+            <a:endParaRPr lang="en-US" sz="1600" dirty="0"/>
           </a:p>
         </p:txBody>
       </p:sp>
@@ -4978,7 +6500,7 @@
         <p:spPr>
           <a:xfrm>
             <a:off x="8026452" y="254794"/>
-            <a:ext cx="512918" cy="5438402"/>
+            <a:ext cx="450112" cy="4772478"/>
           </a:xfrm>
           <a:prstGeom prst="roundRect">
             <a:avLst>
@@ -5021,26 +6543,31 @@
           <a:p>
             <a:pPr algn="ctr"/>
             <a:r>
-              <a:rPr lang="en-US" sz="1600" b="1"/>
+              <a:rPr lang="en-US" sz="1400" b="1"/>
               <a:t>Storage</a:t>
             </a:r>
-            <a:endParaRPr lang="en-SG" sz="1600" b="1" dirty="0"/>
+            <a:endParaRPr lang="en-SG" sz="1400" b="1" dirty="0"/>
           </a:p>
         </p:txBody>
       </p:sp>
       <p:cxnSp>
         <p:nvCxnSpPr>
-          <p:cNvPr id="47" name="Elbow Connector 182"/>
+          <p:cNvPr id="63" name="Elbow Connector 182">
+            <a:extLst>
+              <a:ext uri="{FF2B5EF4-FFF2-40B4-BE49-F238E27FC236}">
+                <a16:creationId xmlns:a16="http://schemas.microsoft.com/office/drawing/2014/main" id="{1BC29DFD-C30A-4F01-BA71-66B3ED764DEE}"/>
+              </a:ext>
+            </a:extLst>
+          </p:cNvPr>
           <p:cNvCxnSpPr>
             <a:cxnSpLocks/>
-            <a:stCxn id="4" idx="3"/>
           </p:cNvCxnSpPr>
           <p:nvPr/>
         </p:nvCxnSpPr>
         <p:spPr>
-          <a:xfrm flipV="1">
-            <a:off x="7557396" y="445294"/>
-            <a:ext cx="503601" cy="5364"/>
+          <a:xfrm>
+            <a:off x="7687981" y="2695878"/>
+            <a:ext cx="338471" cy="0"/>
           </a:xfrm>
           <a:prstGeom prst="straightConnector1">
             <a:avLst/>
@@ -5071,7 +6598,13 @@
       </p:cxnSp>
       <p:cxnSp>
         <p:nvCxnSpPr>
-          <p:cNvPr id="53" name="Elbow Connector 182"/>
+          <p:cNvPr id="43" name="Elbow Connector 182">
+            <a:extLst>
+              <a:ext uri="{FF2B5EF4-FFF2-40B4-BE49-F238E27FC236}">
+                <a16:creationId xmlns:a16="http://schemas.microsoft.com/office/drawing/2014/main" id="{C8323562-D460-42F4-BBE7-02B922458E67}"/>
+              </a:ext>
+            </a:extLst>
+          </p:cNvPr>
           <p:cNvCxnSpPr>
             <a:cxnSpLocks/>
           </p:cNvCxnSpPr>
@@ -5079,8 +6612,8 @@
         </p:nvCxnSpPr>
         <p:spPr>
           <a:xfrm>
-            <a:off x="7601317" y="2716748"/>
-            <a:ext cx="402563" cy="1498"/>
+            <a:off x="7687981" y="483394"/>
+            <a:ext cx="338471" cy="0"/>
           </a:xfrm>
           <a:prstGeom prst="straightConnector1">
             <a:avLst/>
@@ -5111,7 +6644,13 @@
       </p:cxnSp>
       <p:cxnSp>
         <p:nvCxnSpPr>
-          <p:cNvPr id="54" name="Elbow Connector 182"/>
+          <p:cNvPr id="44" name="Elbow Connector 182">
+            <a:extLst>
+              <a:ext uri="{FF2B5EF4-FFF2-40B4-BE49-F238E27FC236}">
+                <a16:creationId xmlns:a16="http://schemas.microsoft.com/office/drawing/2014/main" id="{CE37DEE7-630A-41AE-81B1-2BBD89C8C1EB}"/>
+              </a:ext>
+            </a:extLst>
+          </p:cNvPr>
           <p:cNvCxnSpPr>
             <a:cxnSpLocks/>
           </p:cNvCxnSpPr>
@@ -5119,8 +6658,8 @@
         </p:nvCxnSpPr>
         <p:spPr>
           <a:xfrm>
-            <a:off x="7578141" y="3466522"/>
-            <a:ext cx="444826" cy="1498"/>
+            <a:off x="7686864" y="1918988"/>
+            <a:ext cx="338471" cy="0"/>
           </a:xfrm>
           <a:prstGeom prst="straightConnector1">
             <a:avLst/>
@@ -5149,9 +6688,195 @@
           </a:fontRef>
         </p:style>
       </p:cxnSp>
+      <p:sp>
+        <p:nvSpPr>
+          <p:cNvPr id="45" name="Rounded Rectangle 3">
+            <a:extLst>
+              <a:ext uri="{FF2B5EF4-FFF2-40B4-BE49-F238E27FC236}">
+                <a16:creationId xmlns:a16="http://schemas.microsoft.com/office/drawing/2014/main" id="{14A40B4C-4379-4E1A-AFD9-D8EA4FC666AA}"/>
+              </a:ext>
+            </a:extLst>
+          </p:cNvPr>
+          <p:cNvSpPr/>
+          <p:nvPr/>
+        </p:nvSpPr>
+        <p:spPr>
+          <a:xfrm>
+            <a:off x="53181" y="2536710"/>
+            <a:ext cx="1337388" cy="343761"/>
+          </a:xfrm>
+          <a:prstGeom prst="roundRect">
+            <a:avLst>
+              <a:gd name="adj" fmla="val 9190"/>
+            </a:avLst>
+          </a:prstGeom>
+          <a:solidFill>
+            <a:schemeClr val="accent4">
+              <a:lumMod val="60000"/>
+              <a:lumOff val="40000"/>
+            </a:schemeClr>
+          </a:solidFill>
+          <a:ln>
+            <a:solidFill>
+              <a:schemeClr val="accent4">
+                <a:lumMod val="75000"/>
+              </a:schemeClr>
+            </a:solidFill>
+          </a:ln>
+        </p:spPr>
+        <p:style>
+          <a:lnRef idx="2">
+            <a:schemeClr val="accent1">
+              <a:shade val="50000"/>
+            </a:schemeClr>
+          </a:lnRef>
+          <a:fillRef idx="1">
+            <a:schemeClr val="accent1"/>
+          </a:fillRef>
+          <a:effectRef idx="0">
+            <a:schemeClr val="accent1"/>
+          </a:effectRef>
+          <a:fontRef idx="minor">
+            <a:schemeClr val="lt1"/>
+          </a:fontRef>
+        </p:style>
+        <p:txBody>
+          <a:bodyPr rtlCol="0" anchor="t" anchorCtr="1"/>
+          <a:lstStyle/>
+          <a:p>
+            <a:pPr algn="ctr"/>
+            <a:r>
+              <a:rPr lang="en-US" sz="1400" b="1" dirty="0" err="1"/>
+              <a:t>GateKeeper</a:t>
+            </a:r>
+            <a:endParaRPr lang="en-SG" sz="1400" b="1" dirty="0"/>
+          </a:p>
+        </p:txBody>
+      </p:sp>
+      <p:sp>
+        <p:nvSpPr>
+          <p:cNvPr id="49" name="Rounded Rectangle 3">
+            <a:extLst>
+              <a:ext uri="{FF2B5EF4-FFF2-40B4-BE49-F238E27FC236}">
+                <a16:creationId xmlns:a16="http://schemas.microsoft.com/office/drawing/2014/main" id="{958F2FF5-ADF4-45EC-B6F6-572DC60C258E}"/>
+              </a:ext>
+            </a:extLst>
+          </p:cNvPr>
+          <p:cNvSpPr/>
+          <p:nvPr/>
+        </p:nvSpPr>
+        <p:spPr>
+          <a:xfrm>
+            <a:off x="6110857" y="2536711"/>
+            <a:ext cx="1575935" cy="343761"/>
+          </a:xfrm>
+          <a:prstGeom prst="roundRect">
+            <a:avLst>
+              <a:gd name="adj" fmla="val 9190"/>
+            </a:avLst>
+          </a:prstGeom>
+          <a:solidFill>
+            <a:schemeClr val="accent4">
+              <a:lumMod val="60000"/>
+              <a:lumOff val="40000"/>
+            </a:schemeClr>
+          </a:solidFill>
+          <a:ln>
+            <a:solidFill>
+              <a:schemeClr val="accent4">
+                <a:lumMod val="75000"/>
+              </a:schemeClr>
+            </a:solidFill>
+          </a:ln>
+        </p:spPr>
+        <p:style>
+          <a:lnRef idx="2">
+            <a:schemeClr val="accent1">
+              <a:shade val="50000"/>
+            </a:schemeClr>
+          </a:lnRef>
+          <a:fillRef idx="1">
+            <a:schemeClr val="accent1"/>
+          </a:fillRef>
+          <a:effectRef idx="0">
+            <a:schemeClr val="accent1"/>
+          </a:effectRef>
+          <a:fontRef idx="minor">
+            <a:schemeClr val="lt1"/>
+          </a:fontRef>
+        </p:style>
+        <p:txBody>
+          <a:bodyPr rtlCol="0" anchor="t" anchorCtr="1"/>
+          <a:lstStyle/>
+          <a:p>
+            <a:pPr algn="ctr"/>
+            <a:r>
+              <a:rPr lang="en-US" sz="1400" b="1" dirty="0" err="1"/>
+              <a:t>PresentationLogic</a:t>
+            </a:r>
+            <a:endParaRPr lang="en-SG" sz="1400" b="1" dirty="0"/>
+          </a:p>
+        </p:txBody>
+      </p:sp>
       <p:cxnSp>
         <p:nvCxnSpPr>
-          <p:cNvPr id="56" name="Elbow Connector 182"/>
+          <p:cNvPr id="53" name="Elbow Connector 182">
+            <a:extLst>
+              <a:ext uri="{FF2B5EF4-FFF2-40B4-BE49-F238E27FC236}">
+                <a16:creationId xmlns:a16="http://schemas.microsoft.com/office/drawing/2014/main" id="{E07B8FA3-9A64-465C-A13B-038ACA89D125}"/>
+              </a:ext>
+            </a:extLst>
+          </p:cNvPr>
+          <p:cNvCxnSpPr>
+            <a:cxnSpLocks/>
+            <a:stCxn id="5" idx="3"/>
+            <a:endCxn id="4" idx="1"/>
+          </p:cNvCxnSpPr>
+          <p:nvPr/>
+        </p:nvCxnSpPr>
+        <p:spPr>
+          <a:xfrm>
+            <a:off x="4628064" y="493656"/>
+            <a:ext cx="1722529" cy="0"/>
+          </a:xfrm>
+          <a:prstGeom prst="straightConnector1">
+            <a:avLst/>
+          </a:prstGeom>
+          <a:ln w="38100">
+            <a:solidFill>
+              <a:schemeClr val="accent1">
+                <a:lumMod val="75000"/>
+              </a:schemeClr>
+            </a:solidFill>
+            <a:prstDash val="solid"/>
+            <a:headEnd type="none" w="med" len="med"/>
+            <a:tailEnd type="triangle" w="med" len="med"/>
+          </a:ln>
+        </p:spPr>
+        <p:style>
+          <a:lnRef idx="1">
+            <a:schemeClr val="accent1"/>
+          </a:lnRef>
+          <a:fillRef idx="0">
+            <a:schemeClr val="accent1"/>
+          </a:fillRef>
+          <a:effectRef idx="0">
+            <a:schemeClr val="accent1"/>
+          </a:effectRef>
+          <a:fontRef idx="minor">
+            <a:schemeClr val="tx1"/>
+          </a:fontRef>
+        </p:style>
+      </p:cxnSp>
+      <p:cxnSp>
+        <p:nvCxnSpPr>
+          <p:cNvPr id="59" name="Elbow Connector 182">
+            <a:extLst>
+              <a:ext uri="{FF2B5EF4-FFF2-40B4-BE49-F238E27FC236}">
+                <a16:creationId xmlns:a16="http://schemas.microsoft.com/office/drawing/2014/main" id="{E4C640B3-D046-48F5-BBDF-9C2FE8E746D8}"/>
+              </a:ext>
+            </a:extLst>
+          </p:cNvPr>
           <p:cNvCxnSpPr>
             <a:cxnSpLocks/>
           </p:cNvCxnSpPr>
@@ -5159,8 +6884,8 @@
         </p:nvCxnSpPr>
         <p:spPr>
           <a:xfrm>
-            <a:off x="7601015" y="4229983"/>
-            <a:ext cx="402563" cy="1498"/>
+            <a:off x="7687981" y="4216737"/>
+            <a:ext cx="338471" cy="0"/>
           </a:xfrm>
           <a:prstGeom prst="straightConnector1">
             <a:avLst/>
@@ -5191,7 +6916,13 @@
       </p:cxnSp>
       <p:cxnSp>
         <p:nvCxnSpPr>
-          <p:cNvPr id="57" name="Elbow Connector 182"/>
+          <p:cNvPr id="60" name="Elbow Connector 182">
+            <a:extLst>
+              <a:ext uri="{FF2B5EF4-FFF2-40B4-BE49-F238E27FC236}">
+                <a16:creationId xmlns:a16="http://schemas.microsoft.com/office/drawing/2014/main" id="{296453BB-80B1-46DE-9259-D69895D2BDA5}"/>
+              </a:ext>
+            </a:extLst>
+          </p:cNvPr>
           <p:cNvCxnSpPr>
             <a:cxnSpLocks/>
           </p:cNvCxnSpPr>
@@ -5199,8 +6930,8 @@
         </p:nvCxnSpPr>
         <p:spPr>
           <a:xfrm>
-            <a:off x="7620793" y="4952227"/>
-            <a:ext cx="402563" cy="1498"/>
+            <a:off x="7687981" y="3540151"/>
+            <a:ext cx="338471" cy="0"/>
           </a:xfrm>
           <a:prstGeom prst="straightConnector1">
             <a:avLst/>
@@ -5231,24 +6962,24 @@
       </p:cxnSp>
       <p:cxnSp>
         <p:nvCxnSpPr>
-          <p:cNvPr id="38" name="Elbow Connector 182">
+          <p:cNvPr id="76" name="Elbow Connector 182">
             <a:extLst>
               <a:ext uri="{FF2B5EF4-FFF2-40B4-BE49-F238E27FC236}">
-                <a16:creationId xmlns:a16="http://schemas.microsoft.com/office/drawing/2014/main" id="{7C210679-773E-472A-B727-020C2FE3ADEB}"/>
+                <a16:creationId xmlns:a16="http://schemas.microsoft.com/office/drawing/2014/main" id="{613612AB-94A6-41EC-B5A5-11EF7DE080CC}"/>
               </a:ext>
             </a:extLst>
           </p:cNvPr>
           <p:cNvCxnSpPr>
             <a:cxnSpLocks/>
-            <a:stCxn id="10" idx="3"/>
-            <a:endCxn id="13" idx="1"/>
+            <a:stCxn id="5" idx="1"/>
+            <a:endCxn id="45" idx="3"/>
           </p:cNvCxnSpPr>
           <p:nvPr/>
         </p:nvCxnSpPr>
         <p:spPr>
-          <a:xfrm flipV="1">
-            <a:off x="3605066" y="1219903"/>
-            <a:ext cx="2428330" cy="3018515"/>
+          <a:xfrm flipH="1">
+            <a:off x="1390569" y="493656"/>
+            <a:ext cx="1594719" cy="2214935"/>
           </a:xfrm>
           <a:prstGeom prst="straightConnector1">
             <a:avLst/>
@@ -5281,24 +7012,424 @@
       </p:cxnSp>
       <p:cxnSp>
         <p:nvCxnSpPr>
-          <p:cNvPr id="41" name="Elbow Connector 182">
+          <p:cNvPr id="80" name="Elbow Connector 182">
             <a:extLst>
               <a:ext uri="{FF2B5EF4-FFF2-40B4-BE49-F238E27FC236}">
-                <a16:creationId xmlns:a16="http://schemas.microsoft.com/office/drawing/2014/main" id="{FA27843D-790E-48C2-97A4-AAF04C41883F}"/>
+                <a16:creationId xmlns:a16="http://schemas.microsoft.com/office/drawing/2014/main" id="{40E0E725-5CA4-4B9F-9F75-23DAA46E440F}"/>
+              </a:ext>
+            </a:extLst>
+          </p:cNvPr>
+          <p:cNvCxnSpPr>
+            <a:cxnSpLocks/>
+            <a:stCxn id="6" idx="1"/>
+            <a:endCxn id="45" idx="3"/>
+          </p:cNvCxnSpPr>
+          <p:nvPr/>
+        </p:nvCxnSpPr>
+        <p:spPr>
+          <a:xfrm flipH="1">
+            <a:off x="1390569" y="1174425"/>
+            <a:ext cx="1594719" cy="1534166"/>
+          </a:xfrm>
+          <a:prstGeom prst="straightConnector1">
+            <a:avLst/>
+          </a:prstGeom>
+          <a:ln w="38100">
+            <a:solidFill>
+              <a:schemeClr val="accent1">
+                <a:lumMod val="75000"/>
+              </a:schemeClr>
+            </a:solidFill>
+            <a:prstDash val="solid"/>
+            <a:headEnd type="none" w="med" len="med"/>
+            <a:tailEnd type="triangle" w="med" len="med"/>
+          </a:ln>
+        </p:spPr>
+        <p:style>
+          <a:lnRef idx="1">
+            <a:schemeClr val="accent1"/>
+          </a:lnRef>
+          <a:fillRef idx="0">
+            <a:schemeClr val="accent1"/>
+          </a:fillRef>
+          <a:effectRef idx="0">
+            <a:schemeClr val="accent1"/>
+          </a:effectRef>
+          <a:fontRef idx="minor">
+            <a:schemeClr val="tx1"/>
+          </a:fontRef>
+        </p:style>
+      </p:cxnSp>
+      <p:cxnSp>
+        <p:nvCxnSpPr>
+          <p:cNvPr id="83" name="Elbow Connector 182">
+            <a:extLst>
+              <a:ext uri="{FF2B5EF4-FFF2-40B4-BE49-F238E27FC236}">
+                <a16:creationId xmlns:a16="http://schemas.microsoft.com/office/drawing/2014/main" id="{07C290A2-88D8-48A2-9E3F-A38979C26250}"/>
+              </a:ext>
+            </a:extLst>
+          </p:cNvPr>
+          <p:cNvCxnSpPr>
+            <a:cxnSpLocks/>
+            <a:stCxn id="11" idx="1"/>
+            <a:endCxn id="45" idx="3"/>
+          </p:cNvCxnSpPr>
+          <p:nvPr/>
+        </p:nvCxnSpPr>
+        <p:spPr>
+          <a:xfrm flipH="1">
+            <a:off x="1390569" y="1915091"/>
+            <a:ext cx="1725399" cy="793500"/>
+          </a:xfrm>
+          <a:prstGeom prst="straightConnector1">
+            <a:avLst/>
+          </a:prstGeom>
+          <a:ln w="38100">
+            <a:solidFill>
+              <a:schemeClr val="accent1">
+                <a:lumMod val="75000"/>
+              </a:schemeClr>
+            </a:solidFill>
+            <a:prstDash val="solid"/>
+            <a:headEnd type="none" w="med" len="med"/>
+            <a:tailEnd type="triangle" w="med" len="med"/>
+          </a:ln>
+        </p:spPr>
+        <p:style>
+          <a:lnRef idx="1">
+            <a:schemeClr val="accent1"/>
+          </a:lnRef>
+          <a:fillRef idx="0">
+            <a:schemeClr val="accent1"/>
+          </a:fillRef>
+          <a:effectRef idx="0">
+            <a:schemeClr val="accent1"/>
+          </a:effectRef>
+          <a:fontRef idx="minor">
+            <a:schemeClr val="tx1"/>
+          </a:fontRef>
+        </p:style>
+      </p:cxnSp>
+      <p:cxnSp>
+        <p:nvCxnSpPr>
+          <p:cNvPr id="89" name="Elbow Connector 182">
+            <a:extLst>
+              <a:ext uri="{FF2B5EF4-FFF2-40B4-BE49-F238E27FC236}">
+                <a16:creationId xmlns:a16="http://schemas.microsoft.com/office/drawing/2014/main" id="{CD3FAD0E-4546-4989-BF4D-27D8A8363180}"/>
+              </a:ext>
+            </a:extLst>
+          </p:cNvPr>
+          <p:cNvCxnSpPr>
+            <a:cxnSpLocks/>
+            <a:stCxn id="9" idx="1"/>
+            <a:endCxn id="45" idx="3"/>
+          </p:cNvCxnSpPr>
+          <p:nvPr/>
+        </p:nvCxnSpPr>
+        <p:spPr>
+          <a:xfrm flipH="1" flipV="1">
+            <a:off x="1390569" y="2708591"/>
+            <a:ext cx="1260372" cy="6675"/>
+          </a:xfrm>
+          <a:prstGeom prst="straightConnector1">
+            <a:avLst/>
+          </a:prstGeom>
+          <a:ln w="38100">
+            <a:solidFill>
+              <a:schemeClr val="accent1">
+                <a:lumMod val="75000"/>
+              </a:schemeClr>
+            </a:solidFill>
+            <a:prstDash val="solid"/>
+            <a:headEnd type="none" w="med" len="med"/>
+            <a:tailEnd type="triangle" w="med" len="med"/>
+          </a:ln>
+        </p:spPr>
+        <p:style>
+          <a:lnRef idx="1">
+            <a:schemeClr val="accent1"/>
+          </a:lnRef>
+          <a:fillRef idx="0">
+            <a:schemeClr val="accent1"/>
+          </a:fillRef>
+          <a:effectRef idx="0">
+            <a:schemeClr val="accent1"/>
+          </a:effectRef>
+          <a:fontRef idx="minor">
+            <a:schemeClr val="tx1"/>
+          </a:fontRef>
+        </p:style>
+      </p:cxnSp>
+      <p:cxnSp>
+        <p:nvCxnSpPr>
+          <p:cNvPr id="93" name="Elbow Connector 182">
+            <a:extLst>
+              <a:ext uri="{FF2B5EF4-FFF2-40B4-BE49-F238E27FC236}">
+                <a16:creationId xmlns:a16="http://schemas.microsoft.com/office/drawing/2014/main" id="{FC02274E-4981-45D2-995A-E446EA04C9FD}"/>
+              </a:ext>
+            </a:extLst>
+          </p:cNvPr>
+          <p:cNvCxnSpPr>
+            <a:cxnSpLocks/>
+            <a:stCxn id="10" idx="1"/>
+            <a:endCxn id="45" idx="3"/>
+          </p:cNvCxnSpPr>
+          <p:nvPr/>
+        </p:nvCxnSpPr>
+        <p:spPr>
+          <a:xfrm flipH="1" flipV="1">
+            <a:off x="1390569" y="2708591"/>
+            <a:ext cx="721799" cy="831560"/>
+          </a:xfrm>
+          <a:prstGeom prst="straightConnector1">
+            <a:avLst/>
+          </a:prstGeom>
+          <a:ln w="38100">
+            <a:solidFill>
+              <a:schemeClr val="accent1">
+                <a:lumMod val="75000"/>
+              </a:schemeClr>
+            </a:solidFill>
+            <a:prstDash val="solid"/>
+            <a:headEnd type="none" w="med" len="med"/>
+            <a:tailEnd type="triangle" w="med" len="med"/>
+          </a:ln>
+        </p:spPr>
+        <p:style>
+          <a:lnRef idx="1">
+            <a:schemeClr val="accent1"/>
+          </a:lnRef>
+          <a:fillRef idx="0">
+            <a:schemeClr val="accent1"/>
+          </a:fillRef>
+          <a:effectRef idx="0">
+            <a:schemeClr val="accent1"/>
+          </a:effectRef>
+          <a:fontRef idx="minor">
+            <a:schemeClr val="tx1"/>
+          </a:fontRef>
+        </p:style>
+      </p:cxnSp>
+      <p:cxnSp>
+        <p:nvCxnSpPr>
+          <p:cNvPr id="95" name="Elbow Connector 182">
+            <a:extLst>
+              <a:ext uri="{FF2B5EF4-FFF2-40B4-BE49-F238E27FC236}">
+                <a16:creationId xmlns:a16="http://schemas.microsoft.com/office/drawing/2014/main" id="{709E73B4-31B3-4FC4-BDD7-5DE8EE4BB0E4}"/>
+              </a:ext>
+            </a:extLst>
+          </p:cNvPr>
+          <p:cNvCxnSpPr>
+            <a:cxnSpLocks/>
+            <a:stCxn id="8" idx="1"/>
+            <a:endCxn id="45" idx="3"/>
+          </p:cNvCxnSpPr>
+          <p:nvPr/>
+        </p:nvCxnSpPr>
+        <p:spPr>
+          <a:xfrm flipH="1" flipV="1">
+            <a:off x="1390569" y="2708591"/>
+            <a:ext cx="190461" cy="1505937"/>
+          </a:xfrm>
+          <a:prstGeom prst="straightConnector1">
+            <a:avLst/>
+          </a:prstGeom>
+          <a:ln w="38100">
+            <a:solidFill>
+              <a:schemeClr val="accent1">
+                <a:lumMod val="75000"/>
+              </a:schemeClr>
+            </a:solidFill>
+            <a:prstDash val="solid"/>
+            <a:headEnd type="none" w="med" len="med"/>
+            <a:tailEnd type="triangle" w="med" len="med"/>
+          </a:ln>
+        </p:spPr>
+        <p:style>
+          <a:lnRef idx="1">
+            <a:schemeClr val="accent1"/>
+          </a:lnRef>
+          <a:fillRef idx="0">
+            <a:schemeClr val="accent1"/>
+          </a:fillRef>
+          <a:effectRef idx="0">
+            <a:schemeClr val="accent1"/>
+          </a:effectRef>
+          <a:fontRef idx="minor">
+            <a:schemeClr val="tx1"/>
+          </a:fontRef>
+        </p:style>
+      </p:cxnSp>
+      <p:cxnSp>
+        <p:nvCxnSpPr>
+          <p:cNvPr id="119" name="Elbow Connector 182">
+            <a:extLst>
+              <a:ext uri="{FF2B5EF4-FFF2-40B4-BE49-F238E27FC236}">
+                <a16:creationId xmlns:a16="http://schemas.microsoft.com/office/drawing/2014/main" id="{44DCB561-EF17-434B-AF8B-EF116192D68B}"/>
+              </a:ext>
+            </a:extLst>
+          </p:cNvPr>
+          <p:cNvCxnSpPr>
+            <a:cxnSpLocks/>
+            <a:stCxn id="5" idx="3"/>
+            <a:endCxn id="49" idx="1"/>
+          </p:cNvCxnSpPr>
+          <p:nvPr/>
+        </p:nvCxnSpPr>
+        <p:spPr>
+          <a:xfrm>
+            <a:off x="4628064" y="493656"/>
+            <a:ext cx="1482793" cy="2214936"/>
+          </a:xfrm>
+          <a:prstGeom prst="straightConnector1">
+            <a:avLst/>
+          </a:prstGeom>
+          <a:ln w="38100">
+            <a:solidFill>
+              <a:schemeClr val="accent1">
+                <a:lumMod val="75000"/>
+              </a:schemeClr>
+            </a:solidFill>
+            <a:prstDash val="solid"/>
+            <a:headEnd type="none" w="med" len="med"/>
+            <a:tailEnd type="triangle" w="med" len="med"/>
+          </a:ln>
+        </p:spPr>
+        <p:style>
+          <a:lnRef idx="1">
+            <a:schemeClr val="accent1"/>
+          </a:lnRef>
+          <a:fillRef idx="0">
+            <a:schemeClr val="accent1"/>
+          </a:fillRef>
+          <a:effectRef idx="0">
+            <a:schemeClr val="accent1"/>
+          </a:effectRef>
+          <a:fontRef idx="minor">
+            <a:schemeClr val="tx1"/>
+          </a:fontRef>
+        </p:style>
+      </p:cxnSp>
+      <p:cxnSp>
+        <p:nvCxnSpPr>
+          <p:cNvPr id="122" name="Elbow Connector 182">
+            <a:extLst>
+              <a:ext uri="{FF2B5EF4-FFF2-40B4-BE49-F238E27FC236}">
+                <a16:creationId xmlns:a16="http://schemas.microsoft.com/office/drawing/2014/main" id="{0C758E67-52E5-4EA2-BE29-F41DBEE335D4}"/>
               </a:ext>
             </a:extLst>
           </p:cNvPr>
           <p:cNvCxnSpPr>
             <a:cxnSpLocks/>
             <a:stCxn id="11" idx="3"/>
-            <a:endCxn id="13" idx="1"/>
+            <a:endCxn id="49" idx="1"/>
           </p:cNvCxnSpPr>
           <p:nvPr/>
         </p:nvCxnSpPr>
         <p:spPr>
+          <a:xfrm>
+            <a:off x="4628064" y="1915091"/>
+            <a:ext cx="1482793" cy="793501"/>
+          </a:xfrm>
+          <a:prstGeom prst="straightConnector1">
+            <a:avLst/>
+          </a:prstGeom>
+          <a:ln w="38100">
+            <a:solidFill>
+              <a:schemeClr val="accent1">
+                <a:lumMod val="75000"/>
+              </a:schemeClr>
+            </a:solidFill>
+            <a:prstDash val="solid"/>
+            <a:headEnd type="none" w="med" len="med"/>
+            <a:tailEnd type="triangle" w="med" len="med"/>
+          </a:ln>
+        </p:spPr>
+        <p:style>
+          <a:lnRef idx="1">
+            <a:schemeClr val="accent1"/>
+          </a:lnRef>
+          <a:fillRef idx="0">
+            <a:schemeClr val="accent1"/>
+          </a:fillRef>
+          <a:effectRef idx="0">
+            <a:schemeClr val="accent1"/>
+          </a:effectRef>
+          <a:fontRef idx="minor">
+            <a:schemeClr val="tx1"/>
+          </a:fontRef>
+        </p:style>
+      </p:cxnSp>
+      <p:cxnSp>
+        <p:nvCxnSpPr>
+          <p:cNvPr id="126" name="Elbow Connector 182">
+            <a:extLst>
+              <a:ext uri="{FF2B5EF4-FFF2-40B4-BE49-F238E27FC236}">
+                <a16:creationId xmlns:a16="http://schemas.microsoft.com/office/drawing/2014/main" id="{A11CD9B8-33B3-4F05-B70E-0A181541B1AA}"/>
+              </a:ext>
+            </a:extLst>
+          </p:cNvPr>
+          <p:cNvCxnSpPr>
+            <a:cxnSpLocks/>
+            <a:stCxn id="10" idx="3"/>
+            <a:endCxn id="49" idx="1"/>
+          </p:cNvCxnSpPr>
+          <p:nvPr/>
+        </p:nvCxnSpPr>
+        <p:spPr>
           <a:xfrm flipV="1">
-            <a:off x="3605066" y="1219903"/>
-            <a:ext cx="2428330" cy="3763329"/>
+            <a:off x="4627505" y="2708592"/>
+            <a:ext cx="1483352" cy="831559"/>
+          </a:xfrm>
+          <a:prstGeom prst="straightConnector1">
+            <a:avLst/>
+          </a:prstGeom>
+          <a:ln w="38100">
+            <a:solidFill>
+              <a:schemeClr val="accent1">
+                <a:lumMod val="75000"/>
+              </a:schemeClr>
+            </a:solidFill>
+            <a:prstDash val="solid"/>
+            <a:headEnd type="none" w="med" len="med"/>
+            <a:tailEnd type="triangle" w="med" len="med"/>
+          </a:ln>
+        </p:spPr>
+        <p:style>
+          <a:lnRef idx="1">
+            <a:schemeClr val="accent1"/>
+          </a:lnRef>
+          <a:fillRef idx="0">
+            <a:schemeClr val="accent1"/>
+          </a:fillRef>
+          <a:effectRef idx="0">
+            <a:schemeClr val="accent1"/>
+          </a:effectRef>
+          <a:fontRef idx="minor">
+            <a:schemeClr val="tx1"/>
+          </a:fontRef>
+        </p:style>
+      </p:cxnSp>
+      <p:cxnSp>
+        <p:nvCxnSpPr>
+          <p:cNvPr id="128" name="Elbow Connector 182">
+            <a:extLst>
+              <a:ext uri="{FF2B5EF4-FFF2-40B4-BE49-F238E27FC236}">
+                <a16:creationId xmlns:a16="http://schemas.microsoft.com/office/drawing/2014/main" id="{A8E9D62D-AD96-4D54-AEB9-5499A0D93547}"/>
+              </a:ext>
+            </a:extLst>
+          </p:cNvPr>
+          <p:cNvCxnSpPr>
+            <a:cxnSpLocks/>
+            <a:stCxn id="8" idx="3"/>
+            <a:endCxn id="49" idx="1"/>
+          </p:cNvCxnSpPr>
+          <p:nvPr/>
+        </p:nvCxnSpPr>
+        <p:spPr>
+          <a:xfrm flipV="1">
+            <a:off x="4628064" y="2708592"/>
+            <a:ext cx="1482793" cy="1505936"/>
           </a:xfrm>
           <a:prstGeom prst="straightConnector1">
             <a:avLst/>
@@ -5332,7 +7463,7 @@
     </p:spTree>
     <p:extLst>
       <p:ext uri="{BB962C8B-B14F-4D97-AF65-F5344CB8AC3E}">
-        <p14:creationId xmlns:p14="http://schemas.microsoft.com/office/powerpoint/2010/main" val="1309868090"/>
+        <p14:creationId xmlns:p14="http://schemas.microsoft.com/office/powerpoint/2010/main" val="796985314"/>
       </p:ext>
     </p:extLst>
   </p:cSld>

</xml_diff>

<commit_message>
Added the powerpoint and image files with mail support diagrams
</commit_message>
<xml_diff>
--- a/images/backendLogicStorageOverview.pptx
+++ b/images/backendLogicStorageOverview.pptx
@@ -5,16 +5,15 @@
     <p:sldMasterId id="2147483648" r:id="rId1"/>
   </p:sldMasterIdLst>
   <p:notesMasterIdLst>
-    <p:notesMasterId r:id="rId4"/>
+    <p:notesMasterId r:id="rId3"/>
   </p:notesMasterIdLst>
   <p:sldIdLst>
-    <p:sldId id="257" r:id="rId2"/>
-    <p:sldId id="258" r:id="rId3"/>
+    <p:sldId id="258" r:id="rId2"/>
   </p:sldIdLst>
-  <p:sldSz cx="8640763" cy="6300788"/>
+  <p:sldSz cx="8640763" cy="7380288"/>
   <p:notesSz cx="6797675" cy="9872663"/>
   <p:custDataLst>
-    <p:tags r:id="rId5"/>
+    <p:tags r:id="rId4"/>
   </p:custDataLst>
   <p:defaultTextStyle>
     <a:defPPr>
@@ -114,12 +113,12 @@
   <p:extLst>
     <p:ext uri="{EFAFB233-063F-42B5-8137-9DF3F51BA10A}">
       <p15:sldGuideLst xmlns:p15="http://schemas.microsoft.com/office/powerpoint/2012/main">
-        <p15:guide id="1" orient="horz" pos="1985">
+        <p15:guide id="1" orient="horz" pos="2325" userDrawn="1">
           <p15:clr>
             <a:srgbClr val="A4A3A4"/>
           </p15:clr>
         </p15:guide>
-        <p15:guide id="2" pos="2722">
+        <p15:guide id="2" pos="2722" userDrawn="1">
           <p15:clr>
             <a:srgbClr val="A4A3A4"/>
           </p15:clr>
@@ -213,7 +212,7 @@
             <a:fld id="{5D8FA8FF-20DC-44E5-8C35-13EAF0A5698C}" type="datetimeFigureOut">
               <a:rPr lang="en-SG" smtClean="0"/>
               <a:pPr/>
-              <a:t>19/9/2019</a:t>
+              <a:t>13/11/2019</a:t>
             </a:fld>
             <a:endParaRPr lang="en-SG"/>
           </a:p>
@@ -231,8 +230,8 @@
         </p:nvSpPr>
         <p:spPr>
           <a:xfrm>
-            <a:off x="860425" y="739775"/>
-            <a:ext cx="5076825" cy="3703638"/>
+            <a:off x="1230313" y="739775"/>
+            <a:ext cx="4337050" cy="3703638"/>
           </a:xfrm>
           <a:prstGeom prst="rect">
             <a:avLst/>
@@ -511,8 +510,8 @@
         </p:nvSpPr>
         <p:spPr>
           <a:xfrm>
-            <a:off x="648057" y="1957328"/>
-            <a:ext cx="7344649" cy="1350586"/>
+            <a:off x="648060" y="2292674"/>
+            <a:ext cx="7344649" cy="1581979"/>
           </a:xfrm>
         </p:spPr>
         <p:txBody>
@@ -538,8 +537,8 @@
         </p:nvSpPr>
         <p:spPr>
           <a:xfrm>
-            <a:off x="1296115" y="3570447"/>
-            <a:ext cx="6048534" cy="1610201"/>
+            <a:off x="1296115" y="4182166"/>
+            <a:ext cx="6048534" cy="1886073"/>
           </a:xfrm>
         </p:spPr>
         <p:txBody>
@@ -555,7 +554,7 @@
                 </a:solidFill>
               </a:defRPr>
             </a:lvl1pPr>
-            <a:lvl2pPr marL="426888" indent="0" algn="ctr">
+            <a:lvl2pPr marL="426862" indent="0" algn="ctr">
               <a:buNone/>
               <a:defRPr>
                 <a:solidFill>
@@ -565,7 +564,7 @@
                 </a:solidFill>
               </a:defRPr>
             </a:lvl2pPr>
-            <a:lvl3pPr marL="853775" indent="0" algn="ctr">
+            <a:lvl3pPr marL="853723" indent="0" algn="ctr">
               <a:buNone/>
               <a:defRPr>
                 <a:solidFill>
@@ -575,7 +574,7 @@
                 </a:solidFill>
               </a:defRPr>
             </a:lvl3pPr>
-            <a:lvl4pPr marL="1280663" indent="0" algn="ctr">
+            <a:lvl4pPr marL="1280585" indent="0" algn="ctr">
               <a:buNone/>
               <a:defRPr>
                 <a:solidFill>
@@ -585,7 +584,7 @@
                 </a:solidFill>
               </a:defRPr>
             </a:lvl4pPr>
-            <a:lvl5pPr marL="1707551" indent="0" algn="ctr">
+            <a:lvl5pPr marL="1707446" indent="0" algn="ctr">
               <a:buNone/>
               <a:defRPr>
                 <a:solidFill>
@@ -595,7 +594,7 @@
                 </a:solidFill>
               </a:defRPr>
             </a:lvl5pPr>
-            <a:lvl6pPr marL="2134438" indent="0" algn="ctr">
+            <a:lvl6pPr marL="2134307" indent="0" algn="ctr">
               <a:buNone/>
               <a:defRPr>
                 <a:solidFill>
@@ -605,7 +604,7 @@
                 </a:solidFill>
               </a:defRPr>
             </a:lvl6pPr>
-            <a:lvl7pPr marL="2561326" indent="0" algn="ctr">
+            <a:lvl7pPr marL="2561169" indent="0" algn="ctr">
               <a:buNone/>
               <a:defRPr>
                 <a:solidFill>
@@ -615,7 +614,7 @@
                 </a:solidFill>
               </a:defRPr>
             </a:lvl7pPr>
-            <a:lvl8pPr marL="2988213" indent="0" algn="ctr">
+            <a:lvl8pPr marL="2988030" indent="0" algn="ctr">
               <a:buNone/>
               <a:defRPr>
                 <a:solidFill>
@@ -625,7 +624,7 @@
                 </a:solidFill>
               </a:defRPr>
             </a:lvl8pPr>
-            <a:lvl9pPr marL="3415101" indent="0" algn="ctr">
+            <a:lvl9pPr marL="3414892" indent="0" algn="ctr">
               <a:buNone/>
               <a:defRPr>
                 <a:solidFill>
@@ -662,7 +661,7 @@
             <a:fld id="{1D8BD707-D9CF-40AE-B4C6-C98DA3205C09}" type="datetimeFigureOut">
               <a:rPr lang="en-US" smtClean="0"/>
               <a:pPr/>
-              <a:t>9/19/2019</a:t>
+              <a:t>11/13/2019</a:t>
             </a:fld>
             <a:endParaRPr lang="en-US"/>
           </a:p>
@@ -827,7 +826,7 @@
             <a:fld id="{1D8BD707-D9CF-40AE-B4C6-C98DA3205C09}" type="datetimeFigureOut">
               <a:rPr lang="en-US" smtClean="0"/>
               <a:pPr/>
-              <a:t>9/19/2019</a:t>
+              <a:t>11/13/2019</a:t>
             </a:fld>
             <a:endParaRPr lang="en-US"/>
           </a:p>
@@ -913,8 +912,8 @@
         </p:nvSpPr>
         <p:spPr>
           <a:xfrm>
-            <a:off x="6264553" y="252324"/>
-            <a:ext cx="1944172" cy="5376089"/>
+            <a:off x="6264553" y="295556"/>
+            <a:ext cx="1944172" cy="6297162"/>
           </a:xfrm>
         </p:spPr>
         <p:txBody>
@@ -940,8 +939,8 @@
         </p:nvSpPr>
         <p:spPr>
           <a:xfrm>
-            <a:off x="432038" y="252324"/>
-            <a:ext cx="5688502" cy="5376089"/>
+            <a:off x="432038" y="295556"/>
+            <a:ext cx="5688502" cy="6297162"/>
           </a:xfrm>
         </p:spPr>
         <p:txBody>
@@ -1002,7 +1001,7 @@
             <a:fld id="{1D8BD707-D9CF-40AE-B4C6-C98DA3205C09}" type="datetimeFigureOut">
               <a:rPr lang="en-US" smtClean="0"/>
               <a:pPr/>
-              <a:t>9/19/2019</a:t>
+              <a:t>11/13/2019</a:t>
             </a:fld>
             <a:endParaRPr lang="en-US"/>
           </a:p>
@@ -1167,7 +1166,7 @@
             <a:fld id="{1D8BD707-D9CF-40AE-B4C6-C98DA3205C09}" type="datetimeFigureOut">
               <a:rPr lang="en-US" smtClean="0"/>
               <a:pPr/>
-              <a:t>9/19/2019</a:t>
+              <a:t>11/13/2019</a:t>
             </a:fld>
             <a:endParaRPr lang="en-US"/>
           </a:p>
@@ -1253,8 +1252,8 @@
         </p:nvSpPr>
         <p:spPr>
           <a:xfrm>
-            <a:off x="682561" y="4048840"/>
-            <a:ext cx="7344649" cy="1251407"/>
+            <a:off x="682564" y="4742519"/>
+            <a:ext cx="7344649" cy="1465808"/>
           </a:xfrm>
         </p:spPr>
         <p:txBody>
@@ -1284,8 +1283,8 @@
         </p:nvSpPr>
         <p:spPr>
           <a:xfrm>
-            <a:off x="682561" y="2670543"/>
-            <a:ext cx="7344649" cy="1378297"/>
+            <a:off x="682564" y="3128083"/>
+            <a:ext cx="7344649" cy="1614438"/>
           </a:xfrm>
         </p:spPr>
         <p:txBody>
@@ -1293,7 +1292,7 @@
           <a:lstStyle>
             <a:lvl1pPr marL="0" indent="0">
               <a:buNone/>
-              <a:defRPr sz="1900">
+              <a:defRPr sz="1899">
                 <a:solidFill>
                   <a:schemeClr val="tx1">
                     <a:tint val="75000"/>
@@ -1301,7 +1300,7 @@
                 </a:solidFill>
               </a:defRPr>
             </a:lvl1pPr>
-            <a:lvl2pPr marL="426888" indent="0">
+            <a:lvl2pPr marL="426862" indent="0">
               <a:buNone/>
               <a:defRPr sz="1700">
                 <a:solidFill>
@@ -1311,7 +1310,7 @@
                 </a:solidFill>
               </a:defRPr>
             </a:lvl2pPr>
-            <a:lvl3pPr marL="853775" indent="0">
+            <a:lvl3pPr marL="853723" indent="0">
               <a:buNone/>
               <a:defRPr sz="1500">
                 <a:solidFill>
@@ -1321,7 +1320,7 @@
                 </a:solidFill>
               </a:defRPr>
             </a:lvl3pPr>
-            <a:lvl4pPr marL="1280663" indent="0">
+            <a:lvl4pPr marL="1280585" indent="0">
               <a:buNone/>
               <a:defRPr sz="1300">
                 <a:solidFill>
@@ -1331,7 +1330,7 @@
                 </a:solidFill>
               </a:defRPr>
             </a:lvl4pPr>
-            <a:lvl5pPr marL="1707551" indent="0">
+            <a:lvl5pPr marL="1707446" indent="0">
               <a:buNone/>
               <a:defRPr sz="1300">
                 <a:solidFill>
@@ -1341,7 +1340,7 @@
                 </a:solidFill>
               </a:defRPr>
             </a:lvl5pPr>
-            <a:lvl6pPr marL="2134438" indent="0">
+            <a:lvl6pPr marL="2134307" indent="0">
               <a:buNone/>
               <a:defRPr sz="1300">
                 <a:solidFill>
@@ -1351,7 +1350,7 @@
                 </a:solidFill>
               </a:defRPr>
             </a:lvl6pPr>
-            <a:lvl7pPr marL="2561326" indent="0">
+            <a:lvl7pPr marL="2561169" indent="0">
               <a:buNone/>
               <a:defRPr sz="1300">
                 <a:solidFill>
@@ -1361,7 +1360,7 @@
                 </a:solidFill>
               </a:defRPr>
             </a:lvl7pPr>
-            <a:lvl8pPr marL="2988213" indent="0">
+            <a:lvl8pPr marL="2988030" indent="0">
               <a:buNone/>
               <a:defRPr sz="1300">
                 <a:solidFill>
@@ -1371,7 +1370,7 @@
                 </a:solidFill>
               </a:defRPr>
             </a:lvl8pPr>
-            <a:lvl9pPr marL="3415101" indent="0">
+            <a:lvl9pPr marL="3414892" indent="0">
               <a:buNone/>
               <a:defRPr sz="1300">
                 <a:solidFill>
@@ -1409,7 +1408,7 @@
             <a:fld id="{1D8BD707-D9CF-40AE-B4C6-C98DA3205C09}" type="datetimeFigureOut">
               <a:rPr lang="en-US" smtClean="0"/>
               <a:pPr/>
-              <a:t>9/19/2019</a:t>
+              <a:t>11/13/2019</a:t>
             </a:fld>
             <a:endParaRPr lang="en-US"/>
           </a:p>
@@ -1517,8 +1516,8 @@
         </p:nvSpPr>
         <p:spPr>
           <a:xfrm>
-            <a:off x="432038" y="1470184"/>
-            <a:ext cx="3816337" cy="4158229"/>
+            <a:off x="432040" y="1722069"/>
+            <a:ext cx="3816337" cy="4870649"/>
           </a:xfrm>
         </p:spPr>
         <p:txBody>
@@ -1531,7 +1530,7 @@
               <a:defRPr sz="2200"/>
             </a:lvl2pPr>
             <a:lvl3pPr>
-              <a:defRPr sz="1900"/>
+              <a:defRPr sz="1899"/>
             </a:lvl3pPr>
             <a:lvl4pPr>
               <a:defRPr sz="1700"/>
@@ -1601,8 +1600,8 @@
         </p:nvSpPr>
         <p:spPr>
           <a:xfrm>
-            <a:off x="4392388" y="1470184"/>
-            <a:ext cx="3816337" cy="4158229"/>
+            <a:off x="4392391" y="1722069"/>
+            <a:ext cx="3816337" cy="4870649"/>
           </a:xfrm>
         </p:spPr>
         <p:txBody>
@@ -1615,7 +1614,7 @@
               <a:defRPr sz="2200"/>
             </a:lvl2pPr>
             <a:lvl3pPr>
-              <a:defRPr sz="1900"/>
+              <a:defRPr sz="1899"/>
             </a:lvl3pPr>
             <a:lvl4pPr>
               <a:defRPr sz="1700"/>
@@ -1691,7 +1690,7 @@
             <a:fld id="{1D8BD707-D9CF-40AE-B4C6-C98DA3205C09}" type="datetimeFigureOut">
               <a:rPr lang="en-US" smtClean="0"/>
               <a:pPr/>
-              <a:t>9/19/2019</a:t>
+              <a:t>11/13/2019</a:t>
             </a:fld>
             <a:endParaRPr lang="en-US"/>
           </a:p>
@@ -1803,8 +1802,8 @@
         </p:nvSpPr>
         <p:spPr>
           <a:xfrm>
-            <a:off x="432038" y="1410385"/>
-            <a:ext cx="3817838" cy="587781"/>
+            <a:off x="432038" y="1652025"/>
+            <a:ext cx="3817838" cy="688484"/>
           </a:xfrm>
         </p:spPr>
         <p:txBody>
@@ -1814,35 +1813,35 @@
               <a:buNone/>
               <a:defRPr sz="2200" b="1"/>
             </a:lvl1pPr>
-            <a:lvl2pPr marL="426888" indent="0">
+            <a:lvl2pPr marL="426862" indent="0">
               <a:buNone/>
-              <a:defRPr sz="1900" b="1"/>
+              <a:defRPr sz="1899" b="1"/>
             </a:lvl2pPr>
-            <a:lvl3pPr marL="853775" indent="0">
+            <a:lvl3pPr marL="853723" indent="0">
               <a:buNone/>
               <a:defRPr sz="1700" b="1"/>
             </a:lvl3pPr>
-            <a:lvl4pPr marL="1280663" indent="0">
+            <a:lvl4pPr marL="1280585" indent="0">
               <a:buNone/>
               <a:defRPr sz="1500" b="1"/>
             </a:lvl4pPr>
-            <a:lvl5pPr marL="1707551" indent="0">
+            <a:lvl5pPr marL="1707446" indent="0">
               <a:buNone/>
               <a:defRPr sz="1500" b="1"/>
             </a:lvl5pPr>
-            <a:lvl6pPr marL="2134438" indent="0">
+            <a:lvl6pPr marL="2134307" indent="0">
               <a:buNone/>
               <a:defRPr sz="1500" b="1"/>
             </a:lvl6pPr>
-            <a:lvl7pPr marL="2561326" indent="0">
+            <a:lvl7pPr marL="2561169" indent="0">
               <a:buNone/>
               <a:defRPr sz="1500" b="1"/>
             </a:lvl7pPr>
-            <a:lvl8pPr marL="2988213" indent="0">
+            <a:lvl8pPr marL="2988030" indent="0">
               <a:buNone/>
               <a:defRPr sz="1500" b="1"/>
             </a:lvl8pPr>
-            <a:lvl9pPr marL="3415101" indent="0">
+            <a:lvl9pPr marL="3414892" indent="0">
               <a:buNone/>
               <a:defRPr sz="1500" b="1"/>
             </a:lvl9pPr>
@@ -1868,8 +1867,8 @@
         </p:nvSpPr>
         <p:spPr>
           <a:xfrm>
-            <a:off x="432038" y="1998167"/>
-            <a:ext cx="3817838" cy="3630246"/>
+            <a:off x="432038" y="2340508"/>
+            <a:ext cx="3817838" cy="4252208"/>
           </a:xfrm>
         </p:spPr>
         <p:txBody>
@@ -1879,7 +1878,7 @@
               <a:defRPr sz="2200"/>
             </a:lvl1pPr>
             <a:lvl2pPr>
-              <a:defRPr sz="1900"/>
+              <a:defRPr sz="1899"/>
             </a:lvl2pPr>
             <a:lvl3pPr>
               <a:defRPr sz="1700"/>
@@ -1952,8 +1951,8 @@
         </p:nvSpPr>
         <p:spPr>
           <a:xfrm>
-            <a:off x="4389388" y="1410385"/>
-            <a:ext cx="3819337" cy="587781"/>
+            <a:off x="4389391" y="1652025"/>
+            <a:ext cx="3819337" cy="688484"/>
           </a:xfrm>
         </p:spPr>
         <p:txBody>
@@ -1963,35 +1962,35 @@
               <a:buNone/>
               <a:defRPr sz="2200" b="1"/>
             </a:lvl1pPr>
-            <a:lvl2pPr marL="426888" indent="0">
+            <a:lvl2pPr marL="426862" indent="0">
               <a:buNone/>
-              <a:defRPr sz="1900" b="1"/>
+              <a:defRPr sz="1899" b="1"/>
             </a:lvl2pPr>
-            <a:lvl3pPr marL="853775" indent="0">
+            <a:lvl3pPr marL="853723" indent="0">
               <a:buNone/>
               <a:defRPr sz="1700" b="1"/>
             </a:lvl3pPr>
-            <a:lvl4pPr marL="1280663" indent="0">
+            <a:lvl4pPr marL="1280585" indent="0">
               <a:buNone/>
               <a:defRPr sz="1500" b="1"/>
             </a:lvl4pPr>
-            <a:lvl5pPr marL="1707551" indent="0">
+            <a:lvl5pPr marL="1707446" indent="0">
               <a:buNone/>
               <a:defRPr sz="1500" b="1"/>
             </a:lvl5pPr>
-            <a:lvl6pPr marL="2134438" indent="0">
+            <a:lvl6pPr marL="2134307" indent="0">
               <a:buNone/>
               <a:defRPr sz="1500" b="1"/>
             </a:lvl6pPr>
-            <a:lvl7pPr marL="2561326" indent="0">
+            <a:lvl7pPr marL="2561169" indent="0">
               <a:buNone/>
               <a:defRPr sz="1500" b="1"/>
             </a:lvl7pPr>
-            <a:lvl8pPr marL="2988213" indent="0">
+            <a:lvl8pPr marL="2988030" indent="0">
               <a:buNone/>
               <a:defRPr sz="1500" b="1"/>
             </a:lvl8pPr>
-            <a:lvl9pPr marL="3415101" indent="0">
+            <a:lvl9pPr marL="3414892" indent="0">
               <a:buNone/>
               <a:defRPr sz="1500" b="1"/>
             </a:lvl9pPr>
@@ -2017,8 +2016,8 @@
         </p:nvSpPr>
         <p:spPr>
           <a:xfrm>
-            <a:off x="4389388" y="1998167"/>
-            <a:ext cx="3819337" cy="3630246"/>
+            <a:off x="4389391" y="2340508"/>
+            <a:ext cx="3819337" cy="4252208"/>
           </a:xfrm>
         </p:spPr>
         <p:txBody>
@@ -2028,7 +2027,7 @@
               <a:defRPr sz="2200"/>
             </a:lvl1pPr>
             <a:lvl2pPr>
-              <a:defRPr sz="1900"/>
+              <a:defRPr sz="1899"/>
             </a:lvl2pPr>
             <a:lvl3pPr>
               <a:defRPr sz="1700"/>
@@ -2107,7 +2106,7 @@
             <a:fld id="{1D8BD707-D9CF-40AE-B4C6-C98DA3205C09}" type="datetimeFigureOut">
               <a:rPr lang="en-US" smtClean="0"/>
               <a:pPr/>
-              <a:t>9/19/2019</a:t>
+              <a:t>11/13/2019</a:t>
             </a:fld>
             <a:endParaRPr lang="en-US"/>
           </a:p>
@@ -2221,7 +2220,7 @@
             <a:fld id="{1D8BD707-D9CF-40AE-B4C6-C98DA3205C09}" type="datetimeFigureOut">
               <a:rPr lang="en-US" smtClean="0"/>
               <a:pPr/>
-              <a:t>9/19/2019</a:t>
+              <a:t>11/13/2019</a:t>
             </a:fld>
             <a:endParaRPr lang="en-US"/>
           </a:p>
@@ -2313,7 +2312,7 @@
             <a:fld id="{1D8BD707-D9CF-40AE-B4C6-C98DA3205C09}" type="datetimeFigureOut">
               <a:rPr lang="en-US" smtClean="0"/>
               <a:pPr/>
-              <a:t>9/19/2019</a:t>
+              <a:t>11/13/2019</a:t>
             </a:fld>
             <a:endParaRPr lang="en-US"/>
           </a:p>
@@ -2399,15 +2398,15 @@
         </p:nvSpPr>
         <p:spPr>
           <a:xfrm>
-            <a:off x="432039" y="250864"/>
-            <a:ext cx="2842751" cy="1067634"/>
+            <a:off x="432042" y="293844"/>
+            <a:ext cx="2842751" cy="1250549"/>
           </a:xfrm>
         </p:spPr>
         <p:txBody>
           <a:bodyPr anchor="b"/>
           <a:lstStyle>
             <a:lvl1pPr algn="l">
-              <a:defRPr sz="1900" b="1"/>
+              <a:defRPr sz="1899" b="1"/>
             </a:lvl1pPr>
           </a:lstStyle>
           <a:p>
@@ -2430,8 +2429,8 @@
         </p:nvSpPr>
         <p:spPr>
           <a:xfrm>
-            <a:off x="3378298" y="250865"/>
-            <a:ext cx="4830427" cy="5377548"/>
+            <a:off x="3378301" y="293845"/>
+            <a:ext cx="4830427" cy="6298871"/>
           </a:xfrm>
         </p:spPr>
         <p:txBody>
@@ -2447,22 +2446,22 @@
               <a:defRPr sz="2200"/>
             </a:lvl3pPr>
             <a:lvl4pPr>
-              <a:defRPr sz="1900"/>
+              <a:defRPr sz="1899"/>
             </a:lvl4pPr>
             <a:lvl5pPr>
-              <a:defRPr sz="1900"/>
+              <a:defRPr sz="1899"/>
             </a:lvl5pPr>
             <a:lvl6pPr>
-              <a:defRPr sz="1900"/>
+              <a:defRPr sz="1899"/>
             </a:lvl6pPr>
             <a:lvl7pPr>
-              <a:defRPr sz="1900"/>
+              <a:defRPr sz="1899"/>
             </a:lvl7pPr>
             <a:lvl8pPr>
-              <a:defRPr sz="1900"/>
+              <a:defRPr sz="1899"/>
             </a:lvl8pPr>
             <a:lvl9pPr>
-              <a:defRPr sz="1900"/>
+              <a:defRPr sz="1899"/>
             </a:lvl9pPr>
           </a:lstStyle>
           <a:p>
@@ -2514,8 +2513,8 @@
         </p:nvSpPr>
         <p:spPr>
           <a:xfrm>
-            <a:off x="432039" y="1318499"/>
-            <a:ext cx="2842751" cy="4309914"/>
+            <a:off x="432042" y="1544394"/>
+            <a:ext cx="2842751" cy="5048322"/>
           </a:xfrm>
         </p:spPr>
         <p:txBody>
@@ -2525,35 +2524,35 @@
               <a:buNone/>
               <a:defRPr sz="1300"/>
             </a:lvl1pPr>
-            <a:lvl2pPr marL="426888" indent="0">
+            <a:lvl2pPr marL="426862" indent="0">
               <a:buNone/>
               <a:defRPr sz="1100"/>
             </a:lvl2pPr>
-            <a:lvl3pPr marL="853775" indent="0">
+            <a:lvl3pPr marL="853723" indent="0">
               <a:buNone/>
               <a:defRPr sz="900"/>
             </a:lvl3pPr>
-            <a:lvl4pPr marL="1280663" indent="0">
+            <a:lvl4pPr marL="1280585" indent="0">
               <a:buNone/>
               <a:defRPr sz="800"/>
             </a:lvl4pPr>
-            <a:lvl5pPr marL="1707551" indent="0">
+            <a:lvl5pPr marL="1707446" indent="0">
               <a:buNone/>
               <a:defRPr sz="800"/>
             </a:lvl5pPr>
-            <a:lvl6pPr marL="2134438" indent="0">
+            <a:lvl6pPr marL="2134307" indent="0">
               <a:buNone/>
               <a:defRPr sz="800"/>
             </a:lvl6pPr>
-            <a:lvl7pPr marL="2561326" indent="0">
+            <a:lvl7pPr marL="2561169" indent="0">
               <a:buNone/>
               <a:defRPr sz="800"/>
             </a:lvl7pPr>
-            <a:lvl8pPr marL="2988213" indent="0">
+            <a:lvl8pPr marL="2988030" indent="0">
               <a:buNone/>
               <a:defRPr sz="800"/>
             </a:lvl8pPr>
-            <a:lvl9pPr marL="3415101" indent="0">
+            <a:lvl9pPr marL="3414892" indent="0">
               <a:buNone/>
               <a:defRPr sz="800"/>
             </a:lvl9pPr>
@@ -2585,7 +2584,7 @@
             <a:fld id="{1D8BD707-D9CF-40AE-B4C6-C98DA3205C09}" type="datetimeFigureOut">
               <a:rPr lang="en-US" smtClean="0"/>
               <a:pPr/>
-              <a:t>9/19/2019</a:t>
+              <a:t>11/13/2019</a:t>
             </a:fld>
             <a:endParaRPr lang="en-US"/>
           </a:p>
@@ -2671,15 +2670,15 @@
         </p:nvSpPr>
         <p:spPr>
           <a:xfrm>
-            <a:off x="1693650" y="4410551"/>
-            <a:ext cx="5184458" cy="520691"/>
+            <a:off x="1693650" y="5166201"/>
+            <a:ext cx="5184458" cy="609900"/>
           </a:xfrm>
         </p:spPr>
         <p:txBody>
           <a:bodyPr anchor="b"/>
           <a:lstStyle>
             <a:lvl1pPr algn="l">
-              <a:defRPr sz="1900" b="1"/>
+              <a:defRPr sz="1899" b="1"/>
             </a:lvl1pPr>
           </a:lstStyle>
           <a:p>
@@ -2702,8 +2701,8 @@
         </p:nvSpPr>
         <p:spPr>
           <a:xfrm>
-            <a:off x="1693650" y="562987"/>
-            <a:ext cx="5184458" cy="3780473"/>
+            <a:off x="1693650" y="659444"/>
+            <a:ext cx="5184458" cy="4428173"/>
           </a:xfrm>
         </p:spPr>
         <p:txBody>
@@ -2713,37 +2712,37 @@
               <a:buNone/>
               <a:defRPr sz="3000"/>
             </a:lvl1pPr>
-            <a:lvl2pPr marL="426888" indent="0">
+            <a:lvl2pPr marL="426862" indent="0">
               <a:buNone/>
               <a:defRPr sz="2600"/>
             </a:lvl2pPr>
-            <a:lvl3pPr marL="853775" indent="0">
+            <a:lvl3pPr marL="853723" indent="0">
               <a:buNone/>
               <a:defRPr sz="2200"/>
             </a:lvl3pPr>
-            <a:lvl4pPr marL="1280663" indent="0">
+            <a:lvl4pPr marL="1280585" indent="0">
               <a:buNone/>
-              <a:defRPr sz="1900"/>
+              <a:defRPr sz="1899"/>
             </a:lvl4pPr>
-            <a:lvl5pPr marL="1707551" indent="0">
+            <a:lvl5pPr marL="1707446" indent="0">
               <a:buNone/>
-              <a:defRPr sz="1900"/>
+              <a:defRPr sz="1899"/>
             </a:lvl5pPr>
-            <a:lvl6pPr marL="2134438" indent="0">
+            <a:lvl6pPr marL="2134307" indent="0">
               <a:buNone/>
-              <a:defRPr sz="1900"/>
+              <a:defRPr sz="1899"/>
             </a:lvl6pPr>
-            <a:lvl7pPr marL="2561326" indent="0">
+            <a:lvl7pPr marL="2561169" indent="0">
               <a:buNone/>
-              <a:defRPr sz="1900"/>
+              <a:defRPr sz="1899"/>
             </a:lvl7pPr>
-            <a:lvl8pPr marL="2988213" indent="0">
+            <a:lvl8pPr marL="2988030" indent="0">
               <a:buNone/>
-              <a:defRPr sz="1900"/>
+              <a:defRPr sz="1899"/>
             </a:lvl8pPr>
-            <a:lvl9pPr marL="3415101" indent="0">
+            <a:lvl9pPr marL="3414892" indent="0">
               <a:buNone/>
-              <a:defRPr sz="1900"/>
+              <a:defRPr sz="1899"/>
             </a:lvl9pPr>
           </a:lstStyle>
           <a:p>
@@ -2763,8 +2762,8 @@
         </p:nvSpPr>
         <p:spPr>
           <a:xfrm>
-            <a:off x="1693650" y="4931242"/>
-            <a:ext cx="5184458" cy="739467"/>
+            <a:off x="1693650" y="5776101"/>
+            <a:ext cx="5184458" cy="866158"/>
           </a:xfrm>
         </p:spPr>
         <p:txBody>
@@ -2774,35 +2773,35 @@
               <a:buNone/>
               <a:defRPr sz="1300"/>
             </a:lvl1pPr>
-            <a:lvl2pPr marL="426888" indent="0">
+            <a:lvl2pPr marL="426862" indent="0">
               <a:buNone/>
               <a:defRPr sz="1100"/>
             </a:lvl2pPr>
-            <a:lvl3pPr marL="853775" indent="0">
+            <a:lvl3pPr marL="853723" indent="0">
               <a:buNone/>
               <a:defRPr sz="900"/>
             </a:lvl3pPr>
-            <a:lvl4pPr marL="1280663" indent="0">
+            <a:lvl4pPr marL="1280585" indent="0">
               <a:buNone/>
               <a:defRPr sz="800"/>
             </a:lvl4pPr>
-            <a:lvl5pPr marL="1707551" indent="0">
+            <a:lvl5pPr marL="1707446" indent="0">
               <a:buNone/>
               <a:defRPr sz="800"/>
             </a:lvl5pPr>
-            <a:lvl6pPr marL="2134438" indent="0">
+            <a:lvl6pPr marL="2134307" indent="0">
               <a:buNone/>
               <a:defRPr sz="800"/>
             </a:lvl6pPr>
-            <a:lvl7pPr marL="2561326" indent="0">
+            <a:lvl7pPr marL="2561169" indent="0">
               <a:buNone/>
               <a:defRPr sz="800"/>
             </a:lvl7pPr>
-            <a:lvl8pPr marL="2988213" indent="0">
+            <a:lvl8pPr marL="2988030" indent="0">
               <a:buNone/>
               <a:defRPr sz="800"/>
             </a:lvl8pPr>
-            <a:lvl9pPr marL="3415101" indent="0">
+            <a:lvl9pPr marL="3414892" indent="0">
               <a:buNone/>
               <a:defRPr sz="800"/>
             </a:lvl9pPr>
@@ -2834,7 +2833,7 @@
             <a:fld id="{1D8BD707-D9CF-40AE-B4C6-C98DA3205C09}" type="datetimeFigureOut">
               <a:rPr lang="en-US" smtClean="0"/>
               <a:pPr/>
-              <a:t>9/19/2019</a:t>
+              <a:t>11/13/2019</a:t>
             </a:fld>
             <a:endParaRPr lang="en-US"/>
           </a:p>
@@ -2925,8 +2924,8 @@
         </p:nvSpPr>
         <p:spPr>
           <a:xfrm>
-            <a:off x="432038" y="252324"/>
-            <a:ext cx="7776687" cy="1050131"/>
+            <a:off x="432041" y="295556"/>
+            <a:ext cx="7776687" cy="1230048"/>
           </a:xfrm>
           <a:prstGeom prst="rect">
             <a:avLst/>
@@ -2957,8 +2956,8 @@
         </p:nvSpPr>
         <p:spPr>
           <a:xfrm>
-            <a:off x="432038" y="1470184"/>
-            <a:ext cx="7776687" cy="4158229"/>
+            <a:off x="432041" y="1722069"/>
+            <a:ext cx="7776687" cy="4870649"/>
           </a:xfrm>
           <a:prstGeom prst="rect">
             <a:avLst/>
@@ -3018,8 +3017,8 @@
         </p:nvSpPr>
         <p:spPr>
           <a:xfrm>
-            <a:off x="432038" y="5839897"/>
-            <a:ext cx="2016178" cy="335459"/>
+            <a:off x="432038" y="6840434"/>
+            <a:ext cx="2016178" cy="392932"/>
           </a:xfrm>
           <a:prstGeom prst="rect">
             <a:avLst/>
@@ -3042,7 +3041,7 @@
             <a:fld id="{1D8BD707-D9CF-40AE-B4C6-C98DA3205C09}" type="datetimeFigureOut">
               <a:rPr lang="en-US" smtClean="0"/>
               <a:pPr/>
-              <a:t>9/19/2019</a:t>
+              <a:t>11/13/2019</a:t>
             </a:fld>
             <a:endParaRPr lang="en-US"/>
           </a:p>
@@ -3060,8 +3059,8 @@
         </p:nvSpPr>
         <p:spPr>
           <a:xfrm>
-            <a:off x="2952261" y="5839897"/>
-            <a:ext cx="2736242" cy="335459"/>
+            <a:off x="2952261" y="6840434"/>
+            <a:ext cx="2736242" cy="392932"/>
           </a:xfrm>
           <a:prstGeom prst="rect">
             <a:avLst/>
@@ -3097,8 +3096,8 @@
         </p:nvSpPr>
         <p:spPr>
           <a:xfrm>
-            <a:off x="6192547" y="5839897"/>
-            <a:ext cx="2016178" cy="335459"/>
+            <a:off x="6192547" y="6840434"/>
+            <a:ext cx="2016178" cy="392932"/>
           </a:xfrm>
           <a:prstGeom prst="rect">
             <a:avLst/>
@@ -3145,12 +3144,12 @@
   </p:sldLayoutIdLst>
   <p:txStyles>
     <p:titleStyle>
-      <a:lvl1pPr algn="ctr" defTabSz="853775" rtl="0" eaLnBrk="1" latinLnBrk="0" hangingPunct="1">
+      <a:lvl1pPr algn="ctr" defTabSz="853723" rtl="0" eaLnBrk="1" latinLnBrk="0" hangingPunct="1">
         <a:spcBef>
           <a:spcPct val="0"/>
         </a:spcBef>
         <a:buNone/>
-        <a:defRPr sz="4100" kern="1200">
+        <a:defRPr sz="4099" kern="1200">
           <a:solidFill>
             <a:schemeClr val="tx1"/>
           </a:solidFill>
@@ -3161,7 +3160,7 @@
       </a:lvl1pPr>
     </p:titleStyle>
     <p:bodyStyle>
-      <a:lvl1pPr marL="320166" indent="-320166" algn="l" defTabSz="853775" rtl="0" eaLnBrk="1" latinLnBrk="0" hangingPunct="1">
+      <a:lvl1pPr marL="320146" indent="-320146" algn="l" defTabSz="853723" rtl="0" eaLnBrk="1" latinLnBrk="0" hangingPunct="1">
         <a:spcBef>
           <a:spcPct val="20000"/>
         </a:spcBef>
@@ -3176,7 +3175,7 @@
           <a:cs typeface="+mn-cs"/>
         </a:defRPr>
       </a:lvl1pPr>
-      <a:lvl2pPr marL="693692" indent="-266805" algn="l" defTabSz="853775" rtl="0" eaLnBrk="1" latinLnBrk="0" hangingPunct="1">
+      <a:lvl2pPr marL="693649" indent="-266789" algn="l" defTabSz="853723" rtl="0" eaLnBrk="1" latinLnBrk="0" hangingPunct="1">
         <a:spcBef>
           <a:spcPct val="20000"/>
         </a:spcBef>
@@ -3191,7 +3190,7 @@
           <a:cs typeface="+mn-cs"/>
         </a:defRPr>
       </a:lvl2pPr>
-      <a:lvl3pPr marL="1067219" indent="-213444" algn="l" defTabSz="853775" rtl="0" eaLnBrk="1" latinLnBrk="0" hangingPunct="1">
+      <a:lvl3pPr marL="1067154" indent="-213431" algn="l" defTabSz="853723" rtl="0" eaLnBrk="1" latinLnBrk="0" hangingPunct="1">
         <a:spcBef>
           <a:spcPct val="20000"/>
         </a:spcBef>
@@ -3206,13 +3205,13 @@
           <a:cs typeface="+mn-cs"/>
         </a:defRPr>
       </a:lvl3pPr>
-      <a:lvl4pPr marL="1494107" indent="-213444" algn="l" defTabSz="853775" rtl="0" eaLnBrk="1" latinLnBrk="0" hangingPunct="1">
+      <a:lvl4pPr marL="1494016" indent="-213431" algn="l" defTabSz="853723" rtl="0" eaLnBrk="1" latinLnBrk="0" hangingPunct="1">
         <a:spcBef>
           <a:spcPct val="20000"/>
         </a:spcBef>
         <a:buFont typeface="Arial" pitchFamily="34" charset="0"/>
         <a:buChar char="–"/>
-        <a:defRPr sz="1900" kern="1200">
+        <a:defRPr sz="1899" kern="1200">
           <a:solidFill>
             <a:schemeClr val="tx1"/>
           </a:solidFill>
@@ -3221,13 +3220,13 @@
           <a:cs typeface="+mn-cs"/>
         </a:defRPr>
       </a:lvl4pPr>
-      <a:lvl5pPr marL="1920994" indent="-213444" algn="l" defTabSz="853775" rtl="0" eaLnBrk="1" latinLnBrk="0" hangingPunct="1">
+      <a:lvl5pPr marL="1920876" indent="-213431" algn="l" defTabSz="853723" rtl="0" eaLnBrk="1" latinLnBrk="0" hangingPunct="1">
         <a:spcBef>
           <a:spcPct val="20000"/>
         </a:spcBef>
         <a:buFont typeface="Arial" pitchFamily="34" charset="0"/>
         <a:buChar char="»"/>
-        <a:defRPr sz="1900" kern="1200">
+        <a:defRPr sz="1899" kern="1200">
           <a:solidFill>
             <a:schemeClr val="tx1"/>
           </a:solidFill>
@@ -3236,13 +3235,13 @@
           <a:cs typeface="+mn-cs"/>
         </a:defRPr>
       </a:lvl5pPr>
-      <a:lvl6pPr marL="2347882" indent="-213444" algn="l" defTabSz="853775" rtl="0" eaLnBrk="1" latinLnBrk="0" hangingPunct="1">
+      <a:lvl6pPr marL="2347738" indent="-213431" algn="l" defTabSz="853723" rtl="0" eaLnBrk="1" latinLnBrk="0" hangingPunct="1">
         <a:spcBef>
           <a:spcPct val="20000"/>
         </a:spcBef>
         <a:buFont typeface="Arial" pitchFamily="34" charset="0"/>
         <a:buChar char="•"/>
-        <a:defRPr sz="1900" kern="1200">
+        <a:defRPr sz="1899" kern="1200">
           <a:solidFill>
             <a:schemeClr val="tx1"/>
           </a:solidFill>
@@ -3251,13 +3250,13 @@
           <a:cs typeface="+mn-cs"/>
         </a:defRPr>
       </a:lvl6pPr>
-      <a:lvl7pPr marL="2774770" indent="-213444" algn="l" defTabSz="853775" rtl="0" eaLnBrk="1" latinLnBrk="0" hangingPunct="1">
+      <a:lvl7pPr marL="2774600" indent="-213431" algn="l" defTabSz="853723" rtl="0" eaLnBrk="1" latinLnBrk="0" hangingPunct="1">
         <a:spcBef>
           <a:spcPct val="20000"/>
         </a:spcBef>
         <a:buFont typeface="Arial" pitchFamily="34" charset="0"/>
         <a:buChar char="•"/>
-        <a:defRPr sz="1900" kern="1200">
+        <a:defRPr sz="1899" kern="1200">
           <a:solidFill>
             <a:schemeClr val="tx1"/>
           </a:solidFill>
@@ -3266,13 +3265,13 @@
           <a:cs typeface="+mn-cs"/>
         </a:defRPr>
       </a:lvl7pPr>
-      <a:lvl8pPr marL="3201657" indent="-213444" algn="l" defTabSz="853775" rtl="0" eaLnBrk="1" latinLnBrk="0" hangingPunct="1">
+      <a:lvl8pPr marL="3201461" indent="-213431" algn="l" defTabSz="853723" rtl="0" eaLnBrk="1" latinLnBrk="0" hangingPunct="1">
         <a:spcBef>
           <a:spcPct val="20000"/>
         </a:spcBef>
         <a:buFont typeface="Arial" pitchFamily="34" charset="0"/>
         <a:buChar char="•"/>
-        <a:defRPr sz="1900" kern="1200">
+        <a:defRPr sz="1899" kern="1200">
           <a:solidFill>
             <a:schemeClr val="tx1"/>
           </a:solidFill>
@@ -3281,13 +3280,13 @@
           <a:cs typeface="+mn-cs"/>
         </a:defRPr>
       </a:lvl8pPr>
-      <a:lvl9pPr marL="3628545" indent="-213444" algn="l" defTabSz="853775" rtl="0" eaLnBrk="1" latinLnBrk="0" hangingPunct="1">
+      <a:lvl9pPr marL="3628323" indent="-213431" algn="l" defTabSz="853723" rtl="0" eaLnBrk="1" latinLnBrk="0" hangingPunct="1">
         <a:spcBef>
           <a:spcPct val="20000"/>
         </a:spcBef>
         <a:buFont typeface="Arial" pitchFamily="34" charset="0"/>
         <a:buChar char="•"/>
-        <a:defRPr sz="1900" kern="1200">
+        <a:defRPr sz="1899" kern="1200">
           <a:solidFill>
             <a:schemeClr val="tx1"/>
           </a:solidFill>
@@ -3301,7 +3300,7 @@
       <a:defPPr>
         <a:defRPr lang="en-US"/>
       </a:defPPr>
-      <a:lvl1pPr marL="0" algn="l" defTabSz="853775" rtl="0" eaLnBrk="1" latinLnBrk="0" hangingPunct="1">
+      <a:lvl1pPr marL="0" algn="l" defTabSz="853723" rtl="0" eaLnBrk="1" latinLnBrk="0" hangingPunct="1">
         <a:defRPr sz="1700" kern="1200">
           <a:solidFill>
             <a:schemeClr val="tx1"/>
@@ -3311,7 +3310,7 @@
           <a:cs typeface="+mn-cs"/>
         </a:defRPr>
       </a:lvl1pPr>
-      <a:lvl2pPr marL="426888" algn="l" defTabSz="853775" rtl="0" eaLnBrk="1" latinLnBrk="0" hangingPunct="1">
+      <a:lvl2pPr marL="426862" algn="l" defTabSz="853723" rtl="0" eaLnBrk="1" latinLnBrk="0" hangingPunct="1">
         <a:defRPr sz="1700" kern="1200">
           <a:solidFill>
             <a:schemeClr val="tx1"/>
@@ -3321,7 +3320,7 @@
           <a:cs typeface="+mn-cs"/>
         </a:defRPr>
       </a:lvl2pPr>
-      <a:lvl3pPr marL="853775" algn="l" defTabSz="853775" rtl="0" eaLnBrk="1" latinLnBrk="0" hangingPunct="1">
+      <a:lvl3pPr marL="853723" algn="l" defTabSz="853723" rtl="0" eaLnBrk="1" latinLnBrk="0" hangingPunct="1">
         <a:defRPr sz="1700" kern="1200">
           <a:solidFill>
             <a:schemeClr val="tx1"/>
@@ -3331,7 +3330,7 @@
           <a:cs typeface="+mn-cs"/>
         </a:defRPr>
       </a:lvl3pPr>
-      <a:lvl4pPr marL="1280663" algn="l" defTabSz="853775" rtl="0" eaLnBrk="1" latinLnBrk="0" hangingPunct="1">
+      <a:lvl4pPr marL="1280585" algn="l" defTabSz="853723" rtl="0" eaLnBrk="1" latinLnBrk="0" hangingPunct="1">
         <a:defRPr sz="1700" kern="1200">
           <a:solidFill>
             <a:schemeClr val="tx1"/>
@@ -3341,7 +3340,7 @@
           <a:cs typeface="+mn-cs"/>
         </a:defRPr>
       </a:lvl4pPr>
-      <a:lvl5pPr marL="1707551" algn="l" defTabSz="853775" rtl="0" eaLnBrk="1" latinLnBrk="0" hangingPunct="1">
+      <a:lvl5pPr marL="1707446" algn="l" defTabSz="853723" rtl="0" eaLnBrk="1" latinLnBrk="0" hangingPunct="1">
         <a:defRPr sz="1700" kern="1200">
           <a:solidFill>
             <a:schemeClr val="tx1"/>
@@ -3351,7 +3350,7 @@
           <a:cs typeface="+mn-cs"/>
         </a:defRPr>
       </a:lvl5pPr>
-      <a:lvl6pPr marL="2134438" algn="l" defTabSz="853775" rtl="0" eaLnBrk="1" latinLnBrk="0" hangingPunct="1">
+      <a:lvl6pPr marL="2134307" algn="l" defTabSz="853723" rtl="0" eaLnBrk="1" latinLnBrk="0" hangingPunct="1">
         <a:defRPr sz="1700" kern="1200">
           <a:solidFill>
             <a:schemeClr val="tx1"/>
@@ -3361,7 +3360,7 @@
           <a:cs typeface="+mn-cs"/>
         </a:defRPr>
       </a:lvl6pPr>
-      <a:lvl7pPr marL="2561326" algn="l" defTabSz="853775" rtl="0" eaLnBrk="1" latinLnBrk="0" hangingPunct="1">
+      <a:lvl7pPr marL="2561169" algn="l" defTabSz="853723" rtl="0" eaLnBrk="1" latinLnBrk="0" hangingPunct="1">
         <a:defRPr sz="1700" kern="1200">
           <a:solidFill>
             <a:schemeClr val="tx1"/>
@@ -3371,7 +3370,7 @@
           <a:cs typeface="+mn-cs"/>
         </a:defRPr>
       </a:lvl7pPr>
-      <a:lvl8pPr marL="2988213" algn="l" defTabSz="853775" rtl="0" eaLnBrk="1" latinLnBrk="0" hangingPunct="1">
+      <a:lvl8pPr marL="2988030" algn="l" defTabSz="853723" rtl="0" eaLnBrk="1" latinLnBrk="0" hangingPunct="1">
         <a:defRPr sz="1700" kern="1200">
           <a:solidFill>
             <a:schemeClr val="tx1"/>
@@ -3381,7 +3380,7 @@
           <a:cs typeface="+mn-cs"/>
         </a:defRPr>
       </a:lvl8pPr>
-      <a:lvl9pPr marL="3415101" algn="l" defTabSz="853775" rtl="0" eaLnBrk="1" latinLnBrk="0" hangingPunct="1">
+      <a:lvl9pPr marL="3414892" algn="l" defTabSz="853723" rtl="0" eaLnBrk="1" latinLnBrk="0" hangingPunct="1">
         <a:defRPr sz="1700" kern="1200">
           <a:solidFill>
             <a:schemeClr val="tx1"/>
@@ -3421,7 +3420,7 @@
         </p:nvSpPr>
         <p:spPr>
           <a:xfrm>
-            <a:off x="6216445" y="288186"/>
+            <a:off x="6350593" y="861527"/>
             <a:ext cx="1337388" cy="343761"/>
           </a:xfrm>
           <a:prstGeom prst="roundRect">
@@ -3480,7 +3479,7 @@
         </p:nvSpPr>
         <p:spPr>
           <a:xfrm>
-            <a:off x="1746343" y="288186"/>
+            <a:off x="2985263" y="697197"/>
             <a:ext cx="1642776" cy="334347"/>
           </a:xfrm>
           <a:prstGeom prst="roundRect">
@@ -3539,7 +3538,7 @@
         </p:nvSpPr>
         <p:spPr>
           <a:xfrm>
-            <a:off x="1744851" y="1016794"/>
+            <a:off x="2985263" y="1305990"/>
             <a:ext cx="1642776" cy="334347"/>
           </a:xfrm>
           <a:prstGeom prst="roundRect">
@@ -3598,7 +3597,7 @@
         </p:nvSpPr>
         <p:spPr>
           <a:xfrm>
-            <a:off x="1415450" y="4751657"/>
+            <a:off x="2717251" y="5295220"/>
             <a:ext cx="1910254" cy="334347"/>
           </a:xfrm>
           <a:prstGeom prst="roundRect">
@@ -3642,7 +3641,7 @@
           <a:p>
             <a:pPr algn="ctr"/>
             <a:r>
-              <a:rPr lang="en-US" sz="1400" b="1"/>
+              <a:rPr lang="en-US" sz="1400" b="1" dirty="0" err="1"/>
               <a:t>DBMetaDataController</a:t>
             </a:r>
             <a:endParaRPr lang="en-SG" sz="1400" b="1" dirty="0"/>
@@ -3657,7 +3656,7 @@
         </p:nvSpPr>
         <p:spPr>
           <a:xfrm>
-            <a:off x="301105" y="2532100"/>
+            <a:off x="1581030" y="4587106"/>
             <a:ext cx="3047034" cy="334347"/>
           </a:xfrm>
           <a:prstGeom prst="roundRect">
@@ -3716,7 +3715,7 @@
         </p:nvSpPr>
         <p:spPr>
           <a:xfrm>
-            <a:off x="1353904" y="3224551"/>
+            <a:off x="2650943" y="3087843"/>
             <a:ext cx="1977123" cy="334347"/>
           </a:xfrm>
           <a:prstGeom prst="roundRect">
@@ -3775,7 +3774,7 @@
         </p:nvSpPr>
         <p:spPr>
           <a:xfrm>
-            <a:off x="810567" y="4039736"/>
+            <a:off x="2112370" y="3912728"/>
             <a:ext cx="2515137" cy="334347"/>
           </a:xfrm>
           <a:prstGeom prst="roundRect">
@@ -3834,7 +3833,7 @@
         </p:nvSpPr>
         <p:spPr>
           <a:xfrm>
-            <a:off x="1839027" y="1776332"/>
+            <a:off x="3106385" y="1896835"/>
             <a:ext cx="1512096" cy="334347"/>
           </a:xfrm>
           <a:prstGeom prst="roundRect">
@@ -3878,7 +3877,7 @@
           <a:p>
             <a:pPr algn="ctr"/>
             <a:r>
-              <a:rPr lang="en-US" sz="1400" b="1"/>
+              <a:rPr lang="en-US" sz="1400" b="1" dirty="0" err="1"/>
               <a:t>RecordController</a:t>
             </a:r>
             <a:endParaRPr lang="en-SG" sz="1400" b="1" dirty="0"/>
@@ -3893,7 +3892,7 @@
         </p:nvSpPr>
         <p:spPr>
           <a:xfrm>
-            <a:off x="1673904" y="5512593"/>
+            <a:off x="2975706" y="6094235"/>
             <a:ext cx="1651800" cy="334347"/>
           </a:xfrm>
           <a:prstGeom prst="roundRect">
@@ -3946,14 +3945,14 @@
       </p:sp>
       <p:sp>
         <p:nvSpPr>
-          <p:cNvPr id="13" name="Rounded Rectangle 12"/>
+          <p:cNvPr id="14" name="Rounded Rectangle 13"/>
           <p:cNvSpPr/>
           <p:nvPr/>
         </p:nvSpPr>
         <p:spPr>
           <a:xfrm>
-            <a:off x="6216445" y="1042591"/>
-            <a:ext cx="1337388" cy="568294"/>
+            <a:off x="5011528" y="5289825"/>
+            <a:ext cx="1604866" cy="343761"/>
           </a:xfrm>
           <a:prstGeom prst="roundRect">
             <a:avLst>
@@ -3994,14 +3993,10 @@
           <a:bodyPr rtlCol="0" anchor="t" anchorCtr="1"/>
           <a:lstStyle/>
           <a:p>
-            <a:pPr algn="ctr">
-              <a:lnSpc>
-                <a:spcPct val="150000"/>
-              </a:lnSpc>
-            </a:pPr>
+            <a:pPr algn="ctr"/>
             <a:r>
               <a:rPr lang="en-US" sz="1400" b="1" dirty="0" err="1"/>
-              <a:t>GateKeeper</a:t>
+              <a:t>DBMetaDataLogic</a:t>
             </a:r>
             <a:endParaRPr lang="en-SG" sz="1400" b="1" dirty="0"/>
           </a:p>
@@ -4009,14 +4004,14 @@
       </p:sp>
       <p:sp>
         <p:nvSpPr>
-          <p:cNvPr id="14" name="Rounded Rectangle 13"/>
+          <p:cNvPr id="15" name="Rounded Rectangle 14"/>
           <p:cNvSpPr/>
           <p:nvPr/>
         </p:nvSpPr>
         <p:spPr>
           <a:xfrm>
-            <a:off x="5959186" y="4751657"/>
-            <a:ext cx="1604866" cy="343761"/>
+            <a:off x="5012089" y="4577692"/>
+            <a:ext cx="2674777" cy="343761"/>
           </a:xfrm>
           <a:prstGeom prst="roundRect">
             <a:avLst>
@@ -4059,8 +4054,8 @@
           <a:p>
             <a:pPr algn="ctr"/>
             <a:r>
-              <a:rPr lang="en-US" sz="1400" b="1" dirty="0" err="1"/>
-              <a:t>DBMetaDataLogic</a:t>
+              <a:rPr lang="en-US" sz="1400" b="1"/>
+              <a:t>PresentationAccessControlLogic</a:t>
             </a:r>
             <a:endParaRPr lang="en-SG" sz="1400" b="1" dirty="0"/>
           </a:p>
@@ -4068,14 +4063,14 @@
       </p:sp>
       <p:sp>
         <p:nvSpPr>
-          <p:cNvPr id="15" name="Rounded Rectangle 14"/>
+          <p:cNvPr id="17" name="Rounded Rectangle 16"/>
           <p:cNvSpPr/>
           <p:nvPr/>
         </p:nvSpPr>
         <p:spPr>
           <a:xfrm>
-            <a:off x="4879056" y="2523998"/>
-            <a:ext cx="2674777" cy="343761"/>
+            <a:off x="5547042" y="3895560"/>
+            <a:ext cx="2139822" cy="343762"/>
           </a:xfrm>
           <a:prstGeom prst="roundRect">
             <a:avLst>
@@ -4119,7 +4114,7 @@
             <a:pPr algn="ctr"/>
             <a:r>
               <a:rPr lang="en-US" sz="1400" b="1"/>
-              <a:t>PresentationAccessControlLogic</a:t>
+              <a:t>PresentationSectionLogic</a:t>
             </a:r>
             <a:endParaRPr lang="en-SG" sz="1400" b="1" dirty="0"/>
           </a:p>
@@ -4127,14 +4122,14 @@
       </p:sp>
       <p:sp>
         <p:nvSpPr>
-          <p:cNvPr id="16" name="Rounded Rectangle 15"/>
+          <p:cNvPr id="18" name="Rounded Rectangle 17"/>
           <p:cNvSpPr/>
           <p:nvPr/>
         </p:nvSpPr>
         <p:spPr>
           <a:xfrm>
-            <a:off x="5948967" y="3104400"/>
-            <a:ext cx="1604866" cy="593486"/>
+            <a:off x="6073421" y="1565627"/>
+            <a:ext cx="1604866" cy="343761"/>
           </a:xfrm>
           <a:prstGeom prst="roundRect">
             <a:avLst>
@@ -4175,128 +4170,6 @@
           <a:bodyPr rtlCol="0" anchor="t" anchorCtr="1"/>
           <a:lstStyle/>
           <a:p>
-            <a:pPr algn="ctr">
-              <a:lnSpc>
-                <a:spcPct val="150000"/>
-              </a:lnSpc>
-            </a:pPr>
-            <a:r>
-              <a:rPr lang="en-US" sz="1400" b="1" dirty="0" err="1"/>
-              <a:t>PresentationLogic</a:t>
-            </a:r>
-            <a:endParaRPr lang="en-SG" sz="1400" b="1" dirty="0"/>
-          </a:p>
-        </p:txBody>
-      </p:sp>
-      <p:sp>
-        <p:nvSpPr>
-          <p:cNvPr id="17" name="Rounded Rectangle 16"/>
-          <p:cNvSpPr/>
-          <p:nvPr/>
-        </p:nvSpPr>
-        <p:spPr>
-          <a:xfrm>
-            <a:off x="5414011" y="4020015"/>
-            <a:ext cx="2139822" cy="343762"/>
-          </a:xfrm>
-          <a:prstGeom prst="roundRect">
-            <a:avLst>
-              <a:gd name="adj" fmla="val 9190"/>
-            </a:avLst>
-          </a:prstGeom>
-          <a:solidFill>
-            <a:schemeClr val="accent4">
-              <a:lumMod val="60000"/>
-              <a:lumOff val="40000"/>
-            </a:schemeClr>
-          </a:solidFill>
-          <a:ln>
-            <a:solidFill>
-              <a:schemeClr val="accent4">
-                <a:lumMod val="75000"/>
-              </a:schemeClr>
-            </a:solidFill>
-          </a:ln>
-        </p:spPr>
-        <p:style>
-          <a:lnRef idx="2">
-            <a:schemeClr val="accent1">
-              <a:shade val="50000"/>
-            </a:schemeClr>
-          </a:lnRef>
-          <a:fillRef idx="1">
-            <a:schemeClr val="accent1"/>
-          </a:fillRef>
-          <a:effectRef idx="0">
-            <a:schemeClr val="accent1"/>
-          </a:effectRef>
-          <a:fontRef idx="minor">
-            <a:schemeClr val="lt1"/>
-          </a:fontRef>
-        </p:style>
-        <p:txBody>
-          <a:bodyPr rtlCol="0" anchor="t" anchorCtr="1"/>
-          <a:lstStyle/>
-          <a:p>
-            <a:pPr algn="ctr"/>
-            <a:r>
-              <a:rPr lang="en-US" sz="1400" b="1"/>
-              <a:t>PresentationSectionLogic</a:t>
-            </a:r>
-            <a:endParaRPr lang="en-SG" sz="1400" b="1" dirty="0"/>
-          </a:p>
-        </p:txBody>
-      </p:sp>
-      <p:sp>
-        <p:nvSpPr>
-          <p:cNvPr id="18" name="Rounded Rectangle 17"/>
-          <p:cNvSpPr/>
-          <p:nvPr/>
-        </p:nvSpPr>
-        <p:spPr>
-          <a:xfrm>
-            <a:off x="5961423" y="1761999"/>
-            <a:ext cx="1604866" cy="343761"/>
-          </a:xfrm>
-          <a:prstGeom prst="roundRect">
-            <a:avLst>
-              <a:gd name="adj" fmla="val 9190"/>
-            </a:avLst>
-          </a:prstGeom>
-          <a:solidFill>
-            <a:schemeClr val="accent4">
-              <a:lumMod val="60000"/>
-              <a:lumOff val="40000"/>
-            </a:schemeClr>
-          </a:solidFill>
-          <a:ln>
-            <a:solidFill>
-              <a:schemeClr val="accent4">
-                <a:lumMod val="75000"/>
-              </a:schemeClr>
-            </a:solidFill>
-          </a:ln>
-        </p:spPr>
-        <p:style>
-          <a:lnRef idx="2">
-            <a:schemeClr val="accent1">
-              <a:shade val="50000"/>
-            </a:schemeClr>
-          </a:lnRef>
-          <a:fillRef idx="1">
-            <a:schemeClr val="accent1"/>
-          </a:fillRef>
-          <a:effectRef idx="0">
-            <a:schemeClr val="accent1"/>
-          </a:effectRef>
-          <a:fontRef idx="minor">
-            <a:schemeClr val="lt1"/>
-          </a:fontRef>
-        </p:style>
-        <p:txBody>
-          <a:bodyPr rtlCol="0" anchor="t" anchorCtr="1"/>
-          <a:lstStyle/>
-          <a:p>
             <a:pPr algn="ctr"/>
             <a:r>
               <a:rPr lang="en-US" sz="1400" b="1" dirty="0" err="1"/>
@@ -4306,93 +4179,6 @@
           </a:p>
         </p:txBody>
       </p:sp>
-      <p:cxnSp>
-        <p:nvCxnSpPr>
-          <p:cNvPr id="25" name="Elbow Connector 182"/>
-          <p:cNvCxnSpPr>
-            <a:cxnSpLocks/>
-            <a:stCxn id="5" idx="3"/>
-            <a:endCxn id="4" idx="1"/>
-          </p:cNvCxnSpPr>
-          <p:nvPr/>
-        </p:nvCxnSpPr>
-        <p:spPr>
-          <a:xfrm>
-            <a:off x="3389119" y="455360"/>
-            <a:ext cx="2827326" cy="4707"/>
-          </a:xfrm>
-          <a:prstGeom prst="straightConnector1">
-            <a:avLst/>
-          </a:prstGeom>
-          <a:ln w="38100">
-            <a:solidFill>
-              <a:schemeClr val="accent1">
-                <a:lumMod val="75000"/>
-              </a:schemeClr>
-            </a:solidFill>
-            <a:prstDash val="solid"/>
-            <a:headEnd type="none" w="med" len="med"/>
-            <a:tailEnd type="triangle" w="med" len="med"/>
-          </a:ln>
-        </p:spPr>
-        <p:style>
-          <a:lnRef idx="1">
-            <a:schemeClr val="accent1"/>
-          </a:lnRef>
-          <a:fillRef idx="0">
-            <a:schemeClr val="accent1"/>
-          </a:fillRef>
-          <a:effectRef idx="0">
-            <a:schemeClr val="accent1"/>
-          </a:effectRef>
-          <a:fontRef idx="minor">
-            <a:schemeClr val="tx1"/>
-          </a:fontRef>
-        </p:style>
-      </p:cxnSp>
-      <p:cxnSp>
-        <p:nvCxnSpPr>
-          <p:cNvPr id="31" name="Elbow Connector 182"/>
-          <p:cNvCxnSpPr>
-            <a:cxnSpLocks/>
-            <a:stCxn id="6" idx="3"/>
-          </p:cNvCxnSpPr>
-          <p:nvPr/>
-        </p:nvCxnSpPr>
-        <p:spPr>
-          <a:xfrm>
-            <a:off x="3387627" y="1183968"/>
-            <a:ext cx="2828818" cy="12997"/>
-          </a:xfrm>
-          <a:prstGeom prst="straightConnector1">
-            <a:avLst/>
-          </a:prstGeom>
-          <a:ln w="38100">
-            <a:solidFill>
-              <a:schemeClr val="accent1">
-                <a:lumMod val="75000"/>
-              </a:schemeClr>
-            </a:solidFill>
-            <a:prstDash val="solid"/>
-            <a:headEnd type="none" w="med" len="med"/>
-            <a:tailEnd type="triangle" w="med" len="med"/>
-          </a:ln>
-        </p:spPr>
-        <p:style>
-          <a:lnRef idx="1">
-            <a:schemeClr val="accent1"/>
-          </a:lnRef>
-          <a:fillRef idx="0">
-            <a:schemeClr val="accent1"/>
-          </a:fillRef>
-          <a:effectRef idx="0">
-            <a:schemeClr val="accent1"/>
-          </a:effectRef>
-          <a:fontRef idx="minor">
-            <a:schemeClr val="tx1"/>
-          </a:fontRef>
-        </p:style>
-      </p:cxnSp>
       <p:cxnSp>
         <p:nvCxnSpPr>
           <p:cNvPr id="34" name="Elbow Connector 182"/>
@@ -4404,9 +4190,9 @@
           <p:nvPr/>
         </p:nvCxnSpPr>
         <p:spPr>
-          <a:xfrm>
-            <a:off x="3325704" y="4918831"/>
-            <a:ext cx="2633482" cy="4707"/>
+          <a:xfrm flipV="1">
+            <a:off x="4627507" y="5461706"/>
+            <a:ext cx="384023" cy="689"/>
           </a:xfrm>
           <a:prstGeom prst="straightConnector1">
             <a:avLst/>
@@ -4449,8 +4235,8 @@
         </p:nvCxnSpPr>
         <p:spPr>
           <a:xfrm flipV="1">
-            <a:off x="3348139" y="2695879"/>
-            <a:ext cx="1530917" cy="3395"/>
+            <a:off x="4628066" y="4749573"/>
+            <a:ext cx="384023" cy="4707"/>
           </a:xfrm>
           <a:prstGeom prst="straightConnector1">
             <a:avLst/>
@@ -4487,14 +4273,14 @@
           <p:cNvCxnSpPr>
             <a:cxnSpLocks/>
             <a:stCxn id="9" idx="3"/>
-            <a:endCxn id="16" idx="1"/>
+            <a:endCxn id="49" idx="1"/>
           </p:cNvCxnSpPr>
           <p:nvPr/>
         </p:nvCxnSpPr>
         <p:spPr>
-          <a:xfrm>
-            <a:off x="3331027" y="3391725"/>
-            <a:ext cx="2617940" cy="9418"/>
+          <a:xfrm flipV="1">
+            <a:off x="4628066" y="3248342"/>
+            <a:ext cx="1482793" cy="6674"/>
           </a:xfrm>
           <a:prstGeom prst="straightConnector1">
             <a:avLst/>
@@ -4530,13 +4316,15 @@
           <p:cNvPr id="52" name="Elbow Connector 182"/>
           <p:cNvCxnSpPr>
             <a:cxnSpLocks/>
+            <a:stCxn id="10" idx="3"/>
+            <a:endCxn id="17" idx="1"/>
           </p:cNvCxnSpPr>
           <p:nvPr/>
         </p:nvCxnSpPr>
         <p:spPr>
           <a:xfrm flipV="1">
-            <a:off x="3325704" y="4293394"/>
-            <a:ext cx="2088307" cy="15014"/>
+            <a:off x="4627507" y="4067441"/>
+            <a:ext cx="919537" cy="12460"/>
           </a:xfrm>
           <a:prstGeom prst="straightConnector1">
             <a:avLst/>
@@ -4579,8 +4367,8 @@
         </p:nvCxnSpPr>
         <p:spPr>
           <a:xfrm flipV="1">
-            <a:off x="3351123" y="1933880"/>
-            <a:ext cx="2610300" cy="9626"/>
+            <a:off x="4618481" y="1737508"/>
+            <a:ext cx="1454940" cy="326501"/>
           </a:xfrm>
           <a:prstGeom prst="straightConnector1">
             <a:avLst/>
@@ -4623,8 +4411,8 @@
         </p:nvCxnSpPr>
         <p:spPr>
           <a:xfrm>
-            <a:off x="3325704" y="5679767"/>
-            <a:ext cx="774911" cy="0"/>
+            <a:off x="4627505" y="6261407"/>
+            <a:ext cx="415940" cy="0"/>
           </a:xfrm>
           <a:prstGeom prst="straightConnector1">
             <a:avLst/>
@@ -4663,7 +4451,7 @@
         </p:nvSpPr>
         <p:spPr>
           <a:xfrm>
-            <a:off x="4017373" y="5346800"/>
+            <a:off x="4960204" y="5928440"/>
             <a:ext cx="1567070" cy="665934"/>
           </a:xfrm>
           <a:prstGeom prst="verticalScroll">
@@ -4719,7 +4507,7 @@
         </p:nvSpPr>
         <p:spPr>
           <a:xfrm>
-            <a:off x="8026452" y="254794"/>
+            <a:off x="8026452" y="794544"/>
             <a:ext cx="450112" cy="4772478"/>
           </a:xfrm>
           <a:prstGeom prst="roundRect">
@@ -4772,87 +4560,6 @@
       </p:sp>
       <p:cxnSp>
         <p:nvCxnSpPr>
-          <p:cNvPr id="47" name="Elbow Connector 182"/>
-          <p:cNvCxnSpPr>
-            <a:cxnSpLocks/>
-            <a:stCxn id="4" idx="3"/>
-          </p:cNvCxnSpPr>
-          <p:nvPr/>
-        </p:nvCxnSpPr>
-        <p:spPr>
-          <a:xfrm>
-            <a:off x="7553833" y="460067"/>
-            <a:ext cx="472619" cy="0"/>
-          </a:xfrm>
-          <a:prstGeom prst="straightConnector1">
-            <a:avLst/>
-          </a:prstGeom>
-          <a:ln w="38100">
-            <a:solidFill>
-              <a:schemeClr val="accent4"/>
-            </a:solidFill>
-            <a:prstDash val="solid"/>
-            <a:headEnd type="none" w="med" len="med"/>
-            <a:tailEnd type="triangle" w="med" len="med"/>
-          </a:ln>
-        </p:spPr>
-        <p:style>
-          <a:lnRef idx="1">
-            <a:schemeClr val="accent1"/>
-          </a:lnRef>
-          <a:fillRef idx="0">
-            <a:schemeClr val="accent1"/>
-          </a:fillRef>
-          <a:effectRef idx="0">
-            <a:schemeClr val="accent1"/>
-          </a:effectRef>
-          <a:fontRef idx="minor">
-            <a:schemeClr val="tx1"/>
-          </a:fontRef>
-        </p:style>
-      </p:cxnSp>
-      <p:cxnSp>
-        <p:nvCxnSpPr>
-          <p:cNvPr id="57" name="Elbow Connector 182"/>
-          <p:cNvCxnSpPr>
-            <a:cxnSpLocks/>
-          </p:cNvCxnSpPr>
-          <p:nvPr/>
-        </p:nvCxnSpPr>
-        <p:spPr>
-          <a:xfrm>
-            <a:off x="7568633" y="1932564"/>
-            <a:ext cx="457819" cy="0"/>
-          </a:xfrm>
-          <a:prstGeom prst="straightConnector1">
-            <a:avLst/>
-          </a:prstGeom>
-          <a:ln w="38100">
-            <a:solidFill>
-              <a:schemeClr val="accent4"/>
-            </a:solidFill>
-            <a:prstDash val="solid"/>
-            <a:headEnd type="none" w="med" len="med"/>
-            <a:tailEnd type="triangle" w="med" len="med"/>
-          </a:ln>
-        </p:spPr>
-        <p:style>
-          <a:lnRef idx="1">
-            <a:schemeClr val="accent1"/>
-          </a:lnRef>
-          <a:fillRef idx="0">
-            <a:schemeClr val="accent1"/>
-          </a:fillRef>
-          <a:effectRef idx="0">
-            <a:schemeClr val="accent1"/>
-          </a:effectRef>
-          <a:fontRef idx="minor">
-            <a:schemeClr val="tx1"/>
-          </a:fontRef>
-        </p:style>
-      </p:cxnSp>
-      <p:cxnSp>
-        <p:nvCxnSpPr>
           <p:cNvPr id="63" name="Elbow Connector 182">
             <a:extLst>
               <a:ext uri="{FF2B5EF4-FFF2-40B4-BE49-F238E27FC236}">
@@ -4867,1706 +4574,7 @@
         </p:nvCxnSpPr>
         <p:spPr>
           <a:xfrm>
-            <a:off x="7553833" y="2699274"/>
-            <a:ext cx="457819" cy="0"/>
-          </a:xfrm>
-          <a:prstGeom prst="straightConnector1">
-            <a:avLst/>
-          </a:prstGeom>
-          <a:ln w="38100">
-            <a:solidFill>
-              <a:schemeClr val="accent4"/>
-            </a:solidFill>
-            <a:prstDash val="solid"/>
-            <a:headEnd type="none" w="med" len="med"/>
-            <a:tailEnd type="triangle" w="med" len="med"/>
-          </a:ln>
-        </p:spPr>
-        <p:style>
-          <a:lnRef idx="1">
-            <a:schemeClr val="accent1"/>
-          </a:lnRef>
-          <a:fillRef idx="0">
-            <a:schemeClr val="accent1"/>
-          </a:fillRef>
-          <a:effectRef idx="0">
-            <a:schemeClr val="accent1"/>
-          </a:effectRef>
-          <a:fontRef idx="minor">
-            <a:schemeClr val="tx1"/>
-          </a:fontRef>
-        </p:style>
-      </p:cxnSp>
-      <p:cxnSp>
-        <p:nvCxnSpPr>
-          <p:cNvPr id="64" name="Elbow Connector 182">
-            <a:extLst>
-              <a:ext uri="{FF2B5EF4-FFF2-40B4-BE49-F238E27FC236}">
-                <a16:creationId xmlns:a16="http://schemas.microsoft.com/office/drawing/2014/main" id="{984978AA-6C73-4DC1-8DA8-EB7BDFC15E87}"/>
-              </a:ext>
-            </a:extLst>
-          </p:cNvPr>
-          <p:cNvCxnSpPr>
-            <a:cxnSpLocks/>
-          </p:cNvCxnSpPr>
-          <p:nvPr/>
-        </p:nvCxnSpPr>
-        <p:spPr>
-          <a:xfrm>
-            <a:off x="7570945" y="3453091"/>
-            <a:ext cx="457819" cy="0"/>
-          </a:xfrm>
-          <a:prstGeom prst="straightConnector1">
-            <a:avLst/>
-          </a:prstGeom>
-          <a:ln w="38100">
-            <a:solidFill>
-              <a:schemeClr val="accent4"/>
-            </a:solidFill>
-            <a:prstDash val="solid"/>
-            <a:headEnd type="none" w="med" len="med"/>
-            <a:tailEnd type="triangle" w="med" len="med"/>
-          </a:ln>
-        </p:spPr>
-        <p:style>
-          <a:lnRef idx="1">
-            <a:schemeClr val="accent1"/>
-          </a:lnRef>
-          <a:fillRef idx="0">
-            <a:schemeClr val="accent1"/>
-          </a:fillRef>
-          <a:effectRef idx="0">
-            <a:schemeClr val="accent1"/>
-          </a:effectRef>
-          <a:fontRef idx="minor">
-            <a:schemeClr val="tx1"/>
-          </a:fontRef>
-        </p:style>
-      </p:cxnSp>
-      <p:cxnSp>
-        <p:nvCxnSpPr>
-          <p:cNvPr id="66" name="Elbow Connector 182">
-            <a:extLst>
-              <a:ext uri="{FF2B5EF4-FFF2-40B4-BE49-F238E27FC236}">
-                <a16:creationId xmlns:a16="http://schemas.microsoft.com/office/drawing/2014/main" id="{073ADD41-E8F2-4C81-A1ED-47A479776310}"/>
-              </a:ext>
-            </a:extLst>
-          </p:cNvPr>
-          <p:cNvCxnSpPr>
-            <a:cxnSpLocks/>
-          </p:cNvCxnSpPr>
-          <p:nvPr/>
-        </p:nvCxnSpPr>
-        <p:spPr>
-          <a:xfrm>
-            <a:off x="7553833" y="4215091"/>
-            <a:ext cx="457819" cy="0"/>
-          </a:xfrm>
-          <a:prstGeom prst="straightConnector1">
-            <a:avLst/>
-          </a:prstGeom>
-          <a:ln w="38100">
-            <a:solidFill>
-              <a:schemeClr val="accent4"/>
-            </a:solidFill>
-            <a:prstDash val="solid"/>
-            <a:headEnd type="none" w="med" len="med"/>
-            <a:tailEnd type="triangle" w="med" len="med"/>
-          </a:ln>
-        </p:spPr>
-        <p:style>
-          <a:lnRef idx="1">
-            <a:schemeClr val="accent1"/>
-          </a:lnRef>
-          <a:fillRef idx="0">
-            <a:schemeClr val="accent1"/>
-          </a:fillRef>
-          <a:effectRef idx="0">
-            <a:schemeClr val="accent1"/>
-          </a:effectRef>
-          <a:fontRef idx="minor">
-            <a:schemeClr val="tx1"/>
-          </a:fontRef>
-        </p:style>
-      </p:cxnSp>
-      <p:cxnSp>
-        <p:nvCxnSpPr>
-          <p:cNvPr id="92" name="Connector: Elbow 91">
-            <a:extLst>
-              <a:ext uri="{FF2B5EF4-FFF2-40B4-BE49-F238E27FC236}">
-                <a16:creationId xmlns:a16="http://schemas.microsoft.com/office/drawing/2014/main" id="{540D21D2-1F29-4FAB-B492-58E6A768BF50}"/>
-              </a:ext>
-            </a:extLst>
-          </p:cNvPr>
-          <p:cNvCxnSpPr>
-            <a:cxnSpLocks/>
-          </p:cNvCxnSpPr>
-          <p:nvPr/>
-        </p:nvCxnSpPr>
-        <p:spPr>
-          <a:xfrm>
-            <a:off x="3402427" y="566447"/>
-            <a:ext cx="2814017" cy="532535"/>
-          </a:xfrm>
-          <a:prstGeom prst="bentConnector3">
-            <a:avLst>
-              <a:gd name="adj1" fmla="val 85449"/>
-            </a:avLst>
-          </a:prstGeom>
-          <a:ln w="38100">
-            <a:solidFill>
-              <a:schemeClr val="accent1">
-                <a:lumMod val="75000"/>
-              </a:schemeClr>
-            </a:solidFill>
-            <a:tailEnd type="triangle"/>
-          </a:ln>
-        </p:spPr>
-        <p:style>
-          <a:lnRef idx="2">
-            <a:schemeClr val="accent1"/>
-          </a:lnRef>
-          <a:fillRef idx="0">
-            <a:schemeClr val="accent1"/>
-          </a:fillRef>
-          <a:effectRef idx="1">
-            <a:schemeClr val="accent1"/>
-          </a:effectRef>
-          <a:fontRef idx="minor">
-            <a:schemeClr val="tx1"/>
-          </a:fontRef>
-        </p:style>
-      </p:cxnSp>
-      <p:cxnSp>
-        <p:nvCxnSpPr>
-          <p:cNvPr id="114" name="Connector: Elbow 113">
-            <a:extLst>
-              <a:ext uri="{FF2B5EF4-FFF2-40B4-BE49-F238E27FC236}">
-                <a16:creationId xmlns:a16="http://schemas.microsoft.com/office/drawing/2014/main" id="{6348098C-FDD4-4716-8331-19DB4BD6064B}"/>
-              </a:ext>
-            </a:extLst>
-          </p:cNvPr>
-          <p:cNvCxnSpPr>
-            <a:cxnSpLocks/>
-          </p:cNvCxnSpPr>
-          <p:nvPr/>
-        </p:nvCxnSpPr>
-        <p:spPr>
-          <a:xfrm flipV="1">
-            <a:off x="3360595" y="1269926"/>
-            <a:ext cx="2856766" cy="552203"/>
-          </a:xfrm>
-          <a:prstGeom prst="bentConnector3">
-            <a:avLst>
-              <a:gd name="adj1" fmla="val 11881"/>
-            </a:avLst>
-          </a:prstGeom>
-          <a:ln w="38100">
-            <a:solidFill>
-              <a:schemeClr val="accent1">
-                <a:lumMod val="75000"/>
-              </a:schemeClr>
-            </a:solidFill>
-            <a:tailEnd type="triangle"/>
-          </a:ln>
-        </p:spPr>
-        <p:style>
-          <a:lnRef idx="2">
-            <a:schemeClr val="accent1"/>
-          </a:lnRef>
-          <a:fillRef idx="0">
-            <a:schemeClr val="accent1"/>
-          </a:fillRef>
-          <a:effectRef idx="1">
-            <a:schemeClr val="accent1"/>
-          </a:effectRef>
-          <a:fontRef idx="minor">
-            <a:schemeClr val="tx1"/>
-          </a:fontRef>
-        </p:style>
-      </p:cxnSp>
-      <p:cxnSp>
-        <p:nvCxnSpPr>
-          <p:cNvPr id="120" name="Connector: Elbow 119">
-            <a:extLst>
-              <a:ext uri="{FF2B5EF4-FFF2-40B4-BE49-F238E27FC236}">
-                <a16:creationId xmlns:a16="http://schemas.microsoft.com/office/drawing/2014/main" id="{5253B7BD-07B6-4303-8938-C8022F3D94D5}"/>
-              </a:ext>
-            </a:extLst>
-          </p:cNvPr>
-          <p:cNvCxnSpPr>
-            <a:cxnSpLocks/>
-          </p:cNvCxnSpPr>
-          <p:nvPr/>
-        </p:nvCxnSpPr>
-        <p:spPr>
-          <a:xfrm flipV="1">
-            <a:off x="3360595" y="1361804"/>
-            <a:ext cx="2853506" cy="1206031"/>
-          </a:xfrm>
-          <a:prstGeom prst="bentConnector3">
-            <a:avLst>
-              <a:gd name="adj1" fmla="val 15042"/>
-            </a:avLst>
-          </a:prstGeom>
-          <a:ln w="38100">
-            <a:solidFill>
-              <a:schemeClr val="accent1">
-                <a:lumMod val="75000"/>
-              </a:schemeClr>
-            </a:solidFill>
-            <a:tailEnd type="triangle"/>
-          </a:ln>
-        </p:spPr>
-        <p:style>
-          <a:lnRef idx="2">
-            <a:schemeClr val="accent1"/>
-          </a:lnRef>
-          <a:fillRef idx="0">
-            <a:schemeClr val="accent1"/>
-          </a:fillRef>
-          <a:effectRef idx="1">
-            <a:schemeClr val="accent1"/>
-          </a:effectRef>
-          <a:fontRef idx="minor">
-            <a:schemeClr val="tx1"/>
-          </a:fontRef>
-        </p:style>
-      </p:cxnSp>
-      <p:cxnSp>
-        <p:nvCxnSpPr>
-          <p:cNvPr id="125" name="Connector: Elbow 124">
-            <a:extLst>
-              <a:ext uri="{FF2B5EF4-FFF2-40B4-BE49-F238E27FC236}">
-                <a16:creationId xmlns:a16="http://schemas.microsoft.com/office/drawing/2014/main" id="{5F816C07-C942-46B9-8781-E937294C5C4B}"/>
-              </a:ext>
-            </a:extLst>
-          </p:cNvPr>
-          <p:cNvCxnSpPr>
-            <a:cxnSpLocks/>
-          </p:cNvCxnSpPr>
-          <p:nvPr/>
-        </p:nvCxnSpPr>
-        <p:spPr>
-          <a:xfrm flipV="1">
-            <a:off x="3340499" y="1453334"/>
-            <a:ext cx="2874302" cy="1809790"/>
-          </a:xfrm>
-          <a:prstGeom prst="bentConnector3">
-            <a:avLst>
-              <a:gd name="adj1" fmla="val 19344"/>
-            </a:avLst>
-          </a:prstGeom>
-          <a:ln w="38100">
-            <a:solidFill>
-              <a:schemeClr val="accent1">
-                <a:lumMod val="75000"/>
-              </a:schemeClr>
-            </a:solidFill>
-            <a:tailEnd type="triangle"/>
-          </a:ln>
-        </p:spPr>
-        <p:style>
-          <a:lnRef idx="2">
-            <a:schemeClr val="accent1"/>
-          </a:lnRef>
-          <a:fillRef idx="0">
-            <a:schemeClr val="accent1"/>
-          </a:fillRef>
-          <a:effectRef idx="1">
-            <a:schemeClr val="accent1"/>
-          </a:effectRef>
-          <a:fontRef idx="minor">
-            <a:schemeClr val="tx1"/>
-          </a:fontRef>
-        </p:style>
-      </p:cxnSp>
-      <p:cxnSp>
-        <p:nvCxnSpPr>
-          <p:cNvPr id="131" name="Connector: Elbow 130">
-            <a:extLst>
-              <a:ext uri="{FF2B5EF4-FFF2-40B4-BE49-F238E27FC236}">
-                <a16:creationId xmlns:a16="http://schemas.microsoft.com/office/drawing/2014/main" id="{428AA816-5160-441F-A5A9-CADB5AB4127E}"/>
-              </a:ext>
-            </a:extLst>
-          </p:cNvPr>
-          <p:cNvCxnSpPr>
-            <a:cxnSpLocks/>
-          </p:cNvCxnSpPr>
-          <p:nvPr/>
-        </p:nvCxnSpPr>
-        <p:spPr>
-          <a:xfrm flipV="1">
-            <a:off x="3331027" y="1560473"/>
-            <a:ext cx="2883074" cy="2498550"/>
-          </a:xfrm>
-          <a:prstGeom prst="bentConnector3">
-            <a:avLst>
-              <a:gd name="adj1" fmla="val 23762"/>
-            </a:avLst>
-          </a:prstGeom>
-          <a:ln w="38100">
-            <a:solidFill>
-              <a:schemeClr val="accent1">
-                <a:lumMod val="75000"/>
-              </a:schemeClr>
-            </a:solidFill>
-            <a:tailEnd type="triangle"/>
-          </a:ln>
-        </p:spPr>
-        <p:style>
-          <a:lnRef idx="2">
-            <a:schemeClr val="accent1"/>
-          </a:lnRef>
-          <a:fillRef idx="0">
-            <a:schemeClr val="accent1"/>
-          </a:fillRef>
-          <a:effectRef idx="1">
-            <a:schemeClr val="accent1"/>
-          </a:effectRef>
-          <a:fontRef idx="minor">
-            <a:schemeClr val="tx1"/>
-          </a:fontRef>
-        </p:style>
-      </p:cxnSp>
-      <p:cxnSp>
-        <p:nvCxnSpPr>
-          <p:cNvPr id="153" name="Connector: Elbow 152">
-            <a:extLst>
-              <a:ext uri="{FF2B5EF4-FFF2-40B4-BE49-F238E27FC236}">
-                <a16:creationId xmlns:a16="http://schemas.microsoft.com/office/drawing/2014/main" id="{744FD7B4-2562-405D-8D42-ECC6719BD4CB}"/>
-              </a:ext>
-            </a:extLst>
-          </p:cNvPr>
-          <p:cNvCxnSpPr>
-            <a:cxnSpLocks/>
-          </p:cNvCxnSpPr>
-          <p:nvPr/>
-        </p:nvCxnSpPr>
-        <p:spPr>
-          <a:xfrm>
-            <a:off x="3389119" y="357011"/>
-            <a:ext cx="2559848" cy="2945783"/>
-          </a:xfrm>
-          <a:prstGeom prst="bentConnector3">
-            <a:avLst>
-              <a:gd name="adj1" fmla="val 28892"/>
-            </a:avLst>
-          </a:prstGeom>
-          <a:ln w="38100">
-            <a:solidFill>
-              <a:schemeClr val="accent1">
-                <a:lumMod val="75000"/>
-              </a:schemeClr>
-            </a:solidFill>
-            <a:tailEnd type="triangle"/>
-          </a:ln>
-        </p:spPr>
-        <p:style>
-          <a:lnRef idx="2">
-            <a:schemeClr val="accent1"/>
-          </a:lnRef>
-          <a:fillRef idx="0">
-            <a:schemeClr val="accent1"/>
-          </a:fillRef>
-          <a:effectRef idx="1">
-            <a:schemeClr val="accent1"/>
-          </a:effectRef>
-          <a:fontRef idx="minor">
-            <a:schemeClr val="tx1"/>
-          </a:fontRef>
-        </p:style>
-      </p:cxnSp>
-      <p:cxnSp>
-        <p:nvCxnSpPr>
-          <p:cNvPr id="175" name="Connector: Elbow 174">
-            <a:extLst>
-              <a:ext uri="{FF2B5EF4-FFF2-40B4-BE49-F238E27FC236}">
-                <a16:creationId xmlns:a16="http://schemas.microsoft.com/office/drawing/2014/main" id="{32D799E6-5578-4663-A621-749DEDB409D0}"/>
-              </a:ext>
-            </a:extLst>
-          </p:cNvPr>
-          <p:cNvCxnSpPr>
-            <a:cxnSpLocks/>
-          </p:cNvCxnSpPr>
-          <p:nvPr/>
-        </p:nvCxnSpPr>
-        <p:spPr>
-          <a:xfrm>
-            <a:off x="3348139" y="2828958"/>
-            <a:ext cx="2600828" cy="353174"/>
-          </a:xfrm>
-          <a:prstGeom prst="bentConnector3">
-            <a:avLst>
-              <a:gd name="adj1" fmla="val 48402"/>
-            </a:avLst>
-          </a:prstGeom>
-          <a:ln w="38100">
-            <a:solidFill>
-              <a:schemeClr val="accent1">
-                <a:lumMod val="75000"/>
-              </a:schemeClr>
-            </a:solidFill>
-            <a:tailEnd type="triangle"/>
-          </a:ln>
-        </p:spPr>
-        <p:style>
-          <a:lnRef idx="2">
-            <a:schemeClr val="accent1"/>
-          </a:lnRef>
-          <a:fillRef idx="0">
-            <a:schemeClr val="accent1"/>
-          </a:fillRef>
-          <a:effectRef idx="1">
-            <a:schemeClr val="accent1"/>
-          </a:effectRef>
-          <a:fontRef idx="minor">
-            <a:schemeClr val="tx1"/>
-          </a:fontRef>
-        </p:style>
-      </p:cxnSp>
-      <p:cxnSp>
-        <p:nvCxnSpPr>
-          <p:cNvPr id="185" name="Connector: Elbow 184">
-            <a:extLst>
-              <a:ext uri="{FF2B5EF4-FFF2-40B4-BE49-F238E27FC236}">
-                <a16:creationId xmlns:a16="http://schemas.microsoft.com/office/drawing/2014/main" id="{69E4B6C1-D848-499E-8588-53C4D4823717}"/>
-              </a:ext>
-            </a:extLst>
-          </p:cNvPr>
-          <p:cNvCxnSpPr>
-            <a:cxnSpLocks/>
-            <a:stCxn id="10" idx="3"/>
-          </p:cNvCxnSpPr>
-          <p:nvPr/>
-        </p:nvCxnSpPr>
-        <p:spPr>
-          <a:xfrm flipV="1">
-            <a:off x="3325704" y="3512126"/>
-            <a:ext cx="2617940" cy="694784"/>
-          </a:xfrm>
-          <a:prstGeom prst="bentConnector3">
-            <a:avLst>
-              <a:gd name="adj1" fmla="val 31583"/>
-            </a:avLst>
-          </a:prstGeom>
-          <a:ln w="38100">
-            <a:solidFill>
-              <a:schemeClr val="accent1">
-                <a:lumMod val="75000"/>
-              </a:schemeClr>
-            </a:solidFill>
-            <a:tailEnd type="triangle"/>
-          </a:ln>
-        </p:spPr>
-        <p:style>
-          <a:lnRef idx="2">
-            <a:schemeClr val="accent1"/>
-          </a:lnRef>
-          <a:fillRef idx="0">
-            <a:schemeClr val="accent1"/>
-          </a:fillRef>
-          <a:effectRef idx="1">
-            <a:schemeClr val="accent1"/>
-          </a:effectRef>
-          <a:fontRef idx="minor">
-            <a:schemeClr val="tx1"/>
-          </a:fontRef>
-        </p:style>
-      </p:cxnSp>
-    </p:spTree>
-    <p:extLst>
-      <p:ext uri="{BB962C8B-B14F-4D97-AF65-F5344CB8AC3E}">
-        <p14:creationId xmlns:p14="http://schemas.microsoft.com/office/powerpoint/2010/main" val="1309868090"/>
-      </p:ext>
-    </p:extLst>
-  </p:cSld>
-  <p:clrMapOvr>
-    <a:masterClrMapping/>
-  </p:clrMapOvr>
-</p:sld>
-</file>
-
-<file path=ppt/slides/slide2.xml><?xml version="1.0" encoding="utf-8"?>
-<p:sld xmlns:a="http://schemas.openxmlformats.org/drawingml/2006/main" xmlns:r="http://schemas.openxmlformats.org/officeDocument/2006/relationships" xmlns:p="http://schemas.openxmlformats.org/presentationml/2006/main">
-  <p:cSld>
-    <p:spTree>
-      <p:nvGrpSpPr>
-        <p:cNvPr id="1" name=""/>
-        <p:cNvGrpSpPr/>
-        <p:nvPr/>
-      </p:nvGrpSpPr>
-      <p:grpSpPr>
-        <a:xfrm>
-          <a:off x="0" y="0"/>
-          <a:ext cx="0" cy="0"/>
-          <a:chOff x="0" y="0"/>
-          <a:chExt cx="0" cy="0"/>
-        </a:xfrm>
-      </p:grpSpPr>
-      <p:sp>
-        <p:nvSpPr>
-          <p:cNvPr id="4" name="Rounded Rectangle 3"/>
-          <p:cNvSpPr/>
-          <p:nvPr/>
-        </p:nvSpPr>
-        <p:spPr>
-          <a:xfrm>
-            <a:off x="6350593" y="321775"/>
-            <a:ext cx="1337388" cy="343761"/>
-          </a:xfrm>
-          <a:prstGeom prst="roundRect">
-            <a:avLst>
-              <a:gd name="adj" fmla="val 9190"/>
-            </a:avLst>
-          </a:prstGeom>
-          <a:solidFill>
-            <a:schemeClr val="accent4">
-              <a:lumMod val="60000"/>
-              <a:lumOff val="40000"/>
-            </a:schemeClr>
-          </a:solidFill>
-          <a:ln>
-            <a:solidFill>
-              <a:schemeClr val="accent4">
-                <a:lumMod val="75000"/>
-              </a:schemeClr>
-            </a:solidFill>
-          </a:ln>
-        </p:spPr>
-        <p:style>
-          <a:lnRef idx="2">
-            <a:schemeClr val="accent1">
-              <a:shade val="50000"/>
-            </a:schemeClr>
-          </a:lnRef>
-          <a:fillRef idx="1">
-            <a:schemeClr val="accent1"/>
-          </a:fillRef>
-          <a:effectRef idx="0">
-            <a:schemeClr val="accent1"/>
-          </a:effectRef>
-          <a:fontRef idx="minor">
-            <a:schemeClr val="lt1"/>
-          </a:fontRef>
-        </p:style>
-        <p:txBody>
-          <a:bodyPr rtlCol="0" anchor="t" anchorCtr="1"/>
-          <a:lstStyle/>
-          <a:p>
-            <a:pPr algn="ctr"/>
-            <a:r>
-              <a:rPr lang="en-US" sz="1400" b="1" dirty="0" err="1"/>
-              <a:t>AnalysisLogic</a:t>
-            </a:r>
-            <a:endParaRPr lang="en-SG" sz="1400" b="1" dirty="0"/>
-          </a:p>
-        </p:txBody>
-      </p:sp>
-      <p:sp>
-        <p:nvSpPr>
-          <p:cNvPr id="5" name="Rounded Rectangle 4"/>
-          <p:cNvSpPr/>
-          <p:nvPr/>
-        </p:nvSpPr>
-        <p:spPr>
-          <a:xfrm>
-            <a:off x="2985288" y="326482"/>
-            <a:ext cx="1642776" cy="334347"/>
-          </a:xfrm>
-          <a:prstGeom prst="roundRect">
-            <a:avLst>
-              <a:gd name="adj" fmla="val 9190"/>
-            </a:avLst>
-          </a:prstGeom>
-          <a:solidFill>
-            <a:schemeClr val="accent1">
-              <a:lumMod val="60000"/>
-              <a:lumOff val="40000"/>
-            </a:schemeClr>
-          </a:solidFill>
-          <a:ln>
-            <a:solidFill>
-              <a:schemeClr val="accent1">
-                <a:lumMod val="75000"/>
-              </a:schemeClr>
-            </a:solidFill>
-          </a:ln>
-        </p:spPr>
-        <p:style>
-          <a:lnRef idx="2">
-            <a:schemeClr val="accent1">
-              <a:shade val="50000"/>
-            </a:schemeClr>
-          </a:lnRef>
-          <a:fillRef idx="1">
-            <a:schemeClr val="accent1"/>
-          </a:fillRef>
-          <a:effectRef idx="0">
-            <a:schemeClr val="accent1"/>
-          </a:effectRef>
-          <a:fontRef idx="minor">
-            <a:schemeClr val="lt1"/>
-          </a:fontRef>
-        </p:style>
-        <p:txBody>
-          <a:bodyPr rtlCol="0" anchor="t" anchorCtr="1"/>
-          <a:lstStyle/>
-          <a:p>
-            <a:pPr algn="ctr"/>
-            <a:r>
-              <a:rPr lang="en-US" sz="1400" b="1" dirty="0" err="1"/>
-              <a:t>AnalysisController</a:t>
-            </a:r>
-            <a:endParaRPr lang="en-SG" sz="1400" b="1" dirty="0"/>
-          </a:p>
-        </p:txBody>
-      </p:sp>
-      <p:sp>
-        <p:nvSpPr>
-          <p:cNvPr id="6" name="Rounded Rectangle 5"/>
-          <p:cNvSpPr/>
-          <p:nvPr/>
-        </p:nvSpPr>
-        <p:spPr>
-          <a:xfrm>
-            <a:off x="2985288" y="1007251"/>
-            <a:ext cx="1642776" cy="334347"/>
-          </a:xfrm>
-          <a:prstGeom prst="roundRect">
-            <a:avLst>
-              <a:gd name="adj" fmla="val 9190"/>
-            </a:avLst>
-          </a:prstGeom>
-          <a:solidFill>
-            <a:schemeClr val="accent1">
-              <a:lumMod val="60000"/>
-              <a:lumOff val="40000"/>
-            </a:schemeClr>
-          </a:solidFill>
-          <a:ln>
-            <a:solidFill>
-              <a:schemeClr val="accent1">
-                <a:lumMod val="75000"/>
-              </a:schemeClr>
-            </a:solidFill>
-          </a:ln>
-        </p:spPr>
-        <p:style>
-          <a:lnRef idx="2">
-            <a:schemeClr val="accent1">
-              <a:shade val="50000"/>
-            </a:schemeClr>
-          </a:lnRef>
-          <a:fillRef idx="1">
-            <a:schemeClr val="accent1"/>
-          </a:fillRef>
-          <a:effectRef idx="0">
-            <a:schemeClr val="accent1"/>
-          </a:effectRef>
-          <a:fontRef idx="minor">
-            <a:schemeClr val="lt1"/>
-          </a:fontRef>
-        </p:style>
-        <p:txBody>
-          <a:bodyPr rtlCol="0" anchor="t" anchorCtr="1"/>
-          <a:lstStyle/>
-          <a:p>
-            <a:pPr algn="ctr"/>
-            <a:r>
-              <a:rPr lang="en-US" sz="1400" b="1" dirty="0" err="1"/>
-              <a:t>AuthInfoController</a:t>
-            </a:r>
-            <a:endParaRPr lang="en-SG" sz="1400" b="1" dirty="0"/>
-          </a:p>
-        </p:txBody>
-      </p:sp>
-      <p:sp>
-        <p:nvSpPr>
-          <p:cNvPr id="7" name="Rounded Rectangle 6"/>
-          <p:cNvSpPr/>
-          <p:nvPr/>
-        </p:nvSpPr>
-        <p:spPr>
-          <a:xfrm>
-            <a:off x="2717810" y="4665961"/>
-            <a:ext cx="1910254" cy="334347"/>
-          </a:xfrm>
-          <a:prstGeom prst="roundRect">
-            <a:avLst>
-              <a:gd name="adj" fmla="val 9190"/>
-            </a:avLst>
-          </a:prstGeom>
-          <a:solidFill>
-            <a:schemeClr val="accent1">
-              <a:lumMod val="60000"/>
-              <a:lumOff val="40000"/>
-            </a:schemeClr>
-          </a:solidFill>
-          <a:ln>
-            <a:solidFill>
-              <a:schemeClr val="accent1">
-                <a:lumMod val="75000"/>
-              </a:schemeClr>
-            </a:solidFill>
-          </a:ln>
-        </p:spPr>
-        <p:style>
-          <a:lnRef idx="2">
-            <a:schemeClr val="accent1">
-              <a:shade val="50000"/>
-            </a:schemeClr>
-          </a:lnRef>
-          <a:fillRef idx="1">
-            <a:schemeClr val="accent1"/>
-          </a:fillRef>
-          <a:effectRef idx="0">
-            <a:schemeClr val="accent1"/>
-          </a:effectRef>
-          <a:fontRef idx="minor">
-            <a:schemeClr val="lt1"/>
-          </a:fontRef>
-        </p:style>
-        <p:txBody>
-          <a:bodyPr rtlCol="0" anchor="t" anchorCtr="1"/>
-          <a:lstStyle/>
-          <a:p>
-            <a:pPr algn="ctr"/>
-            <a:r>
-              <a:rPr lang="en-US" sz="1400" b="1"/>
-              <a:t>DBMetaDataController</a:t>
-            </a:r>
-            <a:endParaRPr lang="en-SG" sz="1400" b="1" dirty="0"/>
-          </a:p>
-        </p:txBody>
-      </p:sp>
-      <p:sp>
-        <p:nvSpPr>
-          <p:cNvPr id="8" name="Rounded Rectangle 7"/>
-          <p:cNvSpPr/>
-          <p:nvPr/>
-        </p:nvSpPr>
-        <p:spPr>
-          <a:xfrm>
-            <a:off x="1581030" y="4047354"/>
-            <a:ext cx="3047034" cy="334347"/>
-          </a:xfrm>
-          <a:prstGeom prst="roundRect">
-            <a:avLst>
-              <a:gd name="adj" fmla="val 9190"/>
-            </a:avLst>
-          </a:prstGeom>
-          <a:solidFill>
-            <a:schemeClr val="accent1">
-              <a:lumMod val="60000"/>
-              <a:lumOff val="40000"/>
-            </a:schemeClr>
-          </a:solidFill>
-          <a:ln>
-            <a:solidFill>
-              <a:schemeClr val="accent1">
-                <a:lumMod val="75000"/>
-              </a:schemeClr>
-            </a:solidFill>
-          </a:ln>
-        </p:spPr>
-        <p:style>
-          <a:lnRef idx="2">
-            <a:schemeClr val="accent1">
-              <a:shade val="50000"/>
-            </a:schemeClr>
-          </a:lnRef>
-          <a:fillRef idx="1">
-            <a:schemeClr val="accent1"/>
-          </a:fillRef>
-          <a:effectRef idx="0">
-            <a:schemeClr val="accent1"/>
-          </a:effectRef>
-          <a:fontRef idx="minor">
-            <a:schemeClr val="lt1"/>
-          </a:fontRef>
-        </p:style>
-        <p:txBody>
-          <a:bodyPr rtlCol="0" anchor="t" anchorCtr="1"/>
-          <a:lstStyle/>
-          <a:p>
-            <a:pPr algn="ctr"/>
-            <a:r>
-              <a:rPr lang="en-US" sz="1400" b="1" dirty="0" err="1"/>
-              <a:t>PresentationAccessControlController</a:t>
-            </a:r>
-            <a:endParaRPr lang="en-SG" sz="1400" b="1" dirty="0"/>
-          </a:p>
-        </p:txBody>
-      </p:sp>
-      <p:sp>
-        <p:nvSpPr>
-          <p:cNvPr id="9" name="Rounded Rectangle 8"/>
-          <p:cNvSpPr/>
-          <p:nvPr/>
-        </p:nvSpPr>
-        <p:spPr>
-          <a:xfrm>
-            <a:off x="2650941" y="2548092"/>
-            <a:ext cx="1977123" cy="334347"/>
-          </a:xfrm>
-          <a:prstGeom prst="roundRect">
-            <a:avLst>
-              <a:gd name="adj" fmla="val 9190"/>
-            </a:avLst>
-          </a:prstGeom>
-          <a:solidFill>
-            <a:schemeClr val="accent1">
-              <a:lumMod val="60000"/>
-              <a:lumOff val="40000"/>
-            </a:schemeClr>
-          </a:solidFill>
-          <a:ln>
-            <a:solidFill>
-              <a:schemeClr val="accent1">
-                <a:lumMod val="75000"/>
-              </a:schemeClr>
-            </a:solidFill>
-          </a:ln>
-        </p:spPr>
-        <p:style>
-          <a:lnRef idx="2">
-            <a:schemeClr val="accent1">
-              <a:shade val="50000"/>
-            </a:schemeClr>
-          </a:lnRef>
-          <a:fillRef idx="1">
-            <a:schemeClr val="accent1"/>
-          </a:fillRef>
-          <a:effectRef idx="0">
-            <a:schemeClr val="accent1"/>
-          </a:effectRef>
-          <a:fontRef idx="minor">
-            <a:schemeClr val="lt1"/>
-          </a:fontRef>
-        </p:style>
-        <p:txBody>
-          <a:bodyPr rtlCol="0" anchor="t" anchorCtr="1"/>
-          <a:lstStyle/>
-          <a:p>
-            <a:pPr algn="ctr"/>
-            <a:r>
-              <a:rPr lang="en-US" sz="1400" b="1"/>
-              <a:t>PresentationController</a:t>
-            </a:r>
-            <a:endParaRPr lang="en-SG" sz="1400" b="1" dirty="0"/>
-          </a:p>
-        </p:txBody>
-      </p:sp>
-      <p:sp>
-        <p:nvSpPr>
-          <p:cNvPr id="10" name="Rounded Rectangle 9"/>
-          <p:cNvSpPr/>
-          <p:nvPr/>
-        </p:nvSpPr>
-        <p:spPr>
-          <a:xfrm>
-            <a:off x="2112368" y="3372977"/>
-            <a:ext cx="2515137" cy="334347"/>
-          </a:xfrm>
-          <a:prstGeom prst="roundRect">
-            <a:avLst>
-              <a:gd name="adj" fmla="val 9190"/>
-            </a:avLst>
-          </a:prstGeom>
-          <a:solidFill>
-            <a:schemeClr val="accent1">
-              <a:lumMod val="60000"/>
-              <a:lumOff val="40000"/>
-            </a:schemeClr>
-          </a:solidFill>
-          <a:ln>
-            <a:solidFill>
-              <a:schemeClr val="accent1">
-                <a:lumMod val="75000"/>
-              </a:schemeClr>
-            </a:solidFill>
-          </a:ln>
-        </p:spPr>
-        <p:style>
-          <a:lnRef idx="2">
-            <a:schemeClr val="accent1">
-              <a:shade val="50000"/>
-            </a:schemeClr>
-          </a:lnRef>
-          <a:fillRef idx="1">
-            <a:schemeClr val="accent1"/>
-          </a:fillRef>
-          <a:effectRef idx="0">
-            <a:schemeClr val="accent1"/>
-          </a:effectRef>
-          <a:fontRef idx="minor">
-            <a:schemeClr val="lt1"/>
-          </a:fontRef>
-        </p:style>
-        <p:txBody>
-          <a:bodyPr rtlCol="0" anchor="t" anchorCtr="1"/>
-          <a:lstStyle/>
-          <a:p>
-            <a:pPr algn="ctr"/>
-            <a:r>
-              <a:rPr lang="en-US" sz="1400" b="1"/>
-              <a:t>PresentationSectionController</a:t>
-            </a:r>
-            <a:endParaRPr lang="en-SG" sz="1400" b="1" dirty="0"/>
-          </a:p>
-        </p:txBody>
-      </p:sp>
-      <p:sp>
-        <p:nvSpPr>
-          <p:cNvPr id="11" name="Rounded Rectangle 10"/>
-          <p:cNvSpPr/>
-          <p:nvPr/>
-        </p:nvSpPr>
-        <p:spPr>
-          <a:xfrm>
-            <a:off x="3115968" y="1747917"/>
-            <a:ext cx="1512096" cy="334347"/>
-          </a:xfrm>
-          <a:prstGeom prst="roundRect">
-            <a:avLst>
-              <a:gd name="adj" fmla="val 9190"/>
-            </a:avLst>
-          </a:prstGeom>
-          <a:solidFill>
-            <a:schemeClr val="accent1">
-              <a:lumMod val="60000"/>
-              <a:lumOff val="40000"/>
-            </a:schemeClr>
-          </a:solidFill>
-          <a:ln>
-            <a:solidFill>
-              <a:schemeClr val="accent1">
-                <a:lumMod val="75000"/>
-              </a:schemeClr>
-            </a:solidFill>
-          </a:ln>
-        </p:spPr>
-        <p:style>
-          <a:lnRef idx="2">
-            <a:schemeClr val="accent1">
-              <a:shade val="50000"/>
-            </a:schemeClr>
-          </a:lnRef>
-          <a:fillRef idx="1">
-            <a:schemeClr val="accent1"/>
-          </a:fillRef>
-          <a:effectRef idx="0">
-            <a:schemeClr val="accent1"/>
-          </a:effectRef>
-          <a:fontRef idx="minor">
-            <a:schemeClr val="lt1"/>
-          </a:fontRef>
-        </p:style>
-        <p:txBody>
-          <a:bodyPr rtlCol="0" anchor="t" anchorCtr="1"/>
-          <a:lstStyle/>
-          <a:p>
-            <a:pPr algn="ctr"/>
-            <a:r>
-              <a:rPr lang="en-US" sz="1400" b="1"/>
-              <a:t>RecordController</a:t>
-            </a:r>
-            <a:endParaRPr lang="en-SG" sz="1400" b="1" dirty="0"/>
-          </a:p>
-        </p:txBody>
-      </p:sp>
-      <p:sp>
-        <p:nvSpPr>
-          <p:cNvPr id="12" name="Rounded Rectangle 11"/>
-          <p:cNvSpPr/>
-          <p:nvPr/>
-        </p:nvSpPr>
-        <p:spPr>
-          <a:xfrm>
-            <a:off x="2976264" y="5464975"/>
-            <a:ext cx="1651800" cy="334347"/>
-          </a:xfrm>
-          <a:prstGeom prst="roundRect">
-            <a:avLst>
-              <a:gd name="adj" fmla="val 9190"/>
-            </a:avLst>
-          </a:prstGeom>
-          <a:solidFill>
-            <a:schemeClr val="accent1">
-              <a:lumMod val="60000"/>
-              <a:lumOff val="40000"/>
-            </a:schemeClr>
-          </a:solidFill>
-          <a:ln>
-            <a:solidFill>
-              <a:schemeClr val="accent1">
-                <a:lumMod val="75000"/>
-              </a:schemeClr>
-            </a:solidFill>
-          </a:ln>
-        </p:spPr>
-        <p:style>
-          <a:lnRef idx="2">
-            <a:schemeClr val="accent1">
-              <a:shade val="50000"/>
-            </a:schemeClr>
-          </a:lnRef>
-          <a:fillRef idx="1">
-            <a:schemeClr val="accent1"/>
-          </a:fillRef>
-          <a:effectRef idx="0">
-            <a:schemeClr val="accent1"/>
-          </a:effectRef>
-          <a:fontRef idx="minor">
-            <a:schemeClr val="lt1"/>
-          </a:fontRef>
-        </p:style>
-        <p:txBody>
-          <a:bodyPr rtlCol="0" anchor="t" anchorCtr="1"/>
-          <a:lstStyle/>
-          <a:p>
-            <a:pPr algn="ctr"/>
-            <a:r>
-              <a:rPr lang="en-US" sz="1400" b="1"/>
-              <a:t>WebPageController</a:t>
-            </a:r>
-            <a:endParaRPr lang="en-SG" sz="1400" b="1" dirty="0"/>
-          </a:p>
-        </p:txBody>
-      </p:sp>
-      <p:sp>
-        <p:nvSpPr>
-          <p:cNvPr id="14" name="Rounded Rectangle 13"/>
-          <p:cNvSpPr/>
-          <p:nvPr/>
-        </p:nvSpPr>
-        <p:spPr>
-          <a:xfrm>
-            <a:off x="5012087" y="4660565"/>
-            <a:ext cx="1604866" cy="343761"/>
-          </a:xfrm>
-          <a:prstGeom prst="roundRect">
-            <a:avLst>
-              <a:gd name="adj" fmla="val 9190"/>
-            </a:avLst>
-          </a:prstGeom>
-          <a:solidFill>
-            <a:schemeClr val="accent4">
-              <a:lumMod val="60000"/>
-              <a:lumOff val="40000"/>
-            </a:schemeClr>
-          </a:solidFill>
-          <a:ln>
-            <a:solidFill>
-              <a:schemeClr val="accent4">
-                <a:lumMod val="75000"/>
-              </a:schemeClr>
-            </a:solidFill>
-          </a:ln>
-        </p:spPr>
-        <p:style>
-          <a:lnRef idx="2">
-            <a:schemeClr val="accent1">
-              <a:shade val="50000"/>
-            </a:schemeClr>
-          </a:lnRef>
-          <a:fillRef idx="1">
-            <a:schemeClr val="accent1"/>
-          </a:fillRef>
-          <a:effectRef idx="0">
-            <a:schemeClr val="accent1"/>
-          </a:effectRef>
-          <a:fontRef idx="minor">
-            <a:schemeClr val="lt1"/>
-          </a:fontRef>
-        </p:style>
-        <p:txBody>
-          <a:bodyPr rtlCol="0" anchor="t" anchorCtr="1"/>
-          <a:lstStyle/>
-          <a:p>
-            <a:pPr algn="ctr"/>
-            <a:r>
-              <a:rPr lang="en-US" sz="1400" b="1" dirty="0" err="1"/>
-              <a:t>DBMetaDataLogic</a:t>
-            </a:r>
-            <a:endParaRPr lang="en-SG" sz="1400" b="1" dirty="0"/>
-          </a:p>
-        </p:txBody>
-      </p:sp>
-      <p:sp>
-        <p:nvSpPr>
-          <p:cNvPr id="15" name="Rounded Rectangle 14"/>
-          <p:cNvSpPr/>
-          <p:nvPr/>
-        </p:nvSpPr>
-        <p:spPr>
-          <a:xfrm>
-            <a:off x="5012087" y="4037940"/>
-            <a:ext cx="2674777" cy="343761"/>
-          </a:xfrm>
-          <a:prstGeom prst="roundRect">
-            <a:avLst>
-              <a:gd name="adj" fmla="val 9190"/>
-            </a:avLst>
-          </a:prstGeom>
-          <a:solidFill>
-            <a:schemeClr val="accent4">
-              <a:lumMod val="60000"/>
-              <a:lumOff val="40000"/>
-            </a:schemeClr>
-          </a:solidFill>
-          <a:ln>
-            <a:solidFill>
-              <a:schemeClr val="accent4">
-                <a:lumMod val="75000"/>
-              </a:schemeClr>
-            </a:solidFill>
-          </a:ln>
-        </p:spPr>
-        <p:style>
-          <a:lnRef idx="2">
-            <a:schemeClr val="accent1">
-              <a:shade val="50000"/>
-            </a:schemeClr>
-          </a:lnRef>
-          <a:fillRef idx="1">
-            <a:schemeClr val="accent1"/>
-          </a:fillRef>
-          <a:effectRef idx="0">
-            <a:schemeClr val="accent1"/>
-          </a:effectRef>
-          <a:fontRef idx="minor">
-            <a:schemeClr val="lt1"/>
-          </a:fontRef>
-        </p:style>
-        <p:txBody>
-          <a:bodyPr rtlCol="0" anchor="t" anchorCtr="1"/>
-          <a:lstStyle/>
-          <a:p>
-            <a:pPr algn="ctr"/>
-            <a:r>
-              <a:rPr lang="en-US" sz="1400" b="1"/>
-              <a:t>PresentationAccessControlLogic</a:t>
-            </a:r>
-            <a:endParaRPr lang="en-SG" sz="1400" b="1" dirty="0"/>
-          </a:p>
-        </p:txBody>
-      </p:sp>
-      <p:sp>
-        <p:nvSpPr>
-          <p:cNvPr id="17" name="Rounded Rectangle 16"/>
-          <p:cNvSpPr/>
-          <p:nvPr/>
-        </p:nvSpPr>
-        <p:spPr>
-          <a:xfrm>
-            <a:off x="5547042" y="3355810"/>
-            <a:ext cx="2139822" cy="343762"/>
-          </a:xfrm>
-          <a:prstGeom prst="roundRect">
-            <a:avLst>
-              <a:gd name="adj" fmla="val 9190"/>
-            </a:avLst>
-          </a:prstGeom>
-          <a:solidFill>
-            <a:schemeClr val="accent4">
-              <a:lumMod val="60000"/>
-              <a:lumOff val="40000"/>
-            </a:schemeClr>
-          </a:solidFill>
-          <a:ln>
-            <a:solidFill>
-              <a:schemeClr val="accent4">
-                <a:lumMod val="75000"/>
-              </a:schemeClr>
-            </a:solidFill>
-          </a:ln>
-        </p:spPr>
-        <p:style>
-          <a:lnRef idx="2">
-            <a:schemeClr val="accent1">
-              <a:shade val="50000"/>
-            </a:schemeClr>
-          </a:lnRef>
-          <a:fillRef idx="1">
-            <a:schemeClr val="accent1"/>
-          </a:fillRef>
-          <a:effectRef idx="0">
-            <a:schemeClr val="accent1"/>
-          </a:effectRef>
-          <a:fontRef idx="minor">
-            <a:schemeClr val="lt1"/>
-          </a:fontRef>
-        </p:style>
-        <p:txBody>
-          <a:bodyPr rtlCol="0" anchor="t" anchorCtr="1"/>
-          <a:lstStyle/>
-          <a:p>
-            <a:pPr algn="ctr"/>
-            <a:r>
-              <a:rPr lang="en-US" sz="1400" b="1"/>
-              <a:t>PresentationSectionLogic</a:t>
-            </a:r>
-            <a:endParaRPr lang="en-SG" sz="1400" b="1" dirty="0"/>
-          </a:p>
-        </p:txBody>
-      </p:sp>
-      <p:sp>
-        <p:nvSpPr>
-          <p:cNvPr id="18" name="Rounded Rectangle 17"/>
-          <p:cNvSpPr/>
-          <p:nvPr/>
-        </p:nvSpPr>
-        <p:spPr>
-          <a:xfrm>
-            <a:off x="6081998" y="1738503"/>
-            <a:ext cx="1604866" cy="343761"/>
-          </a:xfrm>
-          <a:prstGeom prst="roundRect">
-            <a:avLst>
-              <a:gd name="adj" fmla="val 9190"/>
-            </a:avLst>
-          </a:prstGeom>
-          <a:solidFill>
-            <a:schemeClr val="accent4">
-              <a:lumMod val="60000"/>
-              <a:lumOff val="40000"/>
-            </a:schemeClr>
-          </a:solidFill>
-          <a:ln>
-            <a:solidFill>
-              <a:schemeClr val="accent4">
-                <a:lumMod val="75000"/>
-              </a:schemeClr>
-            </a:solidFill>
-          </a:ln>
-        </p:spPr>
-        <p:style>
-          <a:lnRef idx="2">
-            <a:schemeClr val="accent1">
-              <a:shade val="50000"/>
-            </a:schemeClr>
-          </a:lnRef>
-          <a:fillRef idx="1">
-            <a:schemeClr val="accent1"/>
-          </a:fillRef>
-          <a:effectRef idx="0">
-            <a:schemeClr val="accent1"/>
-          </a:effectRef>
-          <a:fontRef idx="minor">
-            <a:schemeClr val="lt1"/>
-          </a:fontRef>
-        </p:style>
-        <p:txBody>
-          <a:bodyPr rtlCol="0" anchor="t" anchorCtr="1"/>
-          <a:lstStyle/>
-          <a:p>
-            <a:pPr algn="ctr"/>
-            <a:r>
-              <a:rPr lang="en-US" sz="1400" b="1" dirty="0" err="1"/>
-              <a:t>RecordLogic</a:t>
-            </a:r>
-            <a:endParaRPr lang="en-SG" sz="1400" b="1" dirty="0"/>
-          </a:p>
-        </p:txBody>
-      </p:sp>
-      <p:cxnSp>
-        <p:nvCxnSpPr>
-          <p:cNvPr id="34" name="Elbow Connector 182"/>
-          <p:cNvCxnSpPr>
-            <a:cxnSpLocks/>
-            <a:stCxn id="7" idx="3"/>
-            <a:endCxn id="14" idx="1"/>
-          </p:cNvCxnSpPr>
-          <p:nvPr/>
-        </p:nvCxnSpPr>
-        <p:spPr>
-          <a:xfrm flipV="1">
-            <a:off x="4628064" y="4832446"/>
-            <a:ext cx="384023" cy="689"/>
-          </a:xfrm>
-          <a:prstGeom prst="straightConnector1">
-            <a:avLst/>
-          </a:prstGeom>
-          <a:ln w="38100">
-            <a:solidFill>
-              <a:schemeClr val="accent1">
-                <a:lumMod val="75000"/>
-              </a:schemeClr>
-            </a:solidFill>
-            <a:prstDash val="solid"/>
-            <a:headEnd type="none" w="med" len="med"/>
-            <a:tailEnd type="triangle" w="med" len="med"/>
-          </a:ln>
-        </p:spPr>
-        <p:style>
-          <a:lnRef idx="1">
-            <a:schemeClr val="accent1"/>
-          </a:lnRef>
-          <a:fillRef idx="0">
-            <a:schemeClr val="accent1"/>
-          </a:fillRef>
-          <a:effectRef idx="0">
-            <a:schemeClr val="accent1"/>
-          </a:effectRef>
-          <a:fontRef idx="minor">
-            <a:schemeClr val="tx1"/>
-          </a:fontRef>
-        </p:style>
-      </p:cxnSp>
-      <p:cxnSp>
-        <p:nvCxnSpPr>
-          <p:cNvPr id="37" name="Elbow Connector 182"/>
-          <p:cNvCxnSpPr>
-            <a:cxnSpLocks/>
-            <a:stCxn id="8" idx="3"/>
-            <a:endCxn id="15" idx="1"/>
-          </p:cNvCxnSpPr>
-          <p:nvPr/>
-        </p:nvCxnSpPr>
-        <p:spPr>
-          <a:xfrm flipV="1">
-            <a:off x="4628064" y="4209821"/>
-            <a:ext cx="384023" cy="4707"/>
-          </a:xfrm>
-          <a:prstGeom prst="straightConnector1">
-            <a:avLst/>
-          </a:prstGeom>
-          <a:ln w="38100">
-            <a:solidFill>
-              <a:schemeClr val="accent1">
-                <a:lumMod val="75000"/>
-              </a:schemeClr>
-            </a:solidFill>
-            <a:prstDash val="solid"/>
-            <a:headEnd type="none" w="med" len="med"/>
-            <a:tailEnd type="triangle" w="med" len="med"/>
-          </a:ln>
-        </p:spPr>
-        <p:style>
-          <a:lnRef idx="1">
-            <a:schemeClr val="accent1"/>
-          </a:lnRef>
-          <a:fillRef idx="0">
-            <a:schemeClr val="accent1"/>
-          </a:fillRef>
-          <a:effectRef idx="0">
-            <a:schemeClr val="accent1"/>
-          </a:effectRef>
-          <a:fontRef idx="minor">
-            <a:schemeClr val="tx1"/>
-          </a:fontRef>
-        </p:style>
-      </p:cxnSp>
-      <p:cxnSp>
-        <p:nvCxnSpPr>
-          <p:cNvPr id="46" name="Elbow Connector 182"/>
-          <p:cNvCxnSpPr>
-            <a:cxnSpLocks/>
-            <a:stCxn id="9" idx="3"/>
-            <a:endCxn id="49" idx="1"/>
-          </p:cNvCxnSpPr>
-          <p:nvPr/>
-        </p:nvCxnSpPr>
-        <p:spPr>
-          <a:xfrm flipV="1">
-            <a:off x="4628064" y="2708592"/>
-            <a:ext cx="1482793" cy="6674"/>
-          </a:xfrm>
-          <a:prstGeom prst="straightConnector1">
-            <a:avLst/>
-          </a:prstGeom>
-          <a:ln w="38100">
-            <a:solidFill>
-              <a:schemeClr val="accent1">
-                <a:lumMod val="75000"/>
-              </a:schemeClr>
-            </a:solidFill>
-            <a:prstDash val="solid"/>
-            <a:headEnd type="none" w="med" len="med"/>
-            <a:tailEnd type="triangle" w="med" len="med"/>
-          </a:ln>
-        </p:spPr>
-        <p:style>
-          <a:lnRef idx="1">
-            <a:schemeClr val="accent1"/>
-          </a:lnRef>
-          <a:fillRef idx="0">
-            <a:schemeClr val="accent1"/>
-          </a:fillRef>
-          <a:effectRef idx="0">
-            <a:schemeClr val="accent1"/>
-          </a:effectRef>
-          <a:fontRef idx="minor">
-            <a:schemeClr val="tx1"/>
-          </a:fontRef>
-        </p:style>
-      </p:cxnSp>
-      <p:cxnSp>
-        <p:nvCxnSpPr>
-          <p:cNvPr id="52" name="Elbow Connector 182"/>
-          <p:cNvCxnSpPr>
-            <a:cxnSpLocks/>
-            <a:stCxn id="10" idx="3"/>
-            <a:endCxn id="17" idx="1"/>
-          </p:cNvCxnSpPr>
-          <p:nvPr/>
-        </p:nvCxnSpPr>
-        <p:spPr>
-          <a:xfrm flipV="1">
-            <a:off x="4627505" y="3527691"/>
-            <a:ext cx="919537" cy="12460"/>
-          </a:xfrm>
-          <a:prstGeom prst="straightConnector1">
-            <a:avLst/>
-          </a:prstGeom>
-          <a:ln w="38100">
-            <a:solidFill>
-              <a:schemeClr val="accent1">
-                <a:lumMod val="75000"/>
-              </a:schemeClr>
-            </a:solidFill>
-            <a:prstDash val="solid"/>
-            <a:headEnd type="none" w="med" len="med"/>
-            <a:tailEnd type="triangle" w="med" len="med"/>
-          </a:ln>
-        </p:spPr>
-        <p:style>
-          <a:lnRef idx="1">
-            <a:schemeClr val="accent1"/>
-          </a:lnRef>
-          <a:fillRef idx="0">
-            <a:schemeClr val="accent1"/>
-          </a:fillRef>
-          <a:effectRef idx="0">
-            <a:schemeClr val="accent1"/>
-          </a:effectRef>
-          <a:fontRef idx="minor">
-            <a:schemeClr val="tx1"/>
-          </a:fontRef>
-        </p:style>
-      </p:cxnSp>
-      <p:cxnSp>
-        <p:nvCxnSpPr>
-          <p:cNvPr id="58" name="Elbow Connector 182"/>
-          <p:cNvCxnSpPr>
-            <a:cxnSpLocks/>
-            <a:stCxn id="11" idx="3"/>
-            <a:endCxn id="18" idx="1"/>
-          </p:cNvCxnSpPr>
-          <p:nvPr/>
-        </p:nvCxnSpPr>
-        <p:spPr>
-          <a:xfrm flipV="1">
-            <a:off x="4628064" y="1910384"/>
-            <a:ext cx="1453934" cy="4707"/>
-          </a:xfrm>
-          <a:prstGeom prst="straightConnector1">
-            <a:avLst/>
-          </a:prstGeom>
-          <a:ln w="38100">
-            <a:solidFill>
-              <a:schemeClr val="accent1">
-                <a:lumMod val="75000"/>
-              </a:schemeClr>
-            </a:solidFill>
-            <a:prstDash val="solid"/>
-            <a:headEnd type="none" w="med" len="med"/>
-            <a:tailEnd type="triangle" w="med" len="med"/>
-          </a:ln>
-        </p:spPr>
-        <p:style>
-          <a:lnRef idx="1">
-            <a:schemeClr val="accent1"/>
-          </a:lnRef>
-          <a:fillRef idx="0">
-            <a:schemeClr val="accent1"/>
-          </a:fillRef>
-          <a:effectRef idx="0">
-            <a:schemeClr val="accent1"/>
-          </a:effectRef>
-          <a:fontRef idx="minor">
-            <a:schemeClr val="tx1"/>
-          </a:fontRef>
-        </p:style>
-      </p:cxnSp>
-      <p:cxnSp>
-        <p:nvCxnSpPr>
-          <p:cNvPr id="61" name="Elbow Connector 182"/>
-          <p:cNvCxnSpPr>
-            <a:cxnSpLocks/>
-            <a:stCxn id="12" idx="3"/>
-            <a:endCxn id="65" idx="1"/>
-          </p:cNvCxnSpPr>
-          <p:nvPr/>
-        </p:nvCxnSpPr>
-        <p:spPr>
-          <a:xfrm>
-            <a:off x="4628064" y="5632149"/>
-            <a:ext cx="415940" cy="0"/>
-          </a:xfrm>
-          <a:prstGeom prst="straightConnector1">
-            <a:avLst/>
-          </a:prstGeom>
-          <a:ln w="38100">
-            <a:solidFill>
-              <a:schemeClr val="accent1">
-                <a:lumMod val="75000"/>
-              </a:schemeClr>
-            </a:solidFill>
-            <a:prstDash val="solid"/>
-            <a:headEnd type="none" w="med" len="med"/>
-            <a:tailEnd type="triangle" w="med" len="med"/>
-          </a:ln>
-        </p:spPr>
-        <p:style>
-          <a:lnRef idx="1">
-            <a:schemeClr val="accent1"/>
-          </a:lnRef>
-          <a:fillRef idx="0">
-            <a:schemeClr val="accent1"/>
-          </a:fillRef>
-          <a:effectRef idx="0">
-            <a:schemeClr val="accent1"/>
-          </a:effectRef>
-          <a:fontRef idx="minor">
-            <a:schemeClr val="tx1"/>
-          </a:fontRef>
-        </p:style>
-      </p:cxnSp>
-      <p:sp>
-        <p:nvSpPr>
-          <p:cNvPr id="65" name="Vertical Scroll 64"/>
-          <p:cNvSpPr/>
-          <p:nvPr/>
-        </p:nvSpPr>
-        <p:spPr>
-          <a:xfrm>
-            <a:off x="4960762" y="5299182"/>
-            <a:ext cx="1567070" cy="665934"/>
-          </a:xfrm>
-          <a:prstGeom prst="verticalScroll">
-            <a:avLst/>
-          </a:prstGeom>
-        </p:spPr>
-        <p:style>
-          <a:lnRef idx="2">
-            <a:schemeClr val="accent1">
-              <a:shade val="50000"/>
-            </a:schemeClr>
-          </a:lnRef>
-          <a:fillRef idx="1">
-            <a:schemeClr val="accent1"/>
-          </a:fillRef>
-          <a:effectRef idx="0">
-            <a:schemeClr val="accent1"/>
-          </a:effectRef>
-          <a:fontRef idx="minor">
-            <a:schemeClr val="lt1"/>
-          </a:fontRef>
-        </p:style>
-        <p:txBody>
-          <a:bodyPr rtlCol="0" anchor="ctr"/>
-          <a:lstStyle/>
-          <a:p>
-            <a:pPr algn="ctr"/>
-            <a:r>
-              <a:rPr lang="en-US" sz="1600" dirty="0"/>
-              <a:t>*.</a:t>
-            </a:r>
-            <a:r>
-              <a:rPr lang="en-US" sz="1600" dirty="0" err="1"/>
-              <a:t>js</a:t>
-            </a:r>
-            <a:r>
-              <a:rPr lang="en-US" sz="1600" dirty="0"/>
-              <a:t> / *.html / *.</a:t>
-            </a:r>
-            <a:r>
-              <a:rPr lang="en-US" sz="1600" dirty="0" err="1"/>
-              <a:t>css</a:t>
-            </a:r>
-            <a:endParaRPr lang="en-US" sz="1600" dirty="0"/>
-          </a:p>
-        </p:txBody>
-      </p:sp>
-      <p:sp>
-        <p:nvSpPr>
-          <p:cNvPr id="36" name="Rounded Rectangle 35"/>
-          <p:cNvSpPr/>
-          <p:nvPr/>
-        </p:nvSpPr>
-        <p:spPr>
-          <a:xfrm>
-            <a:off x="8026452" y="254794"/>
-            <a:ext cx="450112" cy="4772478"/>
-          </a:xfrm>
-          <a:prstGeom prst="roundRect">
-            <a:avLst>
-              <a:gd name="adj" fmla="val 9190"/>
-            </a:avLst>
-          </a:prstGeom>
-          <a:solidFill>
-            <a:schemeClr val="accent3">
-              <a:lumMod val="60000"/>
-              <a:lumOff val="40000"/>
-            </a:schemeClr>
-          </a:solidFill>
-          <a:ln>
-            <a:solidFill>
-              <a:schemeClr val="accent3">
-                <a:lumMod val="75000"/>
-              </a:schemeClr>
-            </a:solidFill>
-          </a:ln>
-        </p:spPr>
-        <p:style>
-          <a:lnRef idx="2">
-            <a:schemeClr val="accent1">
-              <a:shade val="50000"/>
-            </a:schemeClr>
-          </a:lnRef>
-          <a:fillRef idx="1">
-            <a:schemeClr val="accent1"/>
-          </a:fillRef>
-          <a:effectRef idx="0">
-            <a:schemeClr val="accent1"/>
-          </a:effectRef>
-          <a:fontRef idx="minor">
-            <a:schemeClr val="lt1"/>
-          </a:fontRef>
-        </p:style>
-        <p:txBody>
-          <a:bodyPr vert="vert270" rtlCol="0" anchor="t" anchorCtr="0"/>
-          <a:lstStyle/>
-          <a:p>
-            <a:pPr algn="ctr"/>
-            <a:r>
-              <a:rPr lang="en-US" sz="1400" b="1"/>
-              <a:t>Storage</a:t>
-            </a:r>
-            <a:endParaRPr lang="en-SG" sz="1400" b="1" dirty="0"/>
-          </a:p>
-        </p:txBody>
-      </p:sp>
-      <p:cxnSp>
-        <p:nvCxnSpPr>
-          <p:cNvPr id="63" name="Elbow Connector 182">
-            <a:extLst>
-              <a:ext uri="{FF2B5EF4-FFF2-40B4-BE49-F238E27FC236}">
-                <a16:creationId xmlns:a16="http://schemas.microsoft.com/office/drawing/2014/main" id="{1BC29DFD-C30A-4F01-BA71-66B3ED764DEE}"/>
-              </a:ext>
-            </a:extLst>
-          </p:cNvPr>
-          <p:cNvCxnSpPr>
-            <a:cxnSpLocks/>
-          </p:cNvCxnSpPr>
-          <p:nvPr/>
-        </p:nvCxnSpPr>
-        <p:spPr>
-          <a:xfrm>
-            <a:off x="7687981" y="2695878"/>
+            <a:off x="7687982" y="3235628"/>
             <a:ext cx="338471" cy="0"/>
           </a:xfrm>
           <a:prstGeom prst="straightConnector1">
@@ -6612,7 +4620,7 @@
         </p:nvCxnSpPr>
         <p:spPr>
           <a:xfrm>
-            <a:off x="7687981" y="483394"/>
+            <a:off x="7687982" y="1023144"/>
             <a:ext cx="338471" cy="0"/>
           </a:xfrm>
           <a:prstGeom prst="straightConnector1">
@@ -6653,13 +4661,14 @@
           </p:cNvPr>
           <p:cNvCxnSpPr>
             <a:cxnSpLocks/>
+            <a:stCxn id="18" idx="3"/>
           </p:cNvCxnSpPr>
           <p:nvPr/>
         </p:nvCxnSpPr>
         <p:spPr>
           <a:xfrm>
-            <a:off x="7686864" y="1918988"/>
-            <a:ext cx="338471" cy="0"/>
+            <a:off x="7678287" y="1737508"/>
+            <a:ext cx="348165" cy="0"/>
           </a:xfrm>
           <a:prstGeom prst="straightConnector1">
             <a:avLst/>
@@ -6702,7 +4711,7 @@
         </p:nvSpPr>
         <p:spPr>
           <a:xfrm>
-            <a:off x="53181" y="2536710"/>
+            <a:off x="53181" y="3076461"/>
             <a:ext cx="1337388" cy="343761"/>
           </a:xfrm>
           <a:prstGeom prst="roundRect">
@@ -6767,7 +4776,7 @@
         </p:nvSpPr>
         <p:spPr>
           <a:xfrm>
-            <a:off x="6110857" y="2536711"/>
+            <a:off x="6110858" y="3076463"/>
             <a:ext cx="1575935" cy="343761"/>
           </a:xfrm>
           <a:prstGeom prst="roundRect">
@@ -6836,8 +4845,8 @@
         </p:nvCxnSpPr>
         <p:spPr>
           <a:xfrm>
-            <a:off x="4628064" y="493656"/>
-            <a:ext cx="1722529" cy="0"/>
+            <a:off x="4628039" y="864371"/>
+            <a:ext cx="1722554" cy="169037"/>
           </a:xfrm>
           <a:prstGeom prst="straightConnector1">
             <a:avLst/>
@@ -6884,7 +4893,7 @@
         </p:nvCxnSpPr>
         <p:spPr>
           <a:xfrm>
-            <a:off x="7687981" y="4216737"/>
+            <a:off x="7687982" y="4756487"/>
             <a:ext cx="338471" cy="0"/>
           </a:xfrm>
           <a:prstGeom prst="straightConnector1">
@@ -6930,7 +4939,7 @@
         </p:nvCxnSpPr>
         <p:spPr>
           <a:xfrm>
-            <a:off x="7687981" y="3540151"/>
+            <a:off x="7687982" y="4079901"/>
             <a:ext cx="338471" cy="0"/>
           </a:xfrm>
           <a:prstGeom prst="straightConnector1">
@@ -6978,8 +4987,8 @@
         </p:nvCxnSpPr>
         <p:spPr>
           <a:xfrm flipH="1">
-            <a:off x="1390569" y="493656"/>
-            <a:ext cx="1594719" cy="2214935"/>
+            <a:off x="1390569" y="864371"/>
+            <a:ext cx="1594694" cy="2383971"/>
           </a:xfrm>
           <a:prstGeom prst="straightConnector1">
             <a:avLst/>
@@ -7028,8 +5037,8 @@
         </p:nvCxnSpPr>
         <p:spPr>
           <a:xfrm flipH="1">
-            <a:off x="1390569" y="1174425"/>
-            <a:ext cx="1594719" cy="1534166"/>
+            <a:off x="1390569" y="1473164"/>
+            <a:ext cx="1594694" cy="1775178"/>
           </a:xfrm>
           <a:prstGeom prst="straightConnector1">
             <a:avLst/>
@@ -7078,8 +5087,8 @@
         </p:nvCxnSpPr>
         <p:spPr>
           <a:xfrm flipH="1">
-            <a:off x="1390569" y="1915091"/>
-            <a:ext cx="1725399" cy="793500"/>
+            <a:off x="1390569" y="2064009"/>
+            <a:ext cx="1715816" cy="1184333"/>
           </a:xfrm>
           <a:prstGeom prst="straightConnector1">
             <a:avLst/>
@@ -7128,7 +5137,7 @@
         </p:nvCxnSpPr>
         <p:spPr>
           <a:xfrm flipH="1" flipV="1">
-            <a:off x="1390569" y="2708591"/>
+            <a:off x="1390570" y="3248343"/>
             <a:ext cx="1260372" cy="6675"/>
           </a:xfrm>
           <a:prstGeom prst="straightConnector1">
@@ -7178,7 +5187,7 @@
         </p:nvCxnSpPr>
         <p:spPr>
           <a:xfrm flipH="1" flipV="1">
-            <a:off x="1390569" y="2708591"/>
+            <a:off x="1390571" y="3248341"/>
             <a:ext cx="721799" cy="831560"/>
           </a:xfrm>
           <a:prstGeom prst="straightConnector1">
@@ -7228,7 +5237,7 @@
         </p:nvCxnSpPr>
         <p:spPr>
           <a:xfrm flipH="1" flipV="1">
-            <a:off x="1390569" y="2708591"/>
+            <a:off x="1390571" y="3248342"/>
             <a:ext cx="190461" cy="1505937"/>
           </a:xfrm>
           <a:prstGeom prst="straightConnector1">
@@ -7278,8 +5287,8 @@
         </p:nvCxnSpPr>
         <p:spPr>
           <a:xfrm>
-            <a:off x="4628064" y="493656"/>
-            <a:ext cx="1482793" cy="2214936"/>
+            <a:off x="4628039" y="864371"/>
+            <a:ext cx="1482819" cy="2383973"/>
           </a:xfrm>
           <a:prstGeom prst="straightConnector1">
             <a:avLst/>
@@ -7328,8 +5337,8 @@
         </p:nvCxnSpPr>
         <p:spPr>
           <a:xfrm>
-            <a:off x="4628064" y="1915091"/>
-            <a:ext cx="1482793" cy="793501"/>
+            <a:off x="4618481" y="2064009"/>
+            <a:ext cx="1492377" cy="1184335"/>
           </a:xfrm>
           <a:prstGeom prst="straightConnector1">
             <a:avLst/>
@@ -7378,7 +5387,7 @@
         </p:nvCxnSpPr>
         <p:spPr>
           <a:xfrm flipV="1">
-            <a:off x="4627505" y="2708592"/>
+            <a:off x="4627505" y="3248344"/>
             <a:ext cx="1483352" cy="831559"/>
           </a:xfrm>
           <a:prstGeom prst="straightConnector1">
@@ -7428,8 +5437,238 @@
         </p:nvCxnSpPr>
         <p:spPr>
           <a:xfrm flipV="1">
-            <a:off x="4628064" y="2708592"/>
+            <a:off x="4628066" y="3248343"/>
             <a:ext cx="1482793" cy="1505936"/>
+          </a:xfrm>
+          <a:prstGeom prst="straightConnector1">
+            <a:avLst/>
+          </a:prstGeom>
+          <a:ln w="38100">
+            <a:solidFill>
+              <a:schemeClr val="accent1">
+                <a:lumMod val="75000"/>
+              </a:schemeClr>
+            </a:solidFill>
+            <a:prstDash val="solid"/>
+            <a:headEnd type="none" w="med" len="med"/>
+            <a:tailEnd type="triangle" w="med" len="med"/>
+          </a:ln>
+        </p:spPr>
+        <p:style>
+          <a:lnRef idx="1">
+            <a:schemeClr val="accent1"/>
+          </a:lnRef>
+          <a:fillRef idx="0">
+            <a:schemeClr val="accent1"/>
+          </a:fillRef>
+          <a:effectRef idx="0">
+            <a:schemeClr val="accent1"/>
+          </a:effectRef>
+          <a:fontRef idx="minor">
+            <a:schemeClr val="tx1"/>
+          </a:fontRef>
+        </p:style>
+      </p:cxnSp>
+      <p:sp>
+        <p:nvSpPr>
+          <p:cNvPr id="41" name="Rounded Rectangle 7">
+            <a:extLst>
+              <a:ext uri="{FF2B5EF4-FFF2-40B4-BE49-F238E27FC236}">
+                <a16:creationId xmlns:a16="http://schemas.microsoft.com/office/drawing/2014/main" id="{77373F99-8DFB-4769-A4ED-F0B2B2CCB97F}"/>
+              </a:ext>
+            </a:extLst>
+          </p:cNvPr>
+          <p:cNvSpPr/>
+          <p:nvPr/>
+        </p:nvSpPr>
+        <p:spPr>
+          <a:xfrm>
+            <a:off x="2985263" y="2496998"/>
+            <a:ext cx="1622546" cy="334347"/>
+          </a:xfrm>
+          <a:prstGeom prst="roundRect">
+            <a:avLst>
+              <a:gd name="adj" fmla="val 9190"/>
+            </a:avLst>
+          </a:prstGeom>
+          <a:solidFill>
+            <a:schemeClr val="accent1">
+              <a:lumMod val="60000"/>
+              <a:lumOff val="40000"/>
+            </a:schemeClr>
+          </a:solidFill>
+          <a:ln>
+            <a:solidFill>
+              <a:schemeClr val="accent1">
+                <a:lumMod val="75000"/>
+              </a:schemeClr>
+            </a:solidFill>
+          </a:ln>
+        </p:spPr>
+        <p:style>
+          <a:lnRef idx="2">
+            <a:schemeClr val="accent1">
+              <a:shade val="50000"/>
+            </a:schemeClr>
+          </a:lnRef>
+          <a:fillRef idx="1">
+            <a:schemeClr val="accent1"/>
+          </a:fillRef>
+          <a:effectRef idx="0">
+            <a:schemeClr val="accent1"/>
+          </a:effectRef>
+          <a:fontRef idx="minor">
+            <a:schemeClr val="lt1"/>
+          </a:fontRef>
+        </p:style>
+        <p:txBody>
+          <a:bodyPr rtlCol="0" anchor="t" anchorCtr="1"/>
+          <a:lstStyle/>
+          <a:p>
+            <a:pPr algn="ctr"/>
+            <a:r>
+              <a:rPr lang="en-US" sz="1400" b="1" dirty="0" err="1"/>
+              <a:t>MailController</a:t>
+            </a:r>
+            <a:endParaRPr lang="en-SG" sz="1400" b="1" dirty="0"/>
+          </a:p>
+        </p:txBody>
+      </p:sp>
+      <p:cxnSp>
+        <p:nvCxnSpPr>
+          <p:cNvPr id="42" name="Elbow Connector 182">
+            <a:extLst>
+              <a:ext uri="{FF2B5EF4-FFF2-40B4-BE49-F238E27FC236}">
+                <a16:creationId xmlns:a16="http://schemas.microsoft.com/office/drawing/2014/main" id="{32DF6318-8484-45B5-9DD5-829FB2D0569D}"/>
+              </a:ext>
+            </a:extLst>
+          </p:cNvPr>
+          <p:cNvCxnSpPr>
+            <a:cxnSpLocks/>
+            <a:stCxn id="41" idx="1"/>
+            <a:endCxn id="45" idx="3"/>
+          </p:cNvCxnSpPr>
+          <p:nvPr/>
+        </p:nvCxnSpPr>
+        <p:spPr>
+          <a:xfrm flipH="1">
+            <a:off x="1390569" y="2664172"/>
+            <a:ext cx="1594694" cy="584170"/>
+          </a:xfrm>
+          <a:prstGeom prst="straightConnector1">
+            <a:avLst/>
+          </a:prstGeom>
+          <a:ln w="38100">
+            <a:solidFill>
+              <a:schemeClr val="accent1">
+                <a:lumMod val="75000"/>
+              </a:schemeClr>
+            </a:solidFill>
+            <a:prstDash val="solid"/>
+            <a:headEnd type="none" w="med" len="med"/>
+            <a:tailEnd type="triangle" w="med" len="med"/>
+          </a:ln>
+        </p:spPr>
+        <p:style>
+          <a:lnRef idx="1">
+            <a:schemeClr val="accent1"/>
+          </a:lnRef>
+          <a:fillRef idx="0">
+            <a:schemeClr val="accent1"/>
+          </a:fillRef>
+          <a:effectRef idx="0">
+            <a:schemeClr val="accent1"/>
+          </a:effectRef>
+          <a:fontRef idx="minor">
+            <a:schemeClr val="tx1"/>
+          </a:fontRef>
+        </p:style>
+      </p:cxnSp>
+      <p:sp>
+        <p:nvSpPr>
+          <p:cNvPr id="66" name="Rounded Rectangle 3">
+            <a:extLst>
+              <a:ext uri="{FF2B5EF4-FFF2-40B4-BE49-F238E27FC236}">
+                <a16:creationId xmlns:a16="http://schemas.microsoft.com/office/drawing/2014/main" id="{95287651-52C3-4060-AF88-3B8949FC7993}"/>
+              </a:ext>
+            </a:extLst>
+          </p:cNvPr>
+          <p:cNvSpPr/>
+          <p:nvPr/>
+        </p:nvSpPr>
+        <p:spPr>
+          <a:xfrm>
+            <a:off x="6350593" y="2496998"/>
+            <a:ext cx="1337388" cy="343761"/>
+          </a:xfrm>
+          <a:prstGeom prst="roundRect">
+            <a:avLst>
+              <a:gd name="adj" fmla="val 9190"/>
+            </a:avLst>
+          </a:prstGeom>
+          <a:solidFill>
+            <a:schemeClr val="accent4">
+              <a:lumMod val="60000"/>
+              <a:lumOff val="40000"/>
+            </a:schemeClr>
+          </a:solidFill>
+          <a:ln>
+            <a:solidFill>
+              <a:schemeClr val="accent4">
+                <a:lumMod val="75000"/>
+              </a:schemeClr>
+            </a:solidFill>
+          </a:ln>
+        </p:spPr>
+        <p:style>
+          <a:lnRef idx="2">
+            <a:schemeClr val="accent1">
+              <a:shade val="50000"/>
+            </a:schemeClr>
+          </a:lnRef>
+          <a:fillRef idx="1">
+            <a:schemeClr val="accent1"/>
+          </a:fillRef>
+          <a:effectRef idx="0">
+            <a:schemeClr val="accent1"/>
+          </a:effectRef>
+          <a:fontRef idx="minor">
+            <a:schemeClr val="lt1"/>
+          </a:fontRef>
+        </p:style>
+        <p:txBody>
+          <a:bodyPr rtlCol="0" anchor="t" anchorCtr="1"/>
+          <a:lstStyle/>
+          <a:p>
+            <a:pPr algn="ctr"/>
+            <a:r>
+              <a:rPr lang="en-US" sz="1400" b="1" dirty="0" err="1"/>
+              <a:t>MailLogic</a:t>
+            </a:r>
+            <a:endParaRPr lang="en-SG" sz="1400" b="1" dirty="0"/>
+          </a:p>
+        </p:txBody>
+      </p:sp>
+      <p:cxnSp>
+        <p:nvCxnSpPr>
+          <p:cNvPr id="68" name="Elbow Connector 182">
+            <a:extLst>
+              <a:ext uri="{FF2B5EF4-FFF2-40B4-BE49-F238E27FC236}">
+                <a16:creationId xmlns:a16="http://schemas.microsoft.com/office/drawing/2014/main" id="{BF8AFC41-DB54-4AD2-87CC-9290BE850D7E}"/>
+              </a:ext>
+            </a:extLst>
+          </p:cNvPr>
+          <p:cNvCxnSpPr>
+            <a:cxnSpLocks/>
+            <a:stCxn id="41" idx="3"/>
+            <a:endCxn id="66" idx="1"/>
+          </p:cNvCxnSpPr>
+          <p:nvPr/>
+        </p:nvCxnSpPr>
+        <p:spPr>
+          <a:xfrm>
+            <a:off x="4607809" y="2664172"/>
+            <a:ext cx="1742784" cy="4707"/>
           </a:xfrm>
           <a:prstGeom prst="straightConnector1">
             <a:avLst/>

</xml_diff>